<commit_message>
small changes to network view
</commit_message>
<xml_diff>
--- a/ch1-data.pptx
+++ b/ch1-data.pptx
@@ -41,12 +41,12 @@
     <p:sldId id="340" r:id="rId29"/>
     <p:sldId id="284" r:id="rId30"/>
     <p:sldId id="285" r:id="rId31"/>
-    <p:sldId id="351" r:id="rId32"/>
-    <p:sldId id="350" r:id="rId33"/>
-    <p:sldId id="286" r:id="rId34"/>
-    <p:sldId id="287" r:id="rId35"/>
-    <p:sldId id="288" r:id="rId36"/>
-    <p:sldId id="323" r:id="rId37"/>
+    <p:sldId id="286" r:id="rId32"/>
+    <p:sldId id="287" r:id="rId33"/>
+    <p:sldId id="288" r:id="rId34"/>
+    <p:sldId id="323" r:id="rId35"/>
+    <p:sldId id="350" r:id="rId36"/>
+    <p:sldId id="351" r:id="rId37"/>
     <p:sldId id="324" r:id="rId38"/>
     <p:sldId id="328" r:id="rId39"/>
     <p:sldId id="296" r:id="rId40"/>
@@ -238,8 +238,6 @@
             <p14:sldId id="340"/>
             <p14:sldId id="284"/>
             <p14:sldId id="285"/>
-            <p14:sldId id="351"/>
-            <p14:sldId id="350"/>
             <p14:sldId id="286"/>
             <p14:sldId id="287"/>
           </p14:sldIdLst>
@@ -248,6 +246,8 @@
           <p14:sldIdLst>
             <p14:sldId id="288"/>
             <p14:sldId id="323"/>
+            <p14:sldId id="350"/>
+            <p14:sldId id="351"/>
             <p14:sldId id="324"/>
           </p14:sldIdLst>
         </p14:section>
@@ -3047,7 +3047,7 @@
               <a:pPr>
                 <a:defRPr/>
               </a:pPr>
-              <a:t>2016-09-24</a:t>
+              <a:t>2016-10-06</a:t>
             </a:fld>
             <a:endParaRPr lang="en-US"/>
           </a:p>
@@ -3263,7 +3263,7 @@
               <a:pPr>
                 <a:defRPr/>
               </a:pPr>
-              <a:t>2016-09-24</a:t>
+              <a:t>2016-10-06</a:t>
             </a:fld>
             <a:endParaRPr lang="en-US"/>
           </a:p>
@@ -5398,7 +5398,25 @@
           <a:p>
             <a:r>
               <a:rPr lang="en-US" dirty="0" smtClean="0"/>
-              <a:t>graphical representation for first-order structure</a:t>
+              <a:t>This view of relational learning</a:t>
+            </a:r>
+            <a:r>
+              <a:rPr lang="en-US" baseline="0" dirty="0" smtClean="0"/>
+              <a:t> immediately generalizes learning the standard view of learning from </a:t>
+            </a:r>
+            <a:r>
+              <a:rPr lang="en-US" baseline="0" dirty="0" err="1" smtClean="0"/>
+              <a:t>i.i.d</a:t>
+            </a:r>
+            <a:r>
+              <a:rPr lang="en-US" baseline="0" dirty="0" smtClean="0"/>
+              <a:t>. data</a:t>
+            </a:r>
+          </a:p>
+          <a:p>
+            <a:r>
+              <a:rPr lang="en-US" baseline="0" dirty="0" smtClean="0"/>
+              <a:t>e.g. drawing balls from a urn containing a ball population</a:t>
             </a:r>
             <a:endParaRPr lang="en-US" dirty="0"/>
           </a:p>
@@ -5419,9 +5437,15 @@
           <a:bodyPr/>
           <a:lstStyle/>
           <a:p>
-            <a:fld id="{F6F03D15-B6FF-D14C-A60F-5A467C82F74A}" type="slidenum">
+            <a:pPr>
+              <a:defRPr/>
+            </a:pPr>
+            <a:fld id="{57BE7C63-45E8-3348-B2F7-0B0BBCE77ABE}" type="slidenum">
               <a:rPr lang="en-US" smtClean="0"/>
-              <a:t>32</a:t>
+              <a:pPr>
+                <a:defRPr/>
+              </a:pPr>
+              <a:t>31</a:t>
             </a:fld>
             <a:endParaRPr lang="en-US"/>
           </a:p>
@@ -5430,7 +5454,7 @@
     </p:spTree>
     <p:extLst>
       <p:ext uri="{BB962C8B-B14F-4D97-AF65-F5344CB8AC3E}">
-        <p14:creationId xmlns:p14="http://schemas.microsoft.com/office/powerpoint/2010/main" val="245251814"/>
+        <p14:creationId xmlns:p14="http://schemas.microsoft.com/office/powerpoint/2010/main" val="644828777"/>
       </p:ext>
     </p:extLst>
   </p:cSld>
@@ -5486,25 +5510,17 @@
           <a:p>
             <a:r>
               <a:rPr lang="en-US" dirty="0" smtClean="0"/>
-              <a:t>This view of relational learning</a:t>
+              <a:t>functors: gender, genre, who acts in what.</a:t>
+            </a:r>
+          </a:p>
+          <a:p>
+            <a:r>
+              <a:rPr lang="en-US" dirty="0" err="1" smtClean="0"/>
+              <a:t>subgraph</a:t>
             </a:r>
             <a:r>
               <a:rPr lang="en-US" baseline="0" dirty="0" smtClean="0"/>
-              <a:t> immediately generalizes learning the standard view of learning from </a:t>
-            </a:r>
-            <a:r>
-              <a:rPr lang="en-US" baseline="0" dirty="0" err="1" smtClean="0"/>
-              <a:t>i.i.d</a:t>
-            </a:r>
-            <a:r>
-              <a:rPr lang="en-US" baseline="0" dirty="0" smtClean="0"/>
-              <a:t>. data</a:t>
-            </a:r>
-          </a:p>
-          <a:p>
-            <a:r>
-              <a:rPr lang="en-US" baseline="0" dirty="0" smtClean="0"/>
-              <a:t>e.g. drawing balls from a urn containing a ball population</a:t>
+              <a:t> sampling</a:t>
             </a:r>
             <a:endParaRPr lang="en-US" dirty="0"/>
           </a:p>
@@ -5525,15 +5541,9 @@
           <a:bodyPr/>
           <a:lstStyle/>
           <a:p>
-            <a:pPr>
-              <a:defRPr/>
-            </a:pPr>
-            <a:fld id="{57BE7C63-45E8-3348-B2F7-0B0BBCE77ABE}" type="slidenum">
+            <a:fld id="{F6F03D15-B6FF-D14C-A60F-5A467C82F74A}" type="slidenum">
               <a:rPr lang="en-US" smtClean="0"/>
-              <a:pPr>
-                <a:defRPr/>
-              </a:pPr>
-              <a:t>33</a:t>
+              <a:t>32</a:t>
             </a:fld>
             <a:endParaRPr lang="en-US"/>
           </a:p>
@@ -5542,7 +5552,7 @@
     </p:spTree>
     <p:extLst>
       <p:ext uri="{BB962C8B-B14F-4D97-AF65-F5344CB8AC3E}">
-        <p14:creationId xmlns:p14="http://schemas.microsoft.com/office/powerpoint/2010/main" val="644828777"/>
+        <p14:creationId xmlns:p14="http://schemas.microsoft.com/office/powerpoint/2010/main" val="245251814"/>
       </p:ext>
     </p:extLst>
   </p:cSld>
@@ -5596,20 +5606,6 @@
           <a:bodyPr/>
           <a:lstStyle/>
           <a:p>
-            <a:r>
-              <a:rPr lang="en-US" dirty="0" smtClean="0"/>
-              <a:t>functors: gender, genre, who acts in what.</a:t>
-            </a:r>
-          </a:p>
-          <a:p>
-            <a:r>
-              <a:rPr lang="en-US" dirty="0" err="1" smtClean="0"/>
-              <a:t>subgraph</a:t>
-            </a:r>
-            <a:r>
-              <a:rPr lang="en-US" baseline="0" dirty="0" smtClean="0"/>
-              <a:t> sampling</a:t>
-            </a:r>
             <a:endParaRPr lang="en-US" dirty="0"/>
           </a:p>
         </p:txBody>
@@ -5629,9 +5625,15 @@
           <a:bodyPr/>
           <a:lstStyle/>
           <a:p>
-            <a:fld id="{F6F03D15-B6FF-D14C-A60F-5A467C82F74A}" type="slidenum">
+            <a:pPr>
+              <a:defRPr/>
+            </a:pPr>
+            <a:fld id="{57BE7C63-45E8-3348-B2F7-0B0BBCE77ABE}" type="slidenum">
               <a:rPr lang="en-US" smtClean="0"/>
-              <a:t>34</a:t>
+              <a:pPr>
+                <a:defRPr/>
+              </a:pPr>
+              <a:t>33</a:t>
             </a:fld>
             <a:endParaRPr lang="en-US"/>
           </a:p>
@@ -5640,7 +5642,7 @@
     </p:spTree>
     <p:extLst>
       <p:ext uri="{BB962C8B-B14F-4D97-AF65-F5344CB8AC3E}">
-        <p14:creationId xmlns:p14="http://schemas.microsoft.com/office/powerpoint/2010/main" val="245251814"/>
+        <p14:creationId xmlns:p14="http://schemas.microsoft.com/office/powerpoint/2010/main" val="810849876"/>
       </p:ext>
     </p:extLst>
   </p:cSld>
@@ -5694,6 +5696,63 @@
           <a:bodyPr/>
           <a:lstStyle/>
           <a:p>
+            <a:pPr marL="171450" indent="-171450">
+              <a:buFont typeface="Arial"/>
+              <a:buChar char="•"/>
+            </a:pPr>
+            <a:r>
+              <a:rPr lang="en-US" dirty="0" smtClean="0"/>
+              <a:t>this tutorial uses only the network and tabular representations</a:t>
+            </a:r>
+          </a:p>
+          <a:p>
+            <a:pPr marL="171450" indent="-171450">
+              <a:buFont typeface="Arial"/>
+              <a:buChar char="•"/>
+            </a:pPr>
+            <a:r>
+              <a:rPr lang="en-US" dirty="0" smtClean="0"/>
+              <a:t>For graphical and tensor notation, the supplementary</a:t>
+            </a:r>
+            <a:r>
+              <a:rPr lang="en-US" baseline="0" dirty="0" smtClean="0"/>
+              <a:t> presentation has worked-out examples</a:t>
+            </a:r>
+          </a:p>
+          <a:p>
+            <a:pPr marL="171450" indent="-171450">
+              <a:buFont typeface="Arial"/>
+              <a:buChar char="•"/>
+            </a:pPr>
+            <a:r>
+              <a:rPr lang="en-US" dirty="0" smtClean="0"/>
+              <a:t>Constraints on </a:t>
+            </a:r>
+            <a:r>
+              <a:rPr lang="en-US" dirty="0" err="1" smtClean="0"/>
+              <a:t>functor</a:t>
+            </a:r>
+            <a:r>
+              <a:rPr lang="en-US" dirty="0" smtClean="0"/>
+              <a:t> types can, and typically are, exploited in specific representations of relational data</a:t>
+            </a:r>
+          </a:p>
+          <a:p>
+            <a:pPr marL="171450" indent="-171450">
+              <a:buFont typeface="Arial"/>
+              <a:buChar char="•"/>
+            </a:pPr>
+            <a:r>
+              <a:rPr lang="en-US" dirty="0" smtClean="0"/>
+              <a:t>For example,</a:t>
+            </a:r>
+            <a:r>
+              <a:rPr lang="en-US" baseline="0" dirty="0" smtClean="0"/>
+              <a:t> functional or many-one relationships, see supplementary presentation</a:t>
+            </a:r>
+            <a:endParaRPr lang="en-US" dirty="0" smtClean="0"/>
+          </a:p>
+          <a:p>
             <a:endParaRPr lang="en-US" dirty="0"/>
           </a:p>
         </p:txBody>
@@ -5721,7 +5780,7 @@
               <a:pPr>
                 <a:defRPr/>
               </a:pPr>
-              <a:t>35</a:t>
+              <a:t>34</a:t>
             </a:fld>
             <a:endParaRPr lang="en-US"/>
           </a:p>
@@ -5730,7 +5789,7 @@
     </p:spTree>
     <p:extLst>
       <p:ext uri="{BB962C8B-B14F-4D97-AF65-F5344CB8AC3E}">
-        <p14:creationId xmlns:p14="http://schemas.microsoft.com/office/powerpoint/2010/main" val="810849876"/>
+        <p14:creationId xmlns:p14="http://schemas.microsoft.com/office/powerpoint/2010/main" val="3651146937"/>
       </p:ext>
     </p:extLst>
   </p:cSld>
@@ -5784,63 +5843,10 @@
           <a:bodyPr/>
           <a:lstStyle/>
           <a:p>
-            <a:pPr marL="171450" indent="-171450">
-              <a:buFont typeface="Arial"/>
-              <a:buChar char="•"/>
-            </a:pPr>
             <a:r>
               <a:rPr lang="en-US" dirty="0" smtClean="0"/>
-              <a:t>this tutorial uses only the network and tabular representations</a:t>
-            </a:r>
-          </a:p>
-          <a:p>
-            <a:pPr marL="171450" indent="-171450">
-              <a:buFont typeface="Arial"/>
-              <a:buChar char="•"/>
-            </a:pPr>
-            <a:r>
-              <a:rPr lang="en-US" dirty="0" smtClean="0"/>
-              <a:t>For graphical and tensor notation, the supplementary</a:t>
-            </a:r>
-            <a:r>
-              <a:rPr lang="en-US" baseline="0" dirty="0" smtClean="0"/>
-              <a:t> presentation has worked-out examples</a:t>
-            </a:r>
-          </a:p>
-          <a:p>
-            <a:pPr marL="171450" indent="-171450">
-              <a:buFont typeface="Arial"/>
-              <a:buChar char="•"/>
-            </a:pPr>
-            <a:r>
-              <a:rPr lang="en-US" dirty="0" smtClean="0"/>
-              <a:t>Constraints on </a:t>
-            </a:r>
-            <a:r>
-              <a:rPr lang="en-US" dirty="0" err="1" smtClean="0"/>
-              <a:t>functor</a:t>
-            </a:r>
-            <a:r>
-              <a:rPr lang="en-US" dirty="0" smtClean="0"/>
-              <a:t> types can, and typically are, exploited in specific representations of relational data</a:t>
-            </a:r>
-          </a:p>
-          <a:p>
-            <a:pPr marL="171450" indent="-171450">
-              <a:buFont typeface="Arial"/>
-              <a:buChar char="•"/>
-            </a:pPr>
-            <a:r>
-              <a:rPr lang="en-US" dirty="0" smtClean="0"/>
-              <a:t>For example,</a:t>
-            </a:r>
-            <a:r>
-              <a:rPr lang="en-US" baseline="0" dirty="0" smtClean="0"/>
-              <a:t> functional or many-one relationships, see supplementary presentation</a:t>
-            </a:r>
-            <a:endParaRPr lang="en-US" dirty="0" smtClean="0"/>
-          </a:p>
-          <a:p>
+              <a:t>graphical representation for first-order structure</a:t>
+            </a:r>
             <a:endParaRPr lang="en-US" dirty="0"/>
           </a:p>
         </p:txBody>
@@ -5860,14 +5866,8 @@
           <a:bodyPr/>
           <a:lstStyle/>
           <a:p>
-            <a:pPr>
-              <a:defRPr/>
-            </a:pPr>
-            <a:fld id="{57BE7C63-45E8-3348-B2F7-0B0BBCE77ABE}" type="slidenum">
+            <a:fld id="{F6F03D15-B6FF-D14C-A60F-5A467C82F74A}" type="slidenum">
               <a:rPr lang="en-US" smtClean="0"/>
-              <a:pPr>
-                <a:defRPr/>
-              </a:pPr>
               <a:t>36</a:t>
             </a:fld>
             <a:endParaRPr lang="en-US"/>
@@ -5877,7 +5877,7 @@
     </p:spTree>
     <p:extLst>
       <p:ext uri="{BB962C8B-B14F-4D97-AF65-F5344CB8AC3E}">
-        <p14:creationId xmlns:p14="http://schemas.microsoft.com/office/powerpoint/2010/main" val="3651146937"/>
+        <p14:creationId xmlns:p14="http://schemas.microsoft.com/office/powerpoint/2010/main" val="245251814"/>
       </p:ext>
     </p:extLst>
   </p:cSld>
@@ -7272,7 +7272,7 @@
               <a:pPr>
                 <a:defRPr/>
               </a:pPr>
-              <a:t>2016-09-24</a:t>
+              <a:t>2016-10-06</a:t>
             </a:fld>
             <a:endParaRPr lang="en-US"/>
           </a:p>
@@ -7473,7 +7473,7 @@
               <a:pPr>
                 <a:defRPr/>
               </a:pPr>
-              <a:t>2016-09-24</a:t>
+              <a:t>2016-10-06</a:t>
             </a:fld>
             <a:endParaRPr lang="en-US"/>
           </a:p>
@@ -7684,7 +7684,7 @@
               <a:pPr>
                 <a:defRPr/>
               </a:pPr>
-              <a:t>2016-09-24</a:t>
+              <a:t>2016-10-06</a:t>
             </a:fld>
             <a:endParaRPr lang="en-US"/>
           </a:p>
@@ -7890,7 +7890,7 @@
               <a:pPr>
                 <a:defRPr/>
               </a:pPr>
-              <a:t>2016-09-24</a:t>
+              <a:t>2016-10-06</a:t>
             </a:fld>
             <a:endParaRPr lang="en-US"/>
           </a:p>
@@ -8409,7 +8409,7 @@
               <a:pPr>
                 <a:defRPr/>
               </a:pPr>
-              <a:t>2016-09-24</a:t>
+              <a:t>2016-10-06</a:t>
             </a:fld>
             <a:endParaRPr lang="en-US"/>
           </a:p>
@@ -8682,7 +8682,7 @@
               <a:pPr>
                 <a:defRPr/>
               </a:pPr>
-              <a:t>2016-09-24</a:t>
+              <a:t>2016-10-06</a:t>
             </a:fld>
             <a:endParaRPr lang="en-US"/>
           </a:p>
@@ -9080,7 +9080,7 @@
               <a:pPr>
                 <a:defRPr/>
               </a:pPr>
-              <a:t>2016-09-24</a:t>
+              <a:t>2016-10-06</a:t>
             </a:fld>
             <a:endParaRPr lang="en-US"/>
           </a:p>
@@ -9229,7 +9229,7 @@
               <a:pPr>
                 <a:defRPr/>
               </a:pPr>
-              <a:t>2016-09-24</a:t>
+              <a:t>2016-10-06</a:t>
             </a:fld>
             <a:endParaRPr lang="en-US"/>
           </a:p>
@@ -9355,7 +9355,7 @@
               <a:pPr>
                 <a:defRPr/>
               </a:pPr>
-              <a:t>2016-09-24</a:t>
+              <a:t>2016-10-06</a:t>
             </a:fld>
             <a:endParaRPr lang="en-US"/>
           </a:p>
@@ -9731,7 +9731,7 @@
               <a:pPr>
                 <a:defRPr/>
               </a:pPr>
-              <a:t>2016-09-24</a:t>
+              <a:t>2016-10-06</a:t>
             </a:fld>
             <a:endParaRPr lang="en-US"/>
           </a:p>
@@ -10154,7 +10154,7 @@
               <a:pPr>
                 <a:defRPr/>
               </a:pPr>
-              <a:t>2016-09-24</a:t>
+              <a:t>2016-10-06</a:t>
             </a:fld>
             <a:endParaRPr lang="en-US"/>
           </a:p>
@@ -10574,7 +10574,7 @@
               <a:pPr>
                 <a:defRPr/>
               </a:pPr>
-              <a:t>2016-09-24</a:t>
+              <a:t>2016-10-06</a:t>
             </a:fld>
             <a:endParaRPr lang="en-US"/>
           </a:p>
@@ -21693,6 +21693,2234 @@
         </p:nvSpPr>
         <p:spPr/>
         <p:txBody>
+          <a:bodyPr>
+            <a:normAutofit/>
+          </a:bodyPr>
+          <a:lstStyle/>
+          <a:p>
+            <a:r>
+              <a:rPr lang="en-US" dirty="0" smtClean="0"/>
+              <a:t>Learning From Relational Samples</a:t>
+            </a:r>
+            <a:endParaRPr lang="en-US" dirty="0"/>
+          </a:p>
+        </p:txBody>
+      </p:sp>
+      <p:sp>
+        <p:nvSpPr>
+          <p:cNvPr id="3" name="Content Placeholder 2"/>
+          <p:cNvSpPr>
+            <a:spLocks noGrp="1"/>
+          </p:cNvSpPr>
+          <p:nvPr>
+            <p:ph idx="1"/>
+          </p:nvPr>
+        </p:nvSpPr>
+        <p:spPr>
+          <a:xfrm>
+            <a:off x="358191" y="1580438"/>
+            <a:ext cx="8531414" cy="4201327"/>
+          </a:xfrm>
+        </p:spPr>
+        <p:txBody>
+          <a:bodyPr/>
+          <a:lstStyle/>
+          <a:p>
+            <a:r>
+              <a:rPr lang="en-US" sz="2800" dirty="0" smtClean="0"/>
+              <a:t>A </a:t>
+            </a:r>
+            <a:r>
+              <a:rPr lang="en-US" sz="2800" b="1" dirty="0" smtClean="0"/>
+              <a:t>sample</a:t>
+            </a:r>
+            <a:r>
+              <a:rPr lang="en-US" sz="2800" dirty="0" smtClean="0"/>
+              <a:t> specifies </a:t>
+            </a:r>
+          </a:p>
+          <a:p>
+            <a:pPr lvl="1"/>
+            <a:r>
+              <a:rPr lang="en-US" dirty="0" smtClean="0"/>
+              <a:t>a set of observed individuals</a:t>
+            </a:r>
+            <a:endParaRPr lang="en-US" dirty="0"/>
+          </a:p>
+          <a:p>
+            <a:pPr lvl="1"/>
+            <a:r>
+              <a:rPr lang="en-US" dirty="0" smtClean="0"/>
+              <a:t>For each tuple of observed individuals</a:t>
+            </a:r>
+            <a:r>
+              <a:rPr lang="en-US" dirty="0"/>
+              <a:t>,</a:t>
+            </a:r>
+            <a:r>
+              <a:rPr lang="en-US" dirty="0" smtClean="0"/>
+              <a:t>  </a:t>
+            </a:r>
+            <a:br>
+              <a:rPr lang="en-US" dirty="0" smtClean="0"/>
+            </a:br>
+            <a:r>
+              <a:rPr lang="en-US" dirty="0" smtClean="0"/>
+              <a:t>the argument value for each </a:t>
+            </a:r>
+            <a:r>
+              <a:rPr lang="en-US" dirty="0" err="1" smtClean="0"/>
+              <a:t>functor</a:t>
+            </a:r>
+            <a:endParaRPr lang="en-US" dirty="0" smtClean="0"/>
+          </a:p>
+          <a:p>
+            <a:pPr marL="457200" lvl="1" indent="0">
+              <a:buNone/>
+            </a:pPr>
+            <a:r>
+              <a:rPr lang="en-US" dirty="0" smtClean="0"/>
+              <a:t>= possible world restricted to observed individuals</a:t>
+            </a:r>
+          </a:p>
+          <a:p>
+            <a:r>
+              <a:rPr lang="en-US" sz="2800" dirty="0" smtClean="0"/>
+              <a:t>As with IID samples, we may have missing data =</a:t>
+            </a:r>
+            <a:br>
+              <a:rPr lang="en-US" sz="2800" dirty="0" smtClean="0"/>
+            </a:br>
+            <a:r>
+              <a:rPr lang="en-US" sz="2800" dirty="0" smtClean="0"/>
+              <a:t>missing values for some arguments of a </a:t>
+            </a:r>
+            <a:r>
+              <a:rPr lang="en-US" sz="2800" dirty="0" err="1" smtClean="0"/>
+              <a:t>functor</a:t>
+            </a:r>
+            <a:endParaRPr lang="en-US" sz="2800" dirty="0" smtClean="0"/>
+          </a:p>
+          <a:p>
+            <a:r>
+              <a:rPr lang="en-US" sz="2800" i="1" dirty="0" smtClean="0"/>
+              <a:t>Relational learning</a:t>
+            </a:r>
+            <a:r>
+              <a:rPr lang="en-US" sz="2800" dirty="0" smtClean="0"/>
+              <a:t>: given observed values of functions, extrapolate to unobserved values</a:t>
+            </a:r>
+          </a:p>
+        </p:txBody>
+      </p:sp>
+      <p:sp>
+        <p:nvSpPr>
+          <p:cNvPr id="5" name="Footer Placeholder 4"/>
+          <p:cNvSpPr>
+            <a:spLocks noGrp="1"/>
+          </p:cNvSpPr>
+          <p:nvPr>
+            <p:ph type="ftr" sz="quarter" idx="11"/>
+          </p:nvPr>
+        </p:nvSpPr>
+        <p:spPr>
+          <a:xfrm>
+            <a:off x="702743" y="6058239"/>
+            <a:ext cx="6638908" cy="457200"/>
+          </a:xfrm>
+        </p:spPr>
+        <p:txBody>
+          <a:bodyPr/>
+          <a:lstStyle/>
+          <a:p>
+            <a:pPr>
+              <a:defRPr/>
+            </a:pPr>
+            <a:r>
+              <a:rPr lang="en-US" dirty="0" smtClean="0"/>
+              <a:t>Xiang, R. &amp; Neville, J. (2011), Relational learning with one network: An asymptotic analysis, in 'Artificial Intelligence and Statistics', pp. 779--788.</a:t>
+            </a:r>
+            <a:endParaRPr lang="en-US" dirty="0"/>
+          </a:p>
+        </p:txBody>
+      </p:sp>
+    </p:spTree>
+    <p:extLst>
+      <p:ext uri="{BB962C8B-B14F-4D97-AF65-F5344CB8AC3E}">
+        <p14:creationId xmlns:p14="http://schemas.microsoft.com/office/powerpoint/2010/main" val="3876270619"/>
+      </p:ext>
+    </p:extLst>
+  </p:cSld>
+  <p:clrMapOvr>
+    <a:masterClrMapping/>
+  </p:clrMapOvr>
+  <p:timing>
+    <p:tnLst>
+      <p:par>
+        <p:cTn xmlns:p14="http://schemas.microsoft.com/office/powerpoint/2010/main" id="1" dur="indefinite" restart="never" nodeType="tmRoot"/>
+      </p:par>
+    </p:tnLst>
+  </p:timing>
+</p:sld>
+</file>
+
+<file path=ppt/slides/slide32.xml><?xml version="1.0" encoding="utf-8"?>
+<p:sld xmlns:a="http://schemas.openxmlformats.org/drawingml/2006/main" xmlns:r="http://schemas.openxmlformats.org/officeDocument/2006/relationships" xmlns:p="http://schemas.openxmlformats.org/presentationml/2006/main">
+  <p:cSld>
+    <p:spTree>
+      <p:nvGrpSpPr>
+        <p:cNvPr id="1" name=""/>
+        <p:cNvGrpSpPr/>
+        <p:nvPr/>
+      </p:nvGrpSpPr>
+      <p:grpSpPr>
+        <a:xfrm>
+          <a:off x="0" y="0"/>
+          <a:ext cx="0" cy="0"/>
+          <a:chOff x="0" y="0"/>
+          <a:chExt cx="0" cy="0"/>
+        </a:xfrm>
+      </p:grpSpPr>
+      <p:sp>
+        <p:nvSpPr>
+          <p:cNvPr id="4" name="Title 3"/>
+          <p:cNvSpPr>
+            <a:spLocks noGrp="1"/>
+          </p:cNvSpPr>
+          <p:nvPr>
+            <p:ph type="title"/>
+          </p:nvPr>
+        </p:nvSpPr>
+        <p:spPr/>
+        <p:txBody>
+          <a:bodyPr>
+            <a:normAutofit/>
+          </a:bodyPr>
+          <a:lstStyle/>
+          <a:p>
+            <a:r>
+              <a:rPr lang="en-US" dirty="0" smtClean="0"/>
+              <a:t>Example: Sample</a:t>
+            </a:r>
+            <a:endParaRPr lang="en-US" dirty="0"/>
+          </a:p>
+        </p:txBody>
+      </p:sp>
+      <p:pic>
+        <p:nvPicPr>
+          <p:cNvPr id="24" name="Picture 23" descr="buscemi.jpeg"/>
+          <p:cNvPicPr>
+            <a:picLocks noChangeAspect="1"/>
+          </p:cNvPicPr>
+          <p:nvPr/>
+        </p:nvPicPr>
+        <p:blipFill>
+          <a:blip r:embed="rId3">
+            <a:extLst>
+              <a:ext uri="{28A0092B-C50C-407E-A947-70E740481C1C}">
+                <a14:useLocalDpi xmlns:a14="http://schemas.microsoft.com/office/drawing/2010/main" val="0"/>
+              </a:ext>
+            </a:extLst>
+          </a:blip>
+          <a:stretch>
+            <a:fillRect/>
+          </a:stretch>
+        </p:blipFill>
+        <p:spPr>
+          <a:xfrm>
+            <a:off x="1412723" y="1997927"/>
+            <a:ext cx="852307" cy="1262529"/>
+          </a:xfrm>
+          <a:prstGeom prst="rect">
+            <a:avLst/>
+          </a:prstGeom>
+        </p:spPr>
+      </p:pic>
+      <p:pic>
+        <p:nvPicPr>
+          <p:cNvPr id="29" name="Picture 28" descr="thurman.jpeg"/>
+          <p:cNvPicPr>
+            <a:picLocks noChangeAspect="1"/>
+          </p:cNvPicPr>
+          <p:nvPr/>
+        </p:nvPicPr>
+        <p:blipFill>
+          <a:blip r:embed="rId4">
+            <a:extLst>
+              <a:ext uri="{28A0092B-C50C-407E-A947-70E740481C1C}">
+                <a14:useLocalDpi xmlns:a14="http://schemas.microsoft.com/office/drawing/2010/main" val="0"/>
+              </a:ext>
+            </a:extLst>
+          </a:blip>
+          <a:stretch>
+            <a:fillRect/>
+          </a:stretch>
+        </p:blipFill>
+        <p:spPr>
+          <a:xfrm>
+            <a:off x="3183979" y="2006891"/>
+            <a:ext cx="850900" cy="1244600"/>
+          </a:xfrm>
+          <a:prstGeom prst="rect">
+            <a:avLst/>
+          </a:prstGeom>
+        </p:spPr>
+      </p:pic>
+      <p:sp>
+        <p:nvSpPr>
+          <p:cNvPr id="2" name="TextBox 1"/>
+          <p:cNvSpPr txBox="1"/>
+          <p:nvPr/>
+        </p:nvSpPr>
+        <p:spPr>
+          <a:xfrm>
+            <a:off x="1009408" y="3740537"/>
+            <a:ext cx="913778" cy="707886"/>
+          </a:xfrm>
+          <a:prstGeom prst="rect">
+            <a:avLst/>
+          </a:prstGeom>
+          <a:noFill/>
+        </p:spPr>
+        <p:txBody>
+          <a:bodyPr wrap="square" rtlCol="0">
+            <a:spAutoFit/>
+          </a:bodyPr>
+          <a:lstStyle/>
+          <a:p>
+            <a:r>
+              <a:rPr lang="en-US" sz="2000" dirty="0" smtClean="0">
+                <a:solidFill>
+                  <a:srgbClr val="FF0000"/>
+                </a:solidFill>
+                <a:latin typeface="+mn-lt"/>
+              </a:rPr>
+              <a:t>True</a:t>
+            </a:r>
+          </a:p>
+          <a:p>
+            <a:r>
+              <a:rPr lang="en-US" sz="2000" dirty="0" smtClean="0">
+                <a:solidFill>
+                  <a:srgbClr val="FF0000"/>
+                </a:solidFill>
+                <a:latin typeface="+mn-lt"/>
+              </a:rPr>
+              <a:t>$500K</a:t>
+            </a:r>
+            <a:endParaRPr lang="en-US" sz="2000" dirty="0">
+              <a:solidFill>
+                <a:srgbClr val="FF0000"/>
+              </a:solidFill>
+              <a:latin typeface="+mn-lt"/>
+            </a:endParaRPr>
+          </a:p>
+        </p:txBody>
+      </p:sp>
+      <p:sp>
+        <p:nvSpPr>
+          <p:cNvPr id="40" name="TextBox 39"/>
+          <p:cNvSpPr txBox="1"/>
+          <p:nvPr/>
+        </p:nvSpPr>
+        <p:spPr>
+          <a:xfrm>
+            <a:off x="3609429" y="3740537"/>
+            <a:ext cx="791883" cy="707886"/>
+          </a:xfrm>
+          <a:prstGeom prst="rect">
+            <a:avLst/>
+          </a:prstGeom>
+          <a:noFill/>
+        </p:spPr>
+        <p:txBody>
+          <a:bodyPr wrap="square" rtlCol="0">
+            <a:spAutoFit/>
+          </a:bodyPr>
+          <a:lstStyle/>
+          <a:p>
+            <a:r>
+              <a:rPr lang="en-US" sz="2000" dirty="0" smtClean="0">
+                <a:solidFill>
+                  <a:srgbClr val="FF0000"/>
+                </a:solidFill>
+                <a:latin typeface="+mn-lt"/>
+              </a:rPr>
+              <a:t>True</a:t>
+            </a:r>
+          </a:p>
+          <a:p>
+            <a:r>
+              <a:rPr lang="en-US" sz="2000" dirty="0" smtClean="0">
+                <a:solidFill>
+                  <a:srgbClr val="FF0000"/>
+                </a:solidFill>
+                <a:latin typeface="+mn-lt"/>
+              </a:rPr>
+              <a:t>$5M</a:t>
+            </a:r>
+            <a:endParaRPr lang="en-US" sz="2000" dirty="0">
+              <a:solidFill>
+                <a:srgbClr val="FF0000"/>
+              </a:solidFill>
+              <a:latin typeface="+mn-lt"/>
+            </a:endParaRPr>
+          </a:p>
+        </p:txBody>
+      </p:sp>
+      <p:cxnSp>
+        <p:nvCxnSpPr>
+          <p:cNvPr id="9" name="Straight Arrow Connector 8"/>
+          <p:cNvCxnSpPr>
+            <a:stCxn id="29" idx="2"/>
+            <a:endCxn id="55" idx="0"/>
+          </p:cNvCxnSpPr>
+          <p:nvPr/>
+        </p:nvCxnSpPr>
+        <p:spPr>
+          <a:xfrm flipH="1">
+            <a:off x="3377434" y="3251491"/>
+            <a:ext cx="231995" cy="489046"/>
+          </a:xfrm>
+          <a:prstGeom prst="straightConnector1">
+            <a:avLst/>
+          </a:prstGeom>
+          <a:ln>
+            <a:tailEnd type="arrow"/>
+          </a:ln>
+        </p:spPr>
+        <p:style>
+          <a:lnRef idx="2">
+            <a:schemeClr val="accent1"/>
+          </a:lnRef>
+          <a:fillRef idx="0">
+            <a:schemeClr val="accent1"/>
+          </a:fillRef>
+          <a:effectRef idx="1">
+            <a:schemeClr val="accent1"/>
+          </a:effectRef>
+          <a:fontRef idx="minor">
+            <a:schemeClr val="tx1"/>
+          </a:fontRef>
+        </p:style>
+      </p:cxnSp>
+      <p:sp>
+        <p:nvSpPr>
+          <p:cNvPr id="58" name="TextBox 57"/>
+          <p:cNvSpPr txBox="1"/>
+          <p:nvPr/>
+        </p:nvSpPr>
+        <p:spPr>
+          <a:xfrm>
+            <a:off x="4542069" y="3716790"/>
+            <a:ext cx="1051921" cy="707886"/>
+          </a:xfrm>
+          <a:prstGeom prst="rect">
+            <a:avLst/>
+          </a:prstGeom>
+          <a:noFill/>
+        </p:spPr>
+        <p:txBody>
+          <a:bodyPr wrap="square" rtlCol="0">
+            <a:spAutoFit/>
+          </a:bodyPr>
+          <a:lstStyle/>
+          <a:p>
+            <a:r>
+              <a:rPr lang="en-US" sz="2000" dirty="0" smtClean="0">
+                <a:solidFill>
+                  <a:srgbClr val="3366FF"/>
+                </a:solidFill>
+                <a:latin typeface="+mn-lt"/>
+              </a:rPr>
+              <a:t>ActsIn</a:t>
+            </a:r>
+          </a:p>
+          <a:p>
+            <a:r>
+              <a:rPr lang="en-US" sz="2000" dirty="0" smtClean="0">
+                <a:solidFill>
+                  <a:srgbClr val="3366FF"/>
+                </a:solidFill>
+                <a:latin typeface="+mn-lt"/>
+              </a:rPr>
+              <a:t>salary</a:t>
+            </a:r>
+            <a:endParaRPr lang="en-US" sz="2000" dirty="0">
+              <a:solidFill>
+                <a:srgbClr val="3366FF"/>
+              </a:solidFill>
+              <a:latin typeface="+mn-lt"/>
+            </a:endParaRPr>
+          </a:p>
+        </p:txBody>
+      </p:sp>
+      <p:pic>
+        <p:nvPicPr>
+          <p:cNvPr id="37" name="Picture 36" descr="fargo.jpeg"/>
+          <p:cNvPicPr>
+            <a:picLocks noChangeAspect="1"/>
+          </p:cNvPicPr>
+          <p:nvPr/>
+        </p:nvPicPr>
+        <p:blipFill>
+          <a:blip r:embed="rId5">
+            <a:extLst>
+              <a:ext uri="{28A0092B-C50C-407E-A947-70E740481C1C}">
+                <a14:useLocalDpi xmlns:a14="http://schemas.microsoft.com/office/drawing/2010/main" val="0"/>
+              </a:ext>
+            </a:extLst>
+          </a:blip>
+          <a:stretch>
+            <a:fillRect/>
+          </a:stretch>
+        </p:blipFill>
+        <p:spPr>
+          <a:xfrm>
+            <a:off x="1092337" y="4549577"/>
+            <a:ext cx="637786" cy="1084617"/>
+          </a:xfrm>
+          <a:prstGeom prst="rect">
+            <a:avLst/>
+          </a:prstGeom>
+        </p:spPr>
+      </p:pic>
+      <p:pic>
+        <p:nvPicPr>
+          <p:cNvPr id="38" name="Picture 37" descr="kill-bill.jpeg"/>
+          <p:cNvPicPr>
+            <a:picLocks noChangeAspect="1"/>
+          </p:cNvPicPr>
+          <p:nvPr/>
+        </p:nvPicPr>
+        <p:blipFill>
+          <a:blip r:embed="rId6">
+            <a:extLst>
+              <a:ext uri="{28A0092B-C50C-407E-A947-70E740481C1C}">
+                <a14:useLocalDpi xmlns:a14="http://schemas.microsoft.com/office/drawing/2010/main" val="0"/>
+              </a:ext>
+            </a:extLst>
+          </a:blip>
+          <a:stretch>
+            <a:fillRect/>
+          </a:stretch>
+        </p:blipFill>
+        <p:spPr>
+          <a:xfrm>
+            <a:off x="1864690" y="4596475"/>
+            <a:ext cx="559954" cy="990820"/>
+          </a:xfrm>
+          <a:prstGeom prst="rect">
+            <a:avLst/>
+          </a:prstGeom>
+        </p:spPr>
+      </p:pic>
+      <p:pic>
+        <p:nvPicPr>
+          <p:cNvPr id="41" name="Picture 40" descr="fargo.jpeg"/>
+          <p:cNvPicPr>
+            <a:picLocks noChangeAspect="1"/>
+          </p:cNvPicPr>
+          <p:nvPr/>
+        </p:nvPicPr>
+        <p:blipFill>
+          <a:blip r:embed="rId5">
+            <a:extLst>
+              <a:ext uri="{28A0092B-C50C-407E-A947-70E740481C1C}">
+                <a14:useLocalDpi xmlns:a14="http://schemas.microsoft.com/office/drawing/2010/main" val="0"/>
+              </a:ext>
+            </a:extLst>
+          </a:blip>
+          <a:stretch>
+            <a:fillRect/>
+          </a:stretch>
+        </p:blipFill>
+        <p:spPr>
+          <a:xfrm>
+            <a:off x="3016061" y="4549577"/>
+            <a:ext cx="637786" cy="1084617"/>
+          </a:xfrm>
+          <a:prstGeom prst="rect">
+            <a:avLst/>
+          </a:prstGeom>
+        </p:spPr>
+      </p:pic>
+      <p:pic>
+        <p:nvPicPr>
+          <p:cNvPr id="42" name="Picture 41" descr="kill-bill.jpeg"/>
+          <p:cNvPicPr>
+            <a:picLocks noChangeAspect="1"/>
+          </p:cNvPicPr>
+          <p:nvPr/>
+        </p:nvPicPr>
+        <p:blipFill>
+          <a:blip r:embed="rId6">
+            <a:extLst>
+              <a:ext uri="{28A0092B-C50C-407E-A947-70E740481C1C}">
+                <a14:useLocalDpi xmlns:a14="http://schemas.microsoft.com/office/drawing/2010/main" val="0"/>
+              </a:ext>
+            </a:extLst>
+          </a:blip>
+          <a:stretch>
+            <a:fillRect/>
+          </a:stretch>
+        </p:blipFill>
+        <p:spPr>
+          <a:xfrm>
+            <a:off x="3788414" y="4596475"/>
+            <a:ext cx="559954" cy="990820"/>
+          </a:xfrm>
+          <a:prstGeom prst="rect">
+            <a:avLst/>
+          </a:prstGeom>
+        </p:spPr>
+      </p:pic>
+      <p:sp>
+        <p:nvSpPr>
+          <p:cNvPr id="52" name="TextBox 51"/>
+          <p:cNvSpPr txBox="1"/>
+          <p:nvPr/>
+        </p:nvSpPr>
+        <p:spPr>
+          <a:xfrm>
+            <a:off x="1851470" y="3740537"/>
+            <a:ext cx="791883" cy="707886"/>
+          </a:xfrm>
+          <a:prstGeom prst="rect">
+            <a:avLst/>
+          </a:prstGeom>
+          <a:noFill/>
+        </p:spPr>
+        <p:txBody>
+          <a:bodyPr wrap="square" rtlCol="0">
+            <a:spAutoFit/>
+          </a:bodyPr>
+          <a:lstStyle/>
+          <a:p>
+            <a:r>
+              <a:rPr lang="en-US" sz="2000" dirty="0" smtClean="0">
+                <a:solidFill>
+                  <a:srgbClr val="FF0000"/>
+                </a:solidFill>
+                <a:latin typeface="+mn-lt"/>
+              </a:rPr>
+              <a:t>False</a:t>
+            </a:r>
+          </a:p>
+          <a:p>
+            <a:r>
+              <a:rPr lang="en-US" sz="2000" dirty="0" smtClean="0">
+                <a:solidFill>
+                  <a:srgbClr val="FF0000"/>
+                </a:solidFill>
+                <a:latin typeface="+mn-lt"/>
+              </a:rPr>
+              <a:t>n/a</a:t>
+            </a:r>
+            <a:endParaRPr lang="en-US" sz="2000" dirty="0">
+              <a:solidFill>
+                <a:srgbClr val="FF0000"/>
+              </a:solidFill>
+              <a:latin typeface="+mn-lt"/>
+            </a:endParaRPr>
+          </a:p>
+        </p:txBody>
+      </p:sp>
+      <p:sp>
+        <p:nvSpPr>
+          <p:cNvPr id="55" name="TextBox 54"/>
+          <p:cNvSpPr txBox="1"/>
+          <p:nvPr/>
+        </p:nvSpPr>
+        <p:spPr>
+          <a:xfrm>
+            <a:off x="2981492" y="3740537"/>
+            <a:ext cx="791883" cy="707886"/>
+          </a:xfrm>
+          <a:prstGeom prst="rect">
+            <a:avLst/>
+          </a:prstGeom>
+          <a:noFill/>
+        </p:spPr>
+        <p:txBody>
+          <a:bodyPr wrap="square" rtlCol="0">
+            <a:spAutoFit/>
+          </a:bodyPr>
+          <a:lstStyle/>
+          <a:p>
+            <a:r>
+              <a:rPr lang="en-US" sz="2000" dirty="0" smtClean="0">
+                <a:solidFill>
+                  <a:srgbClr val="FF0000"/>
+                </a:solidFill>
+                <a:latin typeface="+mn-lt"/>
+              </a:rPr>
+              <a:t>False</a:t>
+            </a:r>
+          </a:p>
+          <a:p>
+            <a:r>
+              <a:rPr lang="en-US" sz="2000" dirty="0" smtClean="0">
+                <a:solidFill>
+                  <a:srgbClr val="FF0000"/>
+                </a:solidFill>
+                <a:latin typeface="+mn-lt"/>
+              </a:rPr>
+              <a:t>n/a</a:t>
+            </a:r>
+            <a:endParaRPr lang="en-US" sz="2000" dirty="0">
+              <a:solidFill>
+                <a:srgbClr val="FF0000"/>
+              </a:solidFill>
+              <a:latin typeface="+mn-lt"/>
+            </a:endParaRPr>
+          </a:p>
+        </p:txBody>
+      </p:sp>
+      <p:cxnSp>
+        <p:nvCxnSpPr>
+          <p:cNvPr id="53" name="Straight Arrow Connector 52"/>
+          <p:cNvCxnSpPr>
+            <a:stCxn id="37" idx="0"/>
+          </p:cNvCxnSpPr>
+          <p:nvPr/>
+        </p:nvCxnSpPr>
+        <p:spPr>
+          <a:xfrm flipV="1">
+            <a:off x="1411230" y="4372373"/>
+            <a:ext cx="1493" cy="177204"/>
+          </a:xfrm>
+          <a:prstGeom prst="straightConnector1">
+            <a:avLst/>
+          </a:prstGeom>
+          <a:ln>
+            <a:tailEnd type="arrow"/>
+          </a:ln>
+        </p:spPr>
+        <p:style>
+          <a:lnRef idx="2">
+            <a:schemeClr val="accent1"/>
+          </a:lnRef>
+          <a:fillRef idx="0">
+            <a:schemeClr val="accent1"/>
+          </a:fillRef>
+          <a:effectRef idx="1">
+            <a:schemeClr val="accent1"/>
+          </a:effectRef>
+          <a:fontRef idx="minor">
+            <a:schemeClr val="tx1"/>
+          </a:fontRef>
+        </p:style>
+      </p:cxnSp>
+      <p:cxnSp>
+        <p:nvCxnSpPr>
+          <p:cNvPr id="60" name="Straight Arrow Connector 59"/>
+          <p:cNvCxnSpPr>
+            <a:stCxn id="38" idx="0"/>
+          </p:cNvCxnSpPr>
+          <p:nvPr/>
+        </p:nvCxnSpPr>
+        <p:spPr>
+          <a:xfrm flipV="1">
+            <a:off x="2144667" y="4372373"/>
+            <a:ext cx="0" cy="224102"/>
+          </a:xfrm>
+          <a:prstGeom prst="straightConnector1">
+            <a:avLst/>
+          </a:prstGeom>
+          <a:ln>
+            <a:tailEnd type="arrow"/>
+          </a:ln>
+        </p:spPr>
+        <p:style>
+          <a:lnRef idx="2">
+            <a:schemeClr val="accent1"/>
+          </a:lnRef>
+          <a:fillRef idx="0">
+            <a:schemeClr val="accent1"/>
+          </a:fillRef>
+          <a:effectRef idx="1">
+            <a:schemeClr val="accent1"/>
+          </a:effectRef>
+          <a:fontRef idx="minor">
+            <a:schemeClr val="tx1"/>
+          </a:fontRef>
+        </p:style>
+      </p:cxnSp>
+      <p:cxnSp>
+        <p:nvCxnSpPr>
+          <p:cNvPr id="62" name="Straight Arrow Connector 61"/>
+          <p:cNvCxnSpPr>
+            <a:stCxn id="41" idx="0"/>
+          </p:cNvCxnSpPr>
+          <p:nvPr/>
+        </p:nvCxnSpPr>
+        <p:spPr>
+          <a:xfrm flipV="1">
+            <a:off x="3334954" y="4372373"/>
+            <a:ext cx="0" cy="177204"/>
+          </a:xfrm>
+          <a:prstGeom prst="straightConnector1">
+            <a:avLst/>
+          </a:prstGeom>
+          <a:ln>
+            <a:tailEnd type="arrow"/>
+          </a:ln>
+        </p:spPr>
+        <p:style>
+          <a:lnRef idx="2">
+            <a:schemeClr val="accent1"/>
+          </a:lnRef>
+          <a:fillRef idx="0">
+            <a:schemeClr val="accent1"/>
+          </a:fillRef>
+          <a:effectRef idx="1">
+            <a:schemeClr val="accent1"/>
+          </a:effectRef>
+          <a:fontRef idx="minor">
+            <a:schemeClr val="tx1"/>
+          </a:fontRef>
+        </p:style>
+      </p:cxnSp>
+      <p:cxnSp>
+        <p:nvCxnSpPr>
+          <p:cNvPr id="64" name="Straight Arrow Connector 63"/>
+          <p:cNvCxnSpPr>
+            <a:stCxn id="42" idx="0"/>
+          </p:cNvCxnSpPr>
+          <p:nvPr/>
+        </p:nvCxnSpPr>
+        <p:spPr>
+          <a:xfrm flipH="1" flipV="1">
+            <a:off x="4034879" y="4372373"/>
+            <a:ext cx="33512" cy="224102"/>
+          </a:xfrm>
+          <a:prstGeom prst="straightConnector1">
+            <a:avLst/>
+          </a:prstGeom>
+          <a:ln>
+            <a:tailEnd type="arrow"/>
+          </a:ln>
+        </p:spPr>
+        <p:style>
+          <a:lnRef idx="2">
+            <a:schemeClr val="accent1"/>
+          </a:lnRef>
+          <a:fillRef idx="0">
+            <a:schemeClr val="accent1"/>
+          </a:fillRef>
+          <a:effectRef idx="1">
+            <a:schemeClr val="accent1"/>
+          </a:effectRef>
+          <a:fontRef idx="minor">
+            <a:schemeClr val="tx1"/>
+          </a:fontRef>
+        </p:style>
+      </p:cxnSp>
+      <p:cxnSp>
+        <p:nvCxnSpPr>
+          <p:cNvPr id="71" name="Straight Arrow Connector 70"/>
+          <p:cNvCxnSpPr>
+            <a:stCxn id="29" idx="2"/>
+          </p:cNvCxnSpPr>
+          <p:nvPr/>
+        </p:nvCxnSpPr>
+        <p:spPr>
+          <a:xfrm>
+            <a:off x="3609429" y="3251491"/>
+            <a:ext cx="290232" cy="414787"/>
+          </a:xfrm>
+          <a:prstGeom prst="straightConnector1">
+            <a:avLst/>
+          </a:prstGeom>
+          <a:ln>
+            <a:tailEnd type="arrow"/>
+          </a:ln>
+        </p:spPr>
+        <p:style>
+          <a:lnRef idx="2">
+            <a:schemeClr val="accent1"/>
+          </a:lnRef>
+          <a:fillRef idx="0">
+            <a:schemeClr val="accent1"/>
+          </a:fillRef>
+          <a:effectRef idx="1">
+            <a:schemeClr val="accent1"/>
+          </a:effectRef>
+          <a:fontRef idx="minor">
+            <a:schemeClr val="tx1"/>
+          </a:fontRef>
+        </p:style>
+      </p:cxnSp>
+      <p:cxnSp>
+        <p:nvCxnSpPr>
+          <p:cNvPr id="76" name="Straight Arrow Connector 75"/>
+          <p:cNvCxnSpPr>
+            <a:stCxn id="24" idx="2"/>
+            <a:endCxn id="2" idx="0"/>
+          </p:cNvCxnSpPr>
+          <p:nvPr/>
+        </p:nvCxnSpPr>
+        <p:spPr>
+          <a:xfrm flipH="1">
+            <a:off x="1466297" y="3260456"/>
+            <a:ext cx="372580" cy="480081"/>
+          </a:xfrm>
+          <a:prstGeom prst="straightConnector1">
+            <a:avLst/>
+          </a:prstGeom>
+          <a:ln>
+            <a:tailEnd type="arrow"/>
+          </a:ln>
+        </p:spPr>
+        <p:style>
+          <a:lnRef idx="2">
+            <a:schemeClr val="accent1"/>
+          </a:lnRef>
+          <a:fillRef idx="0">
+            <a:schemeClr val="accent1"/>
+          </a:fillRef>
+          <a:effectRef idx="1">
+            <a:schemeClr val="accent1"/>
+          </a:effectRef>
+          <a:fontRef idx="minor">
+            <a:schemeClr val="tx1"/>
+          </a:fontRef>
+        </p:style>
+      </p:cxnSp>
+      <p:cxnSp>
+        <p:nvCxnSpPr>
+          <p:cNvPr id="78" name="Straight Arrow Connector 77"/>
+          <p:cNvCxnSpPr>
+            <a:stCxn id="24" idx="2"/>
+            <a:endCxn id="52" idx="0"/>
+          </p:cNvCxnSpPr>
+          <p:nvPr/>
+        </p:nvCxnSpPr>
+        <p:spPr>
+          <a:xfrm>
+            <a:off x="1838877" y="3260456"/>
+            <a:ext cx="408535" cy="480081"/>
+          </a:xfrm>
+          <a:prstGeom prst="straightConnector1">
+            <a:avLst/>
+          </a:prstGeom>
+          <a:ln>
+            <a:tailEnd type="arrow"/>
+          </a:ln>
+        </p:spPr>
+        <p:style>
+          <a:lnRef idx="2">
+            <a:schemeClr val="accent1"/>
+          </a:lnRef>
+          <a:fillRef idx="0">
+            <a:schemeClr val="accent1"/>
+          </a:fillRef>
+          <a:effectRef idx="1">
+            <a:schemeClr val="accent1"/>
+          </a:effectRef>
+          <a:fontRef idx="minor">
+            <a:schemeClr val="tx1"/>
+          </a:fontRef>
+        </p:style>
+      </p:cxnSp>
+      <p:sp>
+        <p:nvSpPr>
+          <p:cNvPr id="86" name="TextBox 85"/>
+          <p:cNvSpPr txBox="1"/>
+          <p:nvPr/>
+        </p:nvSpPr>
+        <p:spPr>
+          <a:xfrm>
+            <a:off x="2913317" y="5920910"/>
+            <a:ext cx="2085944" cy="707886"/>
+          </a:xfrm>
+          <a:prstGeom prst="rect">
+            <a:avLst/>
+          </a:prstGeom>
+          <a:noFill/>
+        </p:spPr>
+        <p:txBody>
+          <a:bodyPr wrap="square" rtlCol="0">
+            <a:spAutoFit/>
+          </a:bodyPr>
+          <a:lstStyle/>
+          <a:p>
+            <a:r>
+              <a:rPr lang="en-US" sz="2000" dirty="0" smtClean="0">
+                <a:solidFill>
+                  <a:srgbClr val="3366FF"/>
+                </a:solidFill>
+                <a:latin typeface="+mn-lt"/>
+              </a:rPr>
+              <a:t>runtime</a:t>
+            </a:r>
+            <a:r>
+              <a:rPr lang="en-US" sz="2000" dirty="0" smtClean="0">
+                <a:latin typeface="+mn-lt"/>
+              </a:rPr>
+              <a:t> = </a:t>
+            </a:r>
+            <a:r>
+              <a:rPr lang="en-US" sz="2000" dirty="0" smtClean="0">
+                <a:solidFill>
+                  <a:srgbClr val="FF0000"/>
+                </a:solidFill>
+                <a:latin typeface="+mn-lt"/>
+              </a:rPr>
+              <a:t>111 min</a:t>
+            </a:r>
+          </a:p>
+          <a:p>
+            <a:r>
+              <a:rPr lang="en-US" sz="2000" dirty="0">
+                <a:solidFill>
+                  <a:srgbClr val="3366FF"/>
+                </a:solidFill>
+                <a:latin typeface="+mn-lt"/>
+              </a:rPr>
+              <a:t>drama</a:t>
+            </a:r>
+            <a:r>
+              <a:rPr lang="en-US" sz="2000" dirty="0">
+                <a:latin typeface="+mn-lt"/>
+              </a:rPr>
+              <a:t> = </a:t>
+            </a:r>
+            <a:r>
+              <a:rPr lang="en-US" sz="2000" dirty="0">
+                <a:solidFill>
+                  <a:srgbClr val="FF0000"/>
+                </a:solidFill>
+                <a:latin typeface="+mn-lt"/>
+              </a:rPr>
+              <a:t>false</a:t>
+            </a:r>
+          </a:p>
+        </p:txBody>
+      </p:sp>
+      <p:cxnSp>
+        <p:nvCxnSpPr>
+          <p:cNvPr id="88" name="Straight Connector 87"/>
+          <p:cNvCxnSpPr/>
+          <p:nvPr/>
+        </p:nvCxnSpPr>
+        <p:spPr>
+          <a:xfrm>
+            <a:off x="1411230" y="5673884"/>
+            <a:ext cx="0" cy="286716"/>
+          </a:xfrm>
+          <a:prstGeom prst="line">
+            <a:avLst/>
+          </a:prstGeom>
+        </p:spPr>
+        <p:style>
+          <a:lnRef idx="2">
+            <a:schemeClr val="accent1"/>
+          </a:lnRef>
+          <a:fillRef idx="0">
+            <a:schemeClr val="accent1"/>
+          </a:fillRef>
+          <a:effectRef idx="1">
+            <a:schemeClr val="accent1"/>
+          </a:effectRef>
+          <a:fontRef idx="minor">
+            <a:schemeClr val="tx1"/>
+          </a:fontRef>
+        </p:style>
+      </p:cxnSp>
+      <p:sp>
+        <p:nvSpPr>
+          <p:cNvPr id="3" name="TextBox 2"/>
+          <p:cNvSpPr txBox="1"/>
+          <p:nvPr/>
+        </p:nvSpPr>
+        <p:spPr>
+          <a:xfrm>
+            <a:off x="5275148" y="1283969"/>
+            <a:ext cx="3663298" cy="3539431"/>
+          </a:xfrm>
+          <a:prstGeom prst="rect">
+            <a:avLst/>
+          </a:prstGeom>
+          <a:noFill/>
+        </p:spPr>
+        <p:txBody>
+          <a:bodyPr wrap="square" rtlCol="0">
+            <a:spAutoFit/>
+          </a:bodyPr>
+          <a:lstStyle/>
+          <a:p>
+            <a:pPr marL="285750" lvl="0" indent="-285750">
+              <a:buFont typeface="Arial"/>
+              <a:buChar char="•"/>
+            </a:pPr>
+            <a:r>
+              <a:rPr lang="en-US" sz="2800" dirty="0" smtClean="0">
+                <a:solidFill>
+                  <a:prstClr val="black"/>
+                </a:solidFill>
+                <a:latin typeface="Perpetua"/>
+              </a:rPr>
+              <a:t>Observed individuals: Steve </a:t>
+            </a:r>
+            <a:r>
+              <a:rPr lang="en-US" sz="2800" dirty="0" err="1" smtClean="0">
+                <a:solidFill>
+                  <a:prstClr val="black"/>
+                </a:solidFill>
+                <a:latin typeface="Perpetua"/>
+              </a:rPr>
+              <a:t>Buscemi</a:t>
+            </a:r>
+            <a:r>
+              <a:rPr lang="en-US" sz="2800" dirty="0" smtClean="0">
+                <a:solidFill>
+                  <a:prstClr val="black"/>
+                </a:solidFill>
+                <a:latin typeface="Perpetua"/>
+              </a:rPr>
+              <a:t> and Uma Thurman</a:t>
+            </a:r>
+          </a:p>
+          <a:p>
+            <a:pPr marL="285750" lvl="0" indent="-285750">
+              <a:buFont typeface="Arial"/>
+              <a:buChar char="•"/>
+            </a:pPr>
+            <a:r>
+              <a:rPr lang="en-US" sz="2800" dirty="0" smtClean="0">
+                <a:solidFill>
+                  <a:prstClr val="black"/>
+                </a:solidFill>
+                <a:latin typeface="Perpetua"/>
+              </a:rPr>
+              <a:t>complete </a:t>
+            </a:r>
+            <a:r>
+              <a:rPr lang="en-US" sz="2800" dirty="0">
+                <a:solidFill>
+                  <a:prstClr val="black"/>
+                </a:solidFill>
+                <a:latin typeface="Perpetua"/>
+              </a:rPr>
+              <a:t>information for Uma Thurman and Steve </a:t>
+            </a:r>
+            <a:r>
+              <a:rPr lang="en-US" sz="2800" dirty="0" err="1">
+                <a:solidFill>
+                  <a:prstClr val="black"/>
+                </a:solidFill>
+                <a:latin typeface="Perpetua"/>
+              </a:rPr>
+              <a:t>Buscemi</a:t>
+            </a:r>
+            <a:r>
+              <a:rPr lang="en-US" sz="2800" dirty="0">
+                <a:solidFill>
+                  <a:prstClr val="black"/>
+                </a:solidFill>
+                <a:latin typeface="Perpetua"/>
+              </a:rPr>
+              <a:t> </a:t>
+            </a:r>
+          </a:p>
+          <a:p>
+            <a:pPr marL="285750" indent="-285750">
+              <a:buFont typeface="Arial"/>
+              <a:buChar char="•"/>
+            </a:pPr>
+            <a:r>
+              <a:rPr lang="en-US" sz="2800" dirty="0" smtClean="0">
+                <a:latin typeface="+mn-lt"/>
+              </a:rPr>
+              <a:t>have not observed Brad Pitt and Lucy Liu</a:t>
+            </a:r>
+          </a:p>
+        </p:txBody>
+      </p:sp>
+      <p:sp>
+        <p:nvSpPr>
+          <p:cNvPr id="30" name="TextBox 29"/>
+          <p:cNvSpPr txBox="1"/>
+          <p:nvPr/>
+        </p:nvSpPr>
+        <p:spPr>
+          <a:xfrm>
+            <a:off x="927660" y="1387756"/>
+            <a:ext cx="1649506" cy="646331"/>
+          </a:xfrm>
+          <a:prstGeom prst="rect">
+            <a:avLst/>
+          </a:prstGeom>
+          <a:noFill/>
+        </p:spPr>
+        <p:txBody>
+          <a:bodyPr wrap="square" rtlCol="0">
+            <a:spAutoFit/>
+          </a:bodyPr>
+          <a:lstStyle/>
+          <a:p>
+            <a:r>
+              <a:rPr lang="en-US" dirty="0" smtClean="0">
+                <a:solidFill>
+                  <a:srgbClr val="3366FF"/>
+                </a:solidFill>
+                <a:latin typeface="+mn-lt"/>
+              </a:rPr>
+              <a:t>gender</a:t>
+            </a:r>
+            <a:r>
+              <a:rPr lang="en-US" dirty="0" smtClean="0">
+                <a:latin typeface="+mn-lt"/>
+              </a:rPr>
+              <a:t> = </a:t>
+            </a:r>
+            <a:r>
+              <a:rPr lang="en-US" dirty="0" smtClean="0">
+                <a:solidFill>
+                  <a:srgbClr val="FF0000"/>
+                </a:solidFill>
+                <a:latin typeface="+mn-lt"/>
+              </a:rPr>
+              <a:t>Man</a:t>
+            </a:r>
+          </a:p>
+          <a:p>
+            <a:r>
+              <a:rPr lang="en-US" dirty="0" smtClean="0">
+                <a:solidFill>
+                  <a:srgbClr val="3366FF"/>
+                </a:solidFill>
+                <a:latin typeface="+mn-lt"/>
+              </a:rPr>
+              <a:t>country</a:t>
+            </a:r>
+            <a:r>
+              <a:rPr lang="en-US" dirty="0" smtClean="0">
+                <a:latin typeface="+mn-lt"/>
+              </a:rPr>
+              <a:t> = </a:t>
+            </a:r>
+            <a:r>
+              <a:rPr lang="en-US" dirty="0" smtClean="0">
+                <a:solidFill>
+                  <a:srgbClr val="FF0000"/>
+                </a:solidFill>
+                <a:latin typeface="+mn-lt"/>
+              </a:rPr>
+              <a:t>U.S.</a:t>
+            </a:r>
+            <a:endParaRPr lang="en-US" dirty="0">
+              <a:solidFill>
+                <a:srgbClr val="FF0000"/>
+              </a:solidFill>
+              <a:latin typeface="+mn-lt"/>
+            </a:endParaRPr>
+          </a:p>
+        </p:txBody>
+      </p:sp>
+      <p:sp>
+        <p:nvSpPr>
+          <p:cNvPr id="31" name="TextBox 30"/>
+          <p:cNvSpPr txBox="1"/>
+          <p:nvPr/>
+        </p:nvSpPr>
+        <p:spPr>
+          <a:xfrm>
+            <a:off x="2851131" y="1387756"/>
+            <a:ext cx="2033480" cy="646331"/>
+          </a:xfrm>
+          <a:prstGeom prst="rect">
+            <a:avLst/>
+          </a:prstGeom>
+          <a:noFill/>
+        </p:spPr>
+        <p:txBody>
+          <a:bodyPr wrap="square" rtlCol="0">
+            <a:spAutoFit/>
+          </a:bodyPr>
+          <a:lstStyle/>
+          <a:p>
+            <a:r>
+              <a:rPr lang="en-US" dirty="0" smtClean="0">
+                <a:solidFill>
+                  <a:srgbClr val="3366FF"/>
+                </a:solidFill>
+                <a:latin typeface="+mn-lt"/>
+              </a:rPr>
+              <a:t>gender</a:t>
+            </a:r>
+            <a:r>
+              <a:rPr lang="en-US" dirty="0" smtClean="0">
+                <a:latin typeface="+mn-lt"/>
+              </a:rPr>
+              <a:t> = </a:t>
+            </a:r>
+            <a:r>
+              <a:rPr lang="en-US" dirty="0" smtClean="0">
+                <a:solidFill>
+                  <a:srgbClr val="FF0000"/>
+                </a:solidFill>
+                <a:latin typeface="+mn-lt"/>
+              </a:rPr>
+              <a:t>Woman</a:t>
+            </a:r>
+          </a:p>
+          <a:p>
+            <a:r>
+              <a:rPr lang="en-US" dirty="0" smtClean="0">
+                <a:solidFill>
+                  <a:srgbClr val="3366FF"/>
+                </a:solidFill>
+                <a:latin typeface="+mn-lt"/>
+              </a:rPr>
+              <a:t>country</a:t>
+            </a:r>
+            <a:r>
+              <a:rPr lang="en-US" dirty="0" smtClean="0">
+                <a:latin typeface="+mn-lt"/>
+              </a:rPr>
+              <a:t> = </a:t>
+            </a:r>
+            <a:r>
+              <a:rPr lang="en-US" dirty="0" smtClean="0">
+                <a:solidFill>
+                  <a:srgbClr val="FF0000"/>
+                </a:solidFill>
+                <a:latin typeface="+mn-lt"/>
+              </a:rPr>
+              <a:t>U.S.</a:t>
+            </a:r>
+            <a:endParaRPr lang="en-US" dirty="0">
+              <a:solidFill>
+                <a:srgbClr val="FF0000"/>
+              </a:solidFill>
+              <a:latin typeface="+mn-lt"/>
+            </a:endParaRPr>
+          </a:p>
+        </p:txBody>
+      </p:sp>
+      <p:sp>
+        <p:nvSpPr>
+          <p:cNvPr id="32" name="TextBox 31"/>
+          <p:cNvSpPr txBox="1"/>
+          <p:nvPr/>
+        </p:nvSpPr>
+        <p:spPr>
+          <a:xfrm>
+            <a:off x="625879" y="5882905"/>
+            <a:ext cx="1951287" cy="707886"/>
+          </a:xfrm>
+          <a:prstGeom prst="rect">
+            <a:avLst/>
+          </a:prstGeom>
+          <a:noFill/>
+        </p:spPr>
+        <p:txBody>
+          <a:bodyPr wrap="square" rtlCol="0">
+            <a:spAutoFit/>
+          </a:bodyPr>
+          <a:lstStyle/>
+          <a:p>
+            <a:r>
+              <a:rPr lang="en-US" sz="2000" dirty="0" smtClean="0">
+                <a:solidFill>
+                  <a:srgbClr val="3366FF"/>
+                </a:solidFill>
+                <a:latin typeface="+mn-lt"/>
+              </a:rPr>
+              <a:t>runtime</a:t>
+            </a:r>
+            <a:r>
+              <a:rPr lang="en-US" sz="2000" dirty="0" smtClean="0">
+                <a:latin typeface="+mn-lt"/>
+              </a:rPr>
+              <a:t> = </a:t>
+            </a:r>
+            <a:r>
+              <a:rPr lang="en-US" sz="2000" dirty="0" smtClean="0">
+                <a:solidFill>
+                  <a:srgbClr val="FF0000"/>
+                </a:solidFill>
+                <a:latin typeface="+mn-lt"/>
+              </a:rPr>
+              <a:t>98 min</a:t>
+            </a:r>
+          </a:p>
+          <a:p>
+            <a:r>
+              <a:rPr lang="en-US" sz="2000" dirty="0" smtClean="0">
+                <a:solidFill>
+                  <a:srgbClr val="3366FF"/>
+                </a:solidFill>
+                <a:latin typeface="+mn-lt"/>
+              </a:rPr>
+              <a:t>drama</a:t>
+            </a:r>
+            <a:r>
+              <a:rPr lang="en-US" sz="2000" dirty="0" smtClean="0">
+                <a:latin typeface="+mn-lt"/>
+              </a:rPr>
+              <a:t> = </a:t>
+            </a:r>
+            <a:r>
+              <a:rPr lang="en-US" sz="2000" dirty="0" smtClean="0">
+                <a:solidFill>
+                  <a:srgbClr val="FF0000"/>
+                </a:solidFill>
+                <a:latin typeface="+mn-lt"/>
+              </a:rPr>
+              <a:t>true</a:t>
+            </a:r>
+            <a:endParaRPr lang="en-US" sz="2000" dirty="0">
+              <a:solidFill>
+                <a:srgbClr val="FF0000"/>
+              </a:solidFill>
+              <a:latin typeface="+mn-lt"/>
+            </a:endParaRPr>
+          </a:p>
+        </p:txBody>
+      </p:sp>
+      <p:cxnSp>
+        <p:nvCxnSpPr>
+          <p:cNvPr id="33" name="Straight Connector 32"/>
+          <p:cNvCxnSpPr/>
+          <p:nvPr/>
+        </p:nvCxnSpPr>
+        <p:spPr>
+          <a:xfrm>
+            <a:off x="4034879" y="5587295"/>
+            <a:ext cx="0" cy="451067"/>
+          </a:xfrm>
+          <a:prstGeom prst="line">
+            <a:avLst/>
+          </a:prstGeom>
+        </p:spPr>
+        <p:style>
+          <a:lnRef idx="2">
+            <a:schemeClr val="accent1"/>
+          </a:lnRef>
+          <a:fillRef idx="0">
+            <a:schemeClr val="accent1"/>
+          </a:fillRef>
+          <a:effectRef idx="1">
+            <a:schemeClr val="accent1"/>
+          </a:effectRef>
+          <a:fontRef idx="minor">
+            <a:schemeClr val="tx1"/>
+          </a:fontRef>
+        </p:style>
+      </p:cxnSp>
+    </p:spTree>
+    <p:extLst>
+      <p:ext uri="{BB962C8B-B14F-4D97-AF65-F5344CB8AC3E}">
+        <p14:creationId xmlns:p14="http://schemas.microsoft.com/office/powerpoint/2010/main" val="356910493"/>
+      </p:ext>
+    </p:extLst>
+  </p:cSld>
+  <p:clrMapOvr>
+    <a:masterClrMapping/>
+  </p:clrMapOvr>
+  <p:timing>
+    <p:tnLst>
+      <p:par>
+        <p:cTn xmlns:p14="http://schemas.microsoft.com/office/powerpoint/2010/main" id="1" dur="indefinite" restart="never" nodeType="tmRoot"/>
+      </p:par>
+    </p:tnLst>
+  </p:timing>
+</p:sld>
+</file>
+
+<file path=ppt/slides/slide33.xml><?xml version="1.0" encoding="utf-8"?>
+<p:sld xmlns:a="http://schemas.openxmlformats.org/drawingml/2006/main" xmlns:r="http://schemas.openxmlformats.org/officeDocument/2006/relationships" xmlns:p="http://schemas.openxmlformats.org/presentationml/2006/main">
+  <p:cSld>
+    <p:spTree>
+      <p:nvGrpSpPr>
+        <p:cNvPr id="1" name=""/>
+        <p:cNvGrpSpPr/>
+        <p:nvPr/>
+      </p:nvGrpSpPr>
+      <p:grpSpPr>
+        <a:xfrm>
+          <a:off x="0" y="0"/>
+          <a:ext cx="0" cy="0"/>
+          <a:chOff x="0" y="0"/>
+          <a:chExt cx="0" cy="0"/>
+        </a:xfrm>
+      </p:grpSpPr>
+      <p:sp>
+        <p:nvSpPr>
+          <p:cNvPr id="4" name="Title 3"/>
+          <p:cNvSpPr>
+            <a:spLocks noGrp="1"/>
+          </p:cNvSpPr>
+          <p:nvPr>
+            <p:ph type="title"/>
+          </p:nvPr>
+        </p:nvSpPr>
+        <p:spPr>
+          <a:xfrm>
+            <a:off x="651756" y="688008"/>
+            <a:ext cx="7772400" cy="1500450"/>
+          </a:xfrm>
+        </p:spPr>
+        <p:txBody>
+          <a:bodyPr>
+            <a:normAutofit/>
+          </a:bodyPr>
+          <a:lstStyle/>
+          <a:p>
+            <a:r>
+              <a:rPr lang="en-US" dirty="0" smtClean="0"/>
+              <a:t>Representations of Relational Data</a:t>
+            </a:r>
+            <a:endParaRPr lang="en-US" b="0" dirty="0"/>
+          </a:p>
+        </p:txBody>
+      </p:sp>
+    </p:spTree>
+    <p:extLst>
+      <p:ext uri="{BB962C8B-B14F-4D97-AF65-F5344CB8AC3E}">
+        <p14:creationId xmlns:p14="http://schemas.microsoft.com/office/powerpoint/2010/main" val="3646800642"/>
+      </p:ext>
+    </p:extLst>
+  </p:cSld>
+  <p:clrMapOvr>
+    <a:masterClrMapping/>
+  </p:clrMapOvr>
+  <p:timing>
+    <p:tnLst>
+      <p:par>
+        <p:cTn xmlns:p14="http://schemas.microsoft.com/office/powerpoint/2010/main" id="1" dur="indefinite" restart="never" nodeType="tmRoot"/>
+      </p:par>
+    </p:tnLst>
+  </p:timing>
+</p:sld>
+</file>
+
+<file path=ppt/slides/slide34.xml><?xml version="1.0" encoding="utf-8"?>
+<p:sld xmlns:a="http://schemas.openxmlformats.org/drawingml/2006/main" xmlns:r="http://schemas.openxmlformats.org/officeDocument/2006/relationships" xmlns:p="http://schemas.openxmlformats.org/presentationml/2006/main">
+  <p:cSld>
+    <p:spTree>
+      <p:nvGrpSpPr>
+        <p:cNvPr id="1" name=""/>
+        <p:cNvGrpSpPr/>
+        <p:nvPr/>
+      </p:nvGrpSpPr>
+      <p:grpSpPr>
+        <a:xfrm>
+          <a:off x="0" y="0"/>
+          <a:ext cx="0" cy="0"/>
+          <a:chOff x="0" y="0"/>
+          <a:chExt cx="0" cy="0"/>
+        </a:xfrm>
+      </p:grpSpPr>
+      <p:sp>
+        <p:nvSpPr>
+          <p:cNvPr id="2" name="Title 1"/>
+          <p:cNvSpPr>
+            <a:spLocks noGrp="1"/>
+          </p:cNvSpPr>
+          <p:nvPr>
+            <p:ph type="title"/>
+          </p:nvPr>
+        </p:nvSpPr>
+        <p:spPr/>
+        <p:txBody>
+          <a:bodyPr/>
+          <a:lstStyle/>
+          <a:p>
+            <a:r>
+              <a:rPr lang="en-US" dirty="0" smtClean="0"/>
+              <a:t>Relational Data Formats</a:t>
+            </a:r>
+            <a:endParaRPr lang="en-US" dirty="0"/>
+          </a:p>
+        </p:txBody>
+      </p:sp>
+      <p:sp>
+        <p:nvSpPr>
+          <p:cNvPr id="4" name="Footer Placeholder 3"/>
+          <p:cNvSpPr>
+            <a:spLocks noGrp="1"/>
+          </p:cNvSpPr>
+          <p:nvPr>
+            <p:ph type="ftr" sz="quarter" idx="11"/>
+          </p:nvPr>
+        </p:nvSpPr>
+        <p:spPr>
+          <a:xfrm>
+            <a:off x="914400" y="5855900"/>
+            <a:ext cx="6870886" cy="724015"/>
+          </a:xfrm>
+        </p:spPr>
+        <p:txBody>
+          <a:bodyPr/>
+          <a:lstStyle/>
+          <a:p>
+            <a:r>
+              <a:rPr lang="en-US" dirty="0" smtClean="0"/>
+              <a:t>Sun, Y. &amp; Han, J. (2012), Mining Heterogeneous Information Networks: Principles and Methodologies, Morgan &amp; Claypool Publishers.</a:t>
+            </a:r>
+            <a:br>
+              <a:rPr lang="en-US" dirty="0" smtClean="0"/>
+            </a:br>
+            <a:r>
+              <a:rPr lang="en-US" dirty="0" smtClean="0"/>
+              <a:t>Nickel, M.; Murphy, K.; </a:t>
+            </a:r>
+            <a:r>
+              <a:rPr lang="en-US" dirty="0" err="1" smtClean="0"/>
+              <a:t>Tresp</a:t>
+            </a:r>
+            <a:r>
+              <a:rPr lang="en-US" dirty="0" smtClean="0"/>
+              <a:t>, V. &amp; </a:t>
+            </a:r>
+            <a:r>
+              <a:rPr lang="en-US" dirty="0" err="1" smtClean="0"/>
+              <a:t>Gabrilovich</a:t>
+            </a:r>
+            <a:r>
+              <a:rPr lang="en-US" dirty="0" smtClean="0"/>
+              <a:t>, E. (2015), 'A Review of Relational Machine Learning for Knowledge Graphs', </a:t>
+            </a:r>
+            <a:r>
+              <a:rPr lang="en-US" i="1" dirty="0" err="1" smtClean="0"/>
+              <a:t>ArXiv</a:t>
+            </a:r>
+            <a:r>
+              <a:rPr lang="en-US" i="1" dirty="0" smtClean="0"/>
+              <a:t> e-prints .</a:t>
+            </a:r>
+            <a:endParaRPr lang="en-US" i="1" dirty="0"/>
+          </a:p>
+        </p:txBody>
+      </p:sp>
+      <p:sp>
+        <p:nvSpPr>
+          <p:cNvPr id="6" name="TextBox 5"/>
+          <p:cNvSpPr txBox="1"/>
+          <p:nvPr/>
+        </p:nvSpPr>
+        <p:spPr>
+          <a:xfrm>
+            <a:off x="1245105" y="2840161"/>
+            <a:ext cx="1369023" cy="400110"/>
+          </a:xfrm>
+          <a:prstGeom prst="rect">
+            <a:avLst/>
+          </a:prstGeom>
+          <a:noFill/>
+        </p:spPr>
+        <p:txBody>
+          <a:bodyPr wrap="square" rtlCol="0">
+            <a:spAutoFit/>
+          </a:bodyPr>
+          <a:lstStyle/>
+          <a:p>
+            <a:r>
+              <a:rPr lang="en-US" sz="2000" dirty="0" smtClean="0">
+                <a:latin typeface="+mn-lt"/>
+              </a:rPr>
+              <a:t>graphical</a:t>
+            </a:r>
+            <a:endParaRPr lang="en-US" sz="2000" dirty="0">
+              <a:latin typeface="+mn-lt"/>
+            </a:endParaRPr>
+          </a:p>
+        </p:txBody>
+      </p:sp>
+      <p:sp>
+        <p:nvSpPr>
+          <p:cNvPr id="10" name="TextBox 9"/>
+          <p:cNvSpPr txBox="1"/>
+          <p:nvPr/>
+        </p:nvSpPr>
+        <p:spPr>
+          <a:xfrm>
+            <a:off x="3309790" y="1748530"/>
+            <a:ext cx="2457643" cy="584776"/>
+          </a:xfrm>
+          <a:prstGeom prst="rect">
+            <a:avLst/>
+          </a:prstGeom>
+          <a:noFill/>
+          <a:ln>
+            <a:solidFill>
+              <a:schemeClr val="tx1"/>
+            </a:solidFill>
+          </a:ln>
+        </p:spPr>
+        <p:txBody>
+          <a:bodyPr wrap="square" rtlCol="0">
+            <a:spAutoFit/>
+          </a:bodyPr>
+          <a:lstStyle/>
+          <a:p>
+            <a:r>
+              <a:rPr lang="en-US" sz="3200" dirty="0" smtClean="0">
+                <a:latin typeface="+mn-lt"/>
+              </a:rPr>
+              <a:t>Data Format</a:t>
+            </a:r>
+            <a:endParaRPr lang="en-US" sz="3200" dirty="0">
+              <a:latin typeface="+mn-lt"/>
+            </a:endParaRPr>
+          </a:p>
+        </p:txBody>
+      </p:sp>
+      <p:sp>
+        <p:nvSpPr>
+          <p:cNvPr id="11" name="TextBox 10"/>
+          <p:cNvSpPr txBox="1"/>
+          <p:nvPr/>
+        </p:nvSpPr>
+        <p:spPr>
+          <a:xfrm>
+            <a:off x="432372" y="3822261"/>
+            <a:ext cx="2418583" cy="1569660"/>
+          </a:xfrm>
+          <a:prstGeom prst="rect">
+            <a:avLst/>
+          </a:prstGeom>
+          <a:noFill/>
+          <a:ln>
+            <a:solidFill>
+              <a:schemeClr val="tx1"/>
+            </a:solidFill>
+          </a:ln>
+        </p:spPr>
+        <p:txBody>
+          <a:bodyPr wrap="square" rtlCol="0">
+            <a:spAutoFit/>
+          </a:bodyPr>
+          <a:lstStyle/>
+          <a:p>
+            <a:r>
+              <a:rPr lang="en-US" sz="2400" b="1" dirty="0">
+                <a:latin typeface="+mn-lt"/>
+              </a:rPr>
+              <a:t>Nodes and edges in </a:t>
+            </a:r>
+            <a:r>
+              <a:rPr lang="en-US" sz="2400" b="1" dirty="0" err="1">
+                <a:latin typeface="+mn-lt"/>
+              </a:rPr>
+              <a:t>heterogenous</a:t>
+            </a:r>
+            <a:r>
+              <a:rPr lang="en-US" sz="2400" b="1" dirty="0">
+                <a:latin typeface="+mn-lt"/>
+              </a:rPr>
+              <a:t> network </a:t>
+            </a:r>
+            <a:r>
+              <a:rPr lang="en-US" sz="2400" b="1" dirty="0" smtClean="0">
+                <a:latin typeface="+mn-lt"/>
+              </a:rPr>
+              <a:t/>
+            </a:r>
+            <a:br>
+              <a:rPr lang="en-US" sz="2400" b="1" dirty="0" smtClean="0">
+                <a:latin typeface="+mn-lt"/>
+              </a:rPr>
+            </a:br>
+            <a:r>
+              <a:rPr lang="en-US" sz="2400" dirty="0" smtClean="0">
+                <a:latin typeface="+mn-lt"/>
+              </a:rPr>
+              <a:t>(</a:t>
+            </a:r>
+            <a:r>
+              <a:rPr lang="en-US" sz="2400" dirty="0">
+                <a:latin typeface="+mn-lt"/>
+              </a:rPr>
+              <a:t>Sun and </a:t>
+            </a:r>
+            <a:r>
+              <a:rPr lang="en-US" sz="2400" dirty="0" smtClean="0">
+                <a:latin typeface="+mn-lt"/>
+              </a:rPr>
+              <a:t>Han 2012)</a:t>
+            </a:r>
+            <a:endParaRPr lang="en-US" sz="2400" dirty="0">
+              <a:latin typeface="+mn-lt"/>
+            </a:endParaRPr>
+          </a:p>
+        </p:txBody>
+      </p:sp>
+      <p:sp>
+        <p:nvSpPr>
+          <p:cNvPr id="12" name="TextBox 11"/>
+          <p:cNvSpPr txBox="1"/>
+          <p:nvPr/>
+        </p:nvSpPr>
+        <p:spPr>
+          <a:xfrm>
+            <a:off x="3019871" y="4130038"/>
+            <a:ext cx="1411946" cy="1200328"/>
+          </a:xfrm>
+          <a:prstGeom prst="rect">
+            <a:avLst/>
+          </a:prstGeom>
+          <a:noFill/>
+          <a:ln>
+            <a:solidFill>
+              <a:schemeClr val="tx1"/>
+            </a:solidFill>
+          </a:ln>
+        </p:spPr>
+        <p:txBody>
+          <a:bodyPr wrap="square" rtlCol="0">
+            <a:spAutoFit/>
+          </a:bodyPr>
+          <a:lstStyle/>
+          <a:p>
+            <a:r>
+              <a:rPr lang="en-US" sz="2400" b="1" dirty="0" smtClean="0">
+                <a:latin typeface="+mn-lt"/>
+              </a:rPr>
+              <a:t>Database Tables</a:t>
+            </a:r>
+          </a:p>
+          <a:p>
+            <a:r>
+              <a:rPr lang="en-US" sz="2400" b="1" dirty="0" smtClean="0">
+                <a:latin typeface="+mn-lt"/>
+              </a:rPr>
+              <a:t>SQL</a:t>
+            </a:r>
+            <a:endParaRPr lang="en-US" sz="2400" b="1" dirty="0">
+              <a:latin typeface="+mn-lt"/>
+            </a:endParaRPr>
+          </a:p>
+        </p:txBody>
+      </p:sp>
+      <p:sp>
+        <p:nvSpPr>
+          <p:cNvPr id="13" name="TextBox 12"/>
+          <p:cNvSpPr txBox="1"/>
+          <p:nvPr/>
+        </p:nvSpPr>
+        <p:spPr>
+          <a:xfrm>
+            <a:off x="4563684" y="3837650"/>
+            <a:ext cx="2935274" cy="1938992"/>
+          </a:xfrm>
+          <a:prstGeom prst="rect">
+            <a:avLst/>
+          </a:prstGeom>
+          <a:noFill/>
+          <a:ln>
+            <a:solidFill>
+              <a:schemeClr val="tx1"/>
+            </a:solidFill>
+          </a:ln>
+        </p:spPr>
+        <p:txBody>
+          <a:bodyPr wrap="square" rtlCol="0">
+            <a:spAutoFit/>
+          </a:bodyPr>
+          <a:lstStyle/>
+          <a:p>
+            <a:r>
+              <a:rPr lang="en-US" sz="2400" dirty="0" smtClean="0">
+                <a:latin typeface="+mn-lt"/>
+              </a:rPr>
+              <a:t>Logical Facts</a:t>
+            </a:r>
+          </a:p>
+          <a:p>
+            <a:pPr marL="342900" indent="-342900">
+              <a:buFont typeface="Arial"/>
+              <a:buChar char="•"/>
+            </a:pPr>
+            <a:r>
+              <a:rPr lang="en-US" sz="2400" dirty="0" smtClean="0">
+                <a:latin typeface="+mn-lt"/>
+              </a:rPr>
+              <a:t>Knowledge Graph Triples </a:t>
+            </a:r>
+            <a:br>
+              <a:rPr lang="en-US" sz="2400" dirty="0" smtClean="0">
+                <a:latin typeface="+mn-lt"/>
+              </a:rPr>
+            </a:br>
+            <a:r>
+              <a:rPr lang="en-US" sz="2400" dirty="0" smtClean="0">
+                <a:latin typeface="+mn-lt"/>
+              </a:rPr>
+              <a:t>(</a:t>
+            </a:r>
+            <a:r>
+              <a:rPr lang="en-US" sz="2400" dirty="0">
+                <a:latin typeface="+mn-lt"/>
+              </a:rPr>
+              <a:t>Nickel et al. 2015)</a:t>
+            </a:r>
+            <a:endParaRPr lang="en-US" sz="2400" dirty="0" smtClean="0">
+              <a:latin typeface="+mn-lt"/>
+            </a:endParaRPr>
+          </a:p>
+          <a:p>
+            <a:pPr marL="342900" indent="-342900">
+              <a:buFont typeface="Arial"/>
+              <a:buChar char="•"/>
+            </a:pPr>
+            <a:r>
+              <a:rPr lang="en-US" sz="2400" dirty="0" smtClean="0">
+                <a:latin typeface="+mn-lt"/>
+              </a:rPr>
+              <a:t>Atoms/Literals</a:t>
+            </a:r>
+            <a:endParaRPr lang="en-US" sz="2400" dirty="0">
+              <a:latin typeface="+mn-lt"/>
+            </a:endParaRPr>
+          </a:p>
+        </p:txBody>
+      </p:sp>
+      <p:cxnSp>
+        <p:nvCxnSpPr>
+          <p:cNvPr id="15" name="Straight Arrow Connector 14"/>
+          <p:cNvCxnSpPr>
+            <a:stCxn id="10" idx="2"/>
+          </p:cNvCxnSpPr>
+          <p:nvPr/>
+        </p:nvCxnSpPr>
+        <p:spPr>
+          <a:xfrm flipH="1">
+            <a:off x="1907780" y="2333306"/>
+            <a:ext cx="2630832" cy="1488955"/>
+          </a:xfrm>
+          <a:prstGeom prst="straightConnector1">
+            <a:avLst/>
+          </a:prstGeom>
+          <a:ln>
+            <a:tailEnd type="arrow"/>
+          </a:ln>
+        </p:spPr>
+        <p:style>
+          <a:lnRef idx="2">
+            <a:schemeClr val="accent1"/>
+          </a:lnRef>
+          <a:fillRef idx="0">
+            <a:schemeClr val="accent1"/>
+          </a:fillRef>
+          <a:effectRef idx="1">
+            <a:schemeClr val="accent1"/>
+          </a:effectRef>
+          <a:fontRef idx="minor">
+            <a:schemeClr val="tx1"/>
+          </a:fontRef>
+        </p:style>
+      </p:cxnSp>
+      <p:cxnSp>
+        <p:nvCxnSpPr>
+          <p:cNvPr id="17" name="Straight Arrow Connector 16"/>
+          <p:cNvCxnSpPr>
+            <a:stCxn id="10" idx="2"/>
+            <a:endCxn id="12" idx="0"/>
+          </p:cNvCxnSpPr>
+          <p:nvPr/>
+        </p:nvCxnSpPr>
+        <p:spPr>
+          <a:xfrm flipH="1">
+            <a:off x="3725844" y="2333306"/>
+            <a:ext cx="812768" cy="1796732"/>
+          </a:xfrm>
+          <a:prstGeom prst="straightConnector1">
+            <a:avLst/>
+          </a:prstGeom>
+          <a:ln>
+            <a:tailEnd type="arrow"/>
+          </a:ln>
+        </p:spPr>
+        <p:style>
+          <a:lnRef idx="2">
+            <a:schemeClr val="accent1"/>
+          </a:lnRef>
+          <a:fillRef idx="0">
+            <a:schemeClr val="accent1"/>
+          </a:fillRef>
+          <a:effectRef idx="1">
+            <a:schemeClr val="accent1"/>
+          </a:effectRef>
+          <a:fontRef idx="minor">
+            <a:schemeClr val="tx1"/>
+          </a:fontRef>
+        </p:style>
+      </p:cxnSp>
+      <p:cxnSp>
+        <p:nvCxnSpPr>
+          <p:cNvPr id="19" name="Straight Arrow Connector 18"/>
+          <p:cNvCxnSpPr>
+            <a:stCxn id="10" idx="2"/>
+          </p:cNvCxnSpPr>
+          <p:nvPr/>
+        </p:nvCxnSpPr>
+        <p:spPr>
+          <a:xfrm>
+            <a:off x="4538612" y="2333306"/>
+            <a:ext cx="1863835" cy="1488955"/>
+          </a:xfrm>
+          <a:prstGeom prst="straightConnector1">
+            <a:avLst/>
+          </a:prstGeom>
+          <a:ln>
+            <a:tailEnd type="arrow"/>
+          </a:ln>
+        </p:spPr>
+        <p:style>
+          <a:lnRef idx="2">
+            <a:schemeClr val="accent1"/>
+          </a:lnRef>
+          <a:fillRef idx="0">
+            <a:schemeClr val="accent1"/>
+          </a:fillRef>
+          <a:effectRef idx="1">
+            <a:schemeClr val="accent1"/>
+          </a:effectRef>
+          <a:fontRef idx="minor">
+            <a:schemeClr val="tx1"/>
+          </a:fontRef>
+        </p:style>
+      </p:cxnSp>
+      <p:sp>
+        <p:nvSpPr>
+          <p:cNvPr id="20" name="TextBox 19"/>
+          <p:cNvSpPr txBox="1"/>
+          <p:nvPr/>
+        </p:nvSpPr>
+        <p:spPr>
+          <a:xfrm>
+            <a:off x="3019871" y="3391990"/>
+            <a:ext cx="1115613" cy="400110"/>
+          </a:xfrm>
+          <a:prstGeom prst="rect">
+            <a:avLst/>
+          </a:prstGeom>
+          <a:noFill/>
+        </p:spPr>
+        <p:txBody>
+          <a:bodyPr wrap="square" rtlCol="0">
+            <a:spAutoFit/>
+          </a:bodyPr>
+          <a:lstStyle/>
+          <a:p>
+            <a:r>
+              <a:rPr lang="en-US" sz="2000" dirty="0" smtClean="0">
+                <a:latin typeface="+mn-lt"/>
+              </a:rPr>
+              <a:t>tabular</a:t>
+            </a:r>
+            <a:endParaRPr lang="en-US" sz="2000" dirty="0">
+              <a:latin typeface="+mn-lt"/>
+            </a:endParaRPr>
+          </a:p>
+        </p:txBody>
+      </p:sp>
+      <p:sp>
+        <p:nvSpPr>
+          <p:cNvPr id="21" name="TextBox 20"/>
+          <p:cNvSpPr txBox="1"/>
+          <p:nvPr/>
+        </p:nvSpPr>
+        <p:spPr>
+          <a:xfrm>
+            <a:off x="4988374" y="3266506"/>
+            <a:ext cx="1004002" cy="400110"/>
+          </a:xfrm>
+          <a:prstGeom prst="rect">
+            <a:avLst/>
+          </a:prstGeom>
+          <a:noFill/>
+        </p:spPr>
+        <p:txBody>
+          <a:bodyPr wrap="square" rtlCol="0">
+            <a:spAutoFit/>
+          </a:bodyPr>
+          <a:lstStyle/>
+          <a:p>
+            <a:r>
+              <a:rPr lang="en-US" sz="2000" dirty="0" smtClean="0">
+                <a:latin typeface="+mn-lt"/>
+              </a:rPr>
+              <a:t>logical</a:t>
+            </a:r>
+            <a:endParaRPr lang="en-US" sz="2000" dirty="0">
+              <a:latin typeface="+mn-lt"/>
+            </a:endParaRPr>
+          </a:p>
+        </p:txBody>
+      </p:sp>
+      <p:sp>
+        <p:nvSpPr>
+          <p:cNvPr id="16" name="TextBox 15"/>
+          <p:cNvSpPr txBox="1"/>
+          <p:nvPr/>
+        </p:nvSpPr>
+        <p:spPr>
+          <a:xfrm>
+            <a:off x="7660211" y="3839846"/>
+            <a:ext cx="1229145" cy="830997"/>
+          </a:xfrm>
+          <a:prstGeom prst="rect">
+            <a:avLst/>
+          </a:prstGeom>
+          <a:noFill/>
+          <a:ln>
+            <a:solidFill>
+              <a:schemeClr val="tx1"/>
+            </a:solidFill>
+          </a:ln>
+        </p:spPr>
+        <p:txBody>
+          <a:bodyPr wrap="square" rtlCol="0">
+            <a:spAutoFit/>
+          </a:bodyPr>
+          <a:lstStyle/>
+          <a:p>
+            <a:r>
+              <a:rPr lang="en-US" sz="2400" dirty="0" smtClean="0">
+                <a:latin typeface="+mn-lt"/>
+              </a:rPr>
+              <a:t>Matrices</a:t>
+            </a:r>
+          </a:p>
+          <a:p>
+            <a:r>
+              <a:rPr lang="en-US" sz="2400" dirty="0" smtClean="0">
+                <a:latin typeface="+mn-lt"/>
+              </a:rPr>
+              <a:t>Tensors</a:t>
+            </a:r>
+            <a:endParaRPr lang="en-US" sz="2400" dirty="0">
+              <a:latin typeface="+mn-lt"/>
+            </a:endParaRPr>
+          </a:p>
+        </p:txBody>
+      </p:sp>
+      <p:cxnSp>
+        <p:nvCxnSpPr>
+          <p:cNvPr id="7" name="Straight Arrow Connector 6"/>
+          <p:cNvCxnSpPr>
+            <a:stCxn id="10" idx="2"/>
+            <a:endCxn id="16" idx="0"/>
+          </p:cNvCxnSpPr>
+          <p:nvPr/>
+        </p:nvCxnSpPr>
+        <p:spPr>
+          <a:xfrm>
+            <a:off x="4538612" y="2333306"/>
+            <a:ext cx="3736172" cy="1506540"/>
+          </a:xfrm>
+          <a:prstGeom prst="straightConnector1">
+            <a:avLst/>
+          </a:prstGeom>
+          <a:ln>
+            <a:tailEnd type="arrow"/>
+          </a:ln>
+        </p:spPr>
+        <p:style>
+          <a:lnRef idx="2">
+            <a:schemeClr val="accent1"/>
+          </a:lnRef>
+          <a:fillRef idx="0">
+            <a:schemeClr val="accent1"/>
+          </a:fillRef>
+          <a:effectRef idx="1">
+            <a:schemeClr val="accent1"/>
+          </a:effectRef>
+          <a:fontRef idx="minor">
+            <a:schemeClr val="tx1"/>
+          </a:fontRef>
+        </p:style>
+      </p:cxnSp>
+      <p:sp>
+        <p:nvSpPr>
+          <p:cNvPr id="18" name="TextBox 17"/>
+          <p:cNvSpPr txBox="1"/>
+          <p:nvPr/>
+        </p:nvSpPr>
+        <p:spPr>
+          <a:xfrm>
+            <a:off x="7660212" y="3207324"/>
+            <a:ext cx="1049713" cy="400110"/>
+          </a:xfrm>
+          <a:prstGeom prst="rect">
+            <a:avLst/>
+          </a:prstGeom>
+          <a:noFill/>
+        </p:spPr>
+        <p:txBody>
+          <a:bodyPr wrap="square" rtlCol="0">
+            <a:spAutoFit/>
+          </a:bodyPr>
+          <a:lstStyle/>
+          <a:p>
+            <a:r>
+              <a:rPr lang="en-US" sz="2000" dirty="0" smtClean="0">
+                <a:latin typeface="+mn-lt"/>
+              </a:rPr>
+              <a:t>arrays</a:t>
+            </a:r>
+            <a:endParaRPr lang="en-US" sz="2000" dirty="0">
+              <a:latin typeface="+mn-lt"/>
+            </a:endParaRPr>
+          </a:p>
+        </p:txBody>
+      </p:sp>
+    </p:spTree>
+    <p:extLst>
+      <p:ext uri="{BB962C8B-B14F-4D97-AF65-F5344CB8AC3E}">
+        <p14:creationId xmlns:p14="http://schemas.microsoft.com/office/powerpoint/2010/main" val="819989809"/>
+      </p:ext>
+    </p:extLst>
+  </p:cSld>
+  <p:clrMapOvr>
+    <a:masterClrMapping/>
+  </p:clrMapOvr>
+  <p:timing>
+    <p:tnLst>
+      <p:par>
+        <p:cTn xmlns:p14="http://schemas.microsoft.com/office/powerpoint/2010/main" id="1" dur="indefinite" restart="never" nodeType="tmRoot"/>
+      </p:par>
+    </p:tnLst>
+  </p:timing>
+</p:sld>
+</file>
+
+<file path=ppt/slides/slide35.xml><?xml version="1.0" encoding="utf-8"?>
+<p:sld xmlns:a="http://schemas.openxmlformats.org/drawingml/2006/main" xmlns:r="http://schemas.openxmlformats.org/officeDocument/2006/relationships" xmlns:p="http://schemas.openxmlformats.org/presentationml/2006/main">
+  <p:cSld>
+    <p:spTree>
+      <p:nvGrpSpPr>
+        <p:cNvPr id="1" name=""/>
+        <p:cNvGrpSpPr/>
+        <p:nvPr/>
+      </p:nvGrpSpPr>
+      <p:grpSpPr>
+        <a:xfrm>
+          <a:off x="0" y="0"/>
+          <a:ext cx="0" cy="0"/>
+          <a:chOff x="0" y="0"/>
+          <a:chExt cx="0" cy="0"/>
+        </a:xfrm>
+      </p:grpSpPr>
+      <p:sp>
+        <p:nvSpPr>
+          <p:cNvPr id="2" name="Title 1"/>
+          <p:cNvSpPr>
+            <a:spLocks noGrp="1"/>
+          </p:cNvSpPr>
+          <p:nvPr>
+            <p:ph type="title"/>
+          </p:nvPr>
+        </p:nvSpPr>
+        <p:spPr/>
+        <p:txBody>
           <a:bodyPr/>
           <a:lstStyle/>
           <a:p>
@@ -21846,7 +24074,7 @@
     </p:spTree>
     <p:extLst>
       <p:ext uri="{BB962C8B-B14F-4D97-AF65-F5344CB8AC3E}">
-        <p14:creationId xmlns:p14="http://schemas.microsoft.com/office/powerpoint/2010/main" val="240619030"/>
+        <p14:creationId xmlns:p14="http://schemas.microsoft.com/office/powerpoint/2010/main" val="3366141164"/>
       </p:ext>
     </p:extLst>
   </p:cSld>
@@ -21856,7 +24084,7 @@
 </p:sld>
 </file>
 
-<file path=ppt/slides/slide32.xml><?xml version="1.0" encoding="utf-8"?>
+<file path=ppt/slides/slide36.xml><?xml version="1.0" encoding="utf-8"?>
 <p:sld xmlns:a="http://schemas.openxmlformats.org/drawingml/2006/main" xmlns:r="http://schemas.openxmlformats.org/officeDocument/2006/relationships" xmlns:p="http://schemas.openxmlformats.org/presentationml/2006/main">
   <p:cSld>
     <p:spTree>
@@ -22781,2235 +25009,7 @@
     </p:spTree>
     <p:extLst>
       <p:ext uri="{BB962C8B-B14F-4D97-AF65-F5344CB8AC3E}">
-        <p14:creationId xmlns:p14="http://schemas.microsoft.com/office/powerpoint/2010/main" val="3629905999"/>
-      </p:ext>
-    </p:extLst>
-  </p:cSld>
-  <p:clrMapOvr>
-    <a:masterClrMapping/>
-  </p:clrMapOvr>
-  <p:timing>
-    <p:tnLst>
-      <p:par>
-        <p:cTn xmlns:p14="http://schemas.microsoft.com/office/powerpoint/2010/main" id="1" dur="indefinite" restart="never" nodeType="tmRoot"/>
-      </p:par>
-    </p:tnLst>
-  </p:timing>
-</p:sld>
-</file>
-
-<file path=ppt/slides/slide33.xml><?xml version="1.0" encoding="utf-8"?>
-<p:sld xmlns:a="http://schemas.openxmlformats.org/drawingml/2006/main" xmlns:r="http://schemas.openxmlformats.org/officeDocument/2006/relationships" xmlns:p="http://schemas.openxmlformats.org/presentationml/2006/main">
-  <p:cSld>
-    <p:spTree>
-      <p:nvGrpSpPr>
-        <p:cNvPr id="1" name=""/>
-        <p:cNvGrpSpPr/>
-        <p:nvPr/>
-      </p:nvGrpSpPr>
-      <p:grpSpPr>
-        <a:xfrm>
-          <a:off x="0" y="0"/>
-          <a:ext cx="0" cy="0"/>
-          <a:chOff x="0" y="0"/>
-          <a:chExt cx="0" cy="0"/>
-        </a:xfrm>
-      </p:grpSpPr>
-      <p:sp>
-        <p:nvSpPr>
-          <p:cNvPr id="2" name="Title 1"/>
-          <p:cNvSpPr>
-            <a:spLocks noGrp="1"/>
-          </p:cNvSpPr>
-          <p:nvPr>
-            <p:ph type="title"/>
-          </p:nvPr>
-        </p:nvSpPr>
-        <p:spPr/>
-        <p:txBody>
-          <a:bodyPr>
-            <a:normAutofit/>
-          </a:bodyPr>
-          <a:lstStyle/>
-          <a:p>
-            <a:r>
-              <a:rPr lang="en-US" dirty="0" smtClean="0"/>
-              <a:t>Learning From Relational Samples</a:t>
-            </a:r>
-            <a:endParaRPr lang="en-US" dirty="0"/>
-          </a:p>
-        </p:txBody>
-      </p:sp>
-      <p:sp>
-        <p:nvSpPr>
-          <p:cNvPr id="3" name="Content Placeholder 2"/>
-          <p:cNvSpPr>
-            <a:spLocks noGrp="1"/>
-          </p:cNvSpPr>
-          <p:nvPr>
-            <p:ph idx="1"/>
-          </p:nvPr>
-        </p:nvSpPr>
-        <p:spPr>
-          <a:xfrm>
-            <a:off x="358191" y="1580438"/>
-            <a:ext cx="8531414" cy="4201327"/>
-          </a:xfrm>
-        </p:spPr>
-        <p:txBody>
-          <a:bodyPr/>
-          <a:lstStyle/>
-          <a:p>
-            <a:r>
-              <a:rPr lang="en-US" sz="2800" dirty="0" smtClean="0"/>
-              <a:t>A </a:t>
-            </a:r>
-            <a:r>
-              <a:rPr lang="en-US" sz="2800" b="1" dirty="0" smtClean="0"/>
-              <a:t>sample</a:t>
-            </a:r>
-            <a:r>
-              <a:rPr lang="en-US" sz="2800" dirty="0" smtClean="0"/>
-              <a:t> specifies </a:t>
-            </a:r>
-          </a:p>
-          <a:p>
-            <a:pPr lvl="1"/>
-            <a:r>
-              <a:rPr lang="en-US" dirty="0" smtClean="0"/>
-              <a:t>a set of observed individuals</a:t>
-            </a:r>
-            <a:endParaRPr lang="en-US" dirty="0"/>
-          </a:p>
-          <a:p>
-            <a:pPr lvl="1"/>
-            <a:r>
-              <a:rPr lang="en-US" dirty="0" smtClean="0"/>
-              <a:t>For each tuple of observed individuals</a:t>
-            </a:r>
-            <a:r>
-              <a:rPr lang="en-US" dirty="0"/>
-              <a:t>,</a:t>
-            </a:r>
-            <a:r>
-              <a:rPr lang="en-US" dirty="0" smtClean="0"/>
-              <a:t>  </a:t>
-            </a:r>
-            <a:br>
-              <a:rPr lang="en-US" dirty="0" smtClean="0"/>
-            </a:br>
-            <a:r>
-              <a:rPr lang="en-US" dirty="0" smtClean="0"/>
-              <a:t>the argument value for each </a:t>
-            </a:r>
-            <a:r>
-              <a:rPr lang="en-US" dirty="0" err="1" smtClean="0"/>
-              <a:t>functor</a:t>
-            </a:r>
-            <a:endParaRPr lang="en-US" dirty="0" smtClean="0"/>
-          </a:p>
-          <a:p>
-            <a:pPr marL="457200" lvl="1" indent="0">
-              <a:buNone/>
-            </a:pPr>
-            <a:r>
-              <a:rPr lang="en-US" dirty="0" smtClean="0"/>
-              <a:t>= possible world restricted to observed individuals</a:t>
-            </a:r>
-          </a:p>
-          <a:p>
-            <a:r>
-              <a:rPr lang="en-US" sz="2800" dirty="0" smtClean="0"/>
-              <a:t>As with IID samples, we may have missing data =</a:t>
-            </a:r>
-            <a:br>
-              <a:rPr lang="en-US" sz="2800" dirty="0" smtClean="0"/>
-            </a:br>
-            <a:r>
-              <a:rPr lang="en-US" sz="2800" dirty="0" smtClean="0"/>
-              <a:t>missing values for some arguments of a </a:t>
-            </a:r>
-            <a:r>
-              <a:rPr lang="en-US" sz="2800" dirty="0" err="1" smtClean="0"/>
-              <a:t>functor</a:t>
-            </a:r>
-            <a:endParaRPr lang="en-US" sz="2800" dirty="0" smtClean="0"/>
-          </a:p>
-          <a:p>
-            <a:r>
-              <a:rPr lang="en-US" sz="2800" i="1" dirty="0" smtClean="0"/>
-              <a:t>Relational learning</a:t>
-            </a:r>
-            <a:r>
-              <a:rPr lang="en-US" sz="2800" dirty="0" smtClean="0"/>
-              <a:t>: given observed values of functions, extrapolate to unobserved values</a:t>
-            </a:r>
-          </a:p>
-        </p:txBody>
-      </p:sp>
-      <p:sp>
-        <p:nvSpPr>
-          <p:cNvPr id="5" name="Footer Placeholder 4"/>
-          <p:cNvSpPr>
-            <a:spLocks noGrp="1"/>
-          </p:cNvSpPr>
-          <p:nvPr>
-            <p:ph type="ftr" sz="quarter" idx="11"/>
-          </p:nvPr>
-        </p:nvSpPr>
-        <p:spPr>
-          <a:xfrm>
-            <a:off x="702743" y="6058239"/>
-            <a:ext cx="6638908" cy="457200"/>
-          </a:xfrm>
-        </p:spPr>
-        <p:txBody>
-          <a:bodyPr/>
-          <a:lstStyle/>
-          <a:p>
-            <a:pPr>
-              <a:defRPr/>
-            </a:pPr>
-            <a:r>
-              <a:rPr lang="en-US" dirty="0" smtClean="0"/>
-              <a:t>Xiang, R. &amp; Neville, J. (2011), Relational learning with one network: An asymptotic analysis, in 'Artificial Intelligence and Statistics', pp. 779--788.</a:t>
-            </a:r>
-            <a:endParaRPr lang="en-US" dirty="0"/>
-          </a:p>
-        </p:txBody>
-      </p:sp>
-    </p:spTree>
-    <p:extLst>
-      <p:ext uri="{BB962C8B-B14F-4D97-AF65-F5344CB8AC3E}">
-        <p14:creationId xmlns:p14="http://schemas.microsoft.com/office/powerpoint/2010/main" val="3876270619"/>
-      </p:ext>
-    </p:extLst>
-  </p:cSld>
-  <p:clrMapOvr>
-    <a:masterClrMapping/>
-  </p:clrMapOvr>
-  <p:timing>
-    <p:tnLst>
-      <p:par>
-        <p:cTn xmlns:p14="http://schemas.microsoft.com/office/powerpoint/2010/main" id="1" dur="indefinite" restart="never" nodeType="tmRoot"/>
-      </p:par>
-    </p:tnLst>
-  </p:timing>
-</p:sld>
-</file>
-
-<file path=ppt/slides/slide34.xml><?xml version="1.0" encoding="utf-8"?>
-<p:sld xmlns:a="http://schemas.openxmlformats.org/drawingml/2006/main" xmlns:r="http://schemas.openxmlformats.org/officeDocument/2006/relationships" xmlns:p="http://schemas.openxmlformats.org/presentationml/2006/main">
-  <p:cSld>
-    <p:spTree>
-      <p:nvGrpSpPr>
-        <p:cNvPr id="1" name=""/>
-        <p:cNvGrpSpPr/>
-        <p:nvPr/>
-      </p:nvGrpSpPr>
-      <p:grpSpPr>
-        <a:xfrm>
-          <a:off x="0" y="0"/>
-          <a:ext cx="0" cy="0"/>
-          <a:chOff x="0" y="0"/>
-          <a:chExt cx="0" cy="0"/>
-        </a:xfrm>
-      </p:grpSpPr>
-      <p:sp>
-        <p:nvSpPr>
-          <p:cNvPr id="4" name="Title 3"/>
-          <p:cNvSpPr>
-            <a:spLocks noGrp="1"/>
-          </p:cNvSpPr>
-          <p:nvPr>
-            <p:ph type="title"/>
-          </p:nvPr>
-        </p:nvSpPr>
-        <p:spPr/>
-        <p:txBody>
-          <a:bodyPr>
-            <a:normAutofit/>
-          </a:bodyPr>
-          <a:lstStyle/>
-          <a:p>
-            <a:r>
-              <a:rPr lang="en-US" dirty="0" smtClean="0"/>
-              <a:t>Example: Sample</a:t>
-            </a:r>
-            <a:endParaRPr lang="en-US" dirty="0"/>
-          </a:p>
-        </p:txBody>
-      </p:sp>
-      <p:pic>
-        <p:nvPicPr>
-          <p:cNvPr id="24" name="Picture 23" descr="buscemi.jpeg"/>
-          <p:cNvPicPr>
-            <a:picLocks noChangeAspect="1"/>
-          </p:cNvPicPr>
-          <p:nvPr/>
-        </p:nvPicPr>
-        <p:blipFill>
-          <a:blip r:embed="rId3">
-            <a:extLst>
-              <a:ext uri="{28A0092B-C50C-407E-A947-70E740481C1C}">
-                <a14:useLocalDpi xmlns:a14="http://schemas.microsoft.com/office/drawing/2010/main" val="0"/>
-              </a:ext>
-            </a:extLst>
-          </a:blip>
-          <a:stretch>
-            <a:fillRect/>
-          </a:stretch>
-        </p:blipFill>
-        <p:spPr>
-          <a:xfrm>
-            <a:off x="1412723" y="1997927"/>
-            <a:ext cx="852307" cy="1262529"/>
-          </a:xfrm>
-          <a:prstGeom prst="rect">
-            <a:avLst/>
-          </a:prstGeom>
-        </p:spPr>
-      </p:pic>
-      <p:pic>
-        <p:nvPicPr>
-          <p:cNvPr id="29" name="Picture 28" descr="thurman.jpeg"/>
-          <p:cNvPicPr>
-            <a:picLocks noChangeAspect="1"/>
-          </p:cNvPicPr>
-          <p:nvPr/>
-        </p:nvPicPr>
-        <p:blipFill>
-          <a:blip r:embed="rId4">
-            <a:extLst>
-              <a:ext uri="{28A0092B-C50C-407E-A947-70E740481C1C}">
-                <a14:useLocalDpi xmlns:a14="http://schemas.microsoft.com/office/drawing/2010/main" val="0"/>
-              </a:ext>
-            </a:extLst>
-          </a:blip>
-          <a:stretch>
-            <a:fillRect/>
-          </a:stretch>
-        </p:blipFill>
-        <p:spPr>
-          <a:xfrm>
-            <a:off x="3183979" y="2006891"/>
-            <a:ext cx="850900" cy="1244600"/>
-          </a:xfrm>
-          <a:prstGeom prst="rect">
-            <a:avLst/>
-          </a:prstGeom>
-        </p:spPr>
-      </p:pic>
-      <p:sp>
-        <p:nvSpPr>
-          <p:cNvPr id="2" name="TextBox 1"/>
-          <p:cNvSpPr txBox="1"/>
-          <p:nvPr/>
-        </p:nvSpPr>
-        <p:spPr>
-          <a:xfrm>
-            <a:off x="1009408" y="3740537"/>
-            <a:ext cx="913778" cy="707886"/>
-          </a:xfrm>
-          <a:prstGeom prst="rect">
-            <a:avLst/>
-          </a:prstGeom>
-          <a:noFill/>
-        </p:spPr>
-        <p:txBody>
-          <a:bodyPr wrap="square" rtlCol="0">
-            <a:spAutoFit/>
-          </a:bodyPr>
-          <a:lstStyle/>
-          <a:p>
-            <a:r>
-              <a:rPr lang="en-US" sz="2000" dirty="0" smtClean="0">
-                <a:solidFill>
-                  <a:srgbClr val="FF0000"/>
-                </a:solidFill>
-                <a:latin typeface="+mn-lt"/>
-              </a:rPr>
-              <a:t>True</a:t>
-            </a:r>
-          </a:p>
-          <a:p>
-            <a:r>
-              <a:rPr lang="en-US" sz="2000" dirty="0" smtClean="0">
-                <a:solidFill>
-                  <a:srgbClr val="FF0000"/>
-                </a:solidFill>
-                <a:latin typeface="+mn-lt"/>
-              </a:rPr>
-              <a:t>$500K</a:t>
-            </a:r>
-            <a:endParaRPr lang="en-US" sz="2000" dirty="0">
-              <a:solidFill>
-                <a:srgbClr val="FF0000"/>
-              </a:solidFill>
-              <a:latin typeface="+mn-lt"/>
-            </a:endParaRPr>
-          </a:p>
-        </p:txBody>
-      </p:sp>
-      <p:sp>
-        <p:nvSpPr>
-          <p:cNvPr id="40" name="TextBox 39"/>
-          <p:cNvSpPr txBox="1"/>
-          <p:nvPr/>
-        </p:nvSpPr>
-        <p:spPr>
-          <a:xfrm>
-            <a:off x="3609429" y="3740537"/>
-            <a:ext cx="791883" cy="707886"/>
-          </a:xfrm>
-          <a:prstGeom prst="rect">
-            <a:avLst/>
-          </a:prstGeom>
-          <a:noFill/>
-        </p:spPr>
-        <p:txBody>
-          <a:bodyPr wrap="square" rtlCol="0">
-            <a:spAutoFit/>
-          </a:bodyPr>
-          <a:lstStyle/>
-          <a:p>
-            <a:r>
-              <a:rPr lang="en-US" sz="2000" dirty="0" smtClean="0">
-                <a:solidFill>
-                  <a:srgbClr val="FF0000"/>
-                </a:solidFill>
-                <a:latin typeface="+mn-lt"/>
-              </a:rPr>
-              <a:t>True</a:t>
-            </a:r>
-          </a:p>
-          <a:p>
-            <a:r>
-              <a:rPr lang="en-US" sz="2000" dirty="0" smtClean="0">
-                <a:solidFill>
-                  <a:srgbClr val="FF0000"/>
-                </a:solidFill>
-                <a:latin typeface="+mn-lt"/>
-              </a:rPr>
-              <a:t>$5M</a:t>
-            </a:r>
-            <a:endParaRPr lang="en-US" sz="2000" dirty="0">
-              <a:solidFill>
-                <a:srgbClr val="FF0000"/>
-              </a:solidFill>
-              <a:latin typeface="+mn-lt"/>
-            </a:endParaRPr>
-          </a:p>
-        </p:txBody>
-      </p:sp>
-      <p:cxnSp>
-        <p:nvCxnSpPr>
-          <p:cNvPr id="9" name="Straight Arrow Connector 8"/>
-          <p:cNvCxnSpPr>
-            <a:stCxn id="29" idx="2"/>
-            <a:endCxn id="55" idx="0"/>
-          </p:cNvCxnSpPr>
-          <p:nvPr/>
-        </p:nvCxnSpPr>
-        <p:spPr>
-          <a:xfrm flipH="1">
-            <a:off x="3377434" y="3251491"/>
-            <a:ext cx="231995" cy="489046"/>
-          </a:xfrm>
-          <a:prstGeom prst="straightConnector1">
-            <a:avLst/>
-          </a:prstGeom>
-          <a:ln>
-            <a:tailEnd type="arrow"/>
-          </a:ln>
-        </p:spPr>
-        <p:style>
-          <a:lnRef idx="2">
-            <a:schemeClr val="accent1"/>
-          </a:lnRef>
-          <a:fillRef idx="0">
-            <a:schemeClr val="accent1"/>
-          </a:fillRef>
-          <a:effectRef idx="1">
-            <a:schemeClr val="accent1"/>
-          </a:effectRef>
-          <a:fontRef idx="minor">
-            <a:schemeClr val="tx1"/>
-          </a:fontRef>
-        </p:style>
-      </p:cxnSp>
-      <p:sp>
-        <p:nvSpPr>
-          <p:cNvPr id="58" name="TextBox 57"/>
-          <p:cNvSpPr txBox="1"/>
-          <p:nvPr/>
-        </p:nvSpPr>
-        <p:spPr>
-          <a:xfrm>
-            <a:off x="4542069" y="3716790"/>
-            <a:ext cx="1051921" cy="707886"/>
-          </a:xfrm>
-          <a:prstGeom prst="rect">
-            <a:avLst/>
-          </a:prstGeom>
-          <a:noFill/>
-        </p:spPr>
-        <p:txBody>
-          <a:bodyPr wrap="square" rtlCol="0">
-            <a:spAutoFit/>
-          </a:bodyPr>
-          <a:lstStyle/>
-          <a:p>
-            <a:r>
-              <a:rPr lang="en-US" sz="2000" dirty="0" smtClean="0">
-                <a:solidFill>
-                  <a:srgbClr val="3366FF"/>
-                </a:solidFill>
-                <a:latin typeface="+mn-lt"/>
-              </a:rPr>
-              <a:t>ActsIn</a:t>
-            </a:r>
-          </a:p>
-          <a:p>
-            <a:r>
-              <a:rPr lang="en-US" sz="2000" dirty="0" smtClean="0">
-                <a:solidFill>
-                  <a:srgbClr val="3366FF"/>
-                </a:solidFill>
-                <a:latin typeface="+mn-lt"/>
-              </a:rPr>
-              <a:t>salary</a:t>
-            </a:r>
-            <a:endParaRPr lang="en-US" sz="2000" dirty="0">
-              <a:solidFill>
-                <a:srgbClr val="3366FF"/>
-              </a:solidFill>
-              <a:latin typeface="+mn-lt"/>
-            </a:endParaRPr>
-          </a:p>
-        </p:txBody>
-      </p:sp>
-      <p:pic>
-        <p:nvPicPr>
-          <p:cNvPr id="37" name="Picture 36" descr="fargo.jpeg"/>
-          <p:cNvPicPr>
-            <a:picLocks noChangeAspect="1"/>
-          </p:cNvPicPr>
-          <p:nvPr/>
-        </p:nvPicPr>
-        <p:blipFill>
-          <a:blip r:embed="rId5">
-            <a:extLst>
-              <a:ext uri="{28A0092B-C50C-407E-A947-70E740481C1C}">
-                <a14:useLocalDpi xmlns:a14="http://schemas.microsoft.com/office/drawing/2010/main" val="0"/>
-              </a:ext>
-            </a:extLst>
-          </a:blip>
-          <a:stretch>
-            <a:fillRect/>
-          </a:stretch>
-        </p:blipFill>
-        <p:spPr>
-          <a:xfrm>
-            <a:off x="1092337" y="4549577"/>
-            <a:ext cx="637786" cy="1084617"/>
-          </a:xfrm>
-          <a:prstGeom prst="rect">
-            <a:avLst/>
-          </a:prstGeom>
-        </p:spPr>
-      </p:pic>
-      <p:pic>
-        <p:nvPicPr>
-          <p:cNvPr id="38" name="Picture 37" descr="kill-bill.jpeg"/>
-          <p:cNvPicPr>
-            <a:picLocks noChangeAspect="1"/>
-          </p:cNvPicPr>
-          <p:nvPr/>
-        </p:nvPicPr>
-        <p:blipFill>
-          <a:blip r:embed="rId6">
-            <a:extLst>
-              <a:ext uri="{28A0092B-C50C-407E-A947-70E740481C1C}">
-                <a14:useLocalDpi xmlns:a14="http://schemas.microsoft.com/office/drawing/2010/main" val="0"/>
-              </a:ext>
-            </a:extLst>
-          </a:blip>
-          <a:stretch>
-            <a:fillRect/>
-          </a:stretch>
-        </p:blipFill>
-        <p:spPr>
-          <a:xfrm>
-            <a:off x="1864690" y="4596475"/>
-            <a:ext cx="559954" cy="990820"/>
-          </a:xfrm>
-          <a:prstGeom prst="rect">
-            <a:avLst/>
-          </a:prstGeom>
-        </p:spPr>
-      </p:pic>
-      <p:pic>
-        <p:nvPicPr>
-          <p:cNvPr id="41" name="Picture 40" descr="fargo.jpeg"/>
-          <p:cNvPicPr>
-            <a:picLocks noChangeAspect="1"/>
-          </p:cNvPicPr>
-          <p:nvPr/>
-        </p:nvPicPr>
-        <p:blipFill>
-          <a:blip r:embed="rId5">
-            <a:extLst>
-              <a:ext uri="{28A0092B-C50C-407E-A947-70E740481C1C}">
-                <a14:useLocalDpi xmlns:a14="http://schemas.microsoft.com/office/drawing/2010/main" val="0"/>
-              </a:ext>
-            </a:extLst>
-          </a:blip>
-          <a:stretch>
-            <a:fillRect/>
-          </a:stretch>
-        </p:blipFill>
-        <p:spPr>
-          <a:xfrm>
-            <a:off x="3016061" y="4549577"/>
-            <a:ext cx="637786" cy="1084617"/>
-          </a:xfrm>
-          <a:prstGeom prst="rect">
-            <a:avLst/>
-          </a:prstGeom>
-        </p:spPr>
-      </p:pic>
-      <p:pic>
-        <p:nvPicPr>
-          <p:cNvPr id="42" name="Picture 41" descr="kill-bill.jpeg"/>
-          <p:cNvPicPr>
-            <a:picLocks noChangeAspect="1"/>
-          </p:cNvPicPr>
-          <p:nvPr/>
-        </p:nvPicPr>
-        <p:blipFill>
-          <a:blip r:embed="rId6">
-            <a:extLst>
-              <a:ext uri="{28A0092B-C50C-407E-A947-70E740481C1C}">
-                <a14:useLocalDpi xmlns:a14="http://schemas.microsoft.com/office/drawing/2010/main" val="0"/>
-              </a:ext>
-            </a:extLst>
-          </a:blip>
-          <a:stretch>
-            <a:fillRect/>
-          </a:stretch>
-        </p:blipFill>
-        <p:spPr>
-          <a:xfrm>
-            <a:off x="3788414" y="4596475"/>
-            <a:ext cx="559954" cy="990820"/>
-          </a:xfrm>
-          <a:prstGeom prst="rect">
-            <a:avLst/>
-          </a:prstGeom>
-        </p:spPr>
-      </p:pic>
-      <p:sp>
-        <p:nvSpPr>
-          <p:cNvPr id="52" name="TextBox 51"/>
-          <p:cNvSpPr txBox="1"/>
-          <p:nvPr/>
-        </p:nvSpPr>
-        <p:spPr>
-          <a:xfrm>
-            <a:off x="1851470" y="3740537"/>
-            <a:ext cx="791883" cy="707886"/>
-          </a:xfrm>
-          <a:prstGeom prst="rect">
-            <a:avLst/>
-          </a:prstGeom>
-          <a:noFill/>
-        </p:spPr>
-        <p:txBody>
-          <a:bodyPr wrap="square" rtlCol="0">
-            <a:spAutoFit/>
-          </a:bodyPr>
-          <a:lstStyle/>
-          <a:p>
-            <a:r>
-              <a:rPr lang="en-US" sz="2000" dirty="0" smtClean="0">
-                <a:solidFill>
-                  <a:srgbClr val="FF0000"/>
-                </a:solidFill>
-                <a:latin typeface="+mn-lt"/>
-              </a:rPr>
-              <a:t>False</a:t>
-            </a:r>
-          </a:p>
-          <a:p>
-            <a:r>
-              <a:rPr lang="en-US" sz="2000" dirty="0" smtClean="0">
-                <a:solidFill>
-                  <a:srgbClr val="FF0000"/>
-                </a:solidFill>
-                <a:latin typeface="+mn-lt"/>
-              </a:rPr>
-              <a:t>n/a</a:t>
-            </a:r>
-            <a:endParaRPr lang="en-US" sz="2000" dirty="0">
-              <a:solidFill>
-                <a:srgbClr val="FF0000"/>
-              </a:solidFill>
-              <a:latin typeface="+mn-lt"/>
-            </a:endParaRPr>
-          </a:p>
-        </p:txBody>
-      </p:sp>
-      <p:sp>
-        <p:nvSpPr>
-          <p:cNvPr id="55" name="TextBox 54"/>
-          <p:cNvSpPr txBox="1"/>
-          <p:nvPr/>
-        </p:nvSpPr>
-        <p:spPr>
-          <a:xfrm>
-            <a:off x="2981492" y="3740537"/>
-            <a:ext cx="791883" cy="707886"/>
-          </a:xfrm>
-          <a:prstGeom prst="rect">
-            <a:avLst/>
-          </a:prstGeom>
-          <a:noFill/>
-        </p:spPr>
-        <p:txBody>
-          <a:bodyPr wrap="square" rtlCol="0">
-            <a:spAutoFit/>
-          </a:bodyPr>
-          <a:lstStyle/>
-          <a:p>
-            <a:r>
-              <a:rPr lang="en-US" sz="2000" dirty="0" smtClean="0">
-                <a:solidFill>
-                  <a:srgbClr val="FF0000"/>
-                </a:solidFill>
-                <a:latin typeface="+mn-lt"/>
-              </a:rPr>
-              <a:t>False</a:t>
-            </a:r>
-          </a:p>
-          <a:p>
-            <a:r>
-              <a:rPr lang="en-US" sz="2000" dirty="0" smtClean="0">
-                <a:solidFill>
-                  <a:srgbClr val="FF0000"/>
-                </a:solidFill>
-                <a:latin typeface="+mn-lt"/>
-              </a:rPr>
-              <a:t>n/a</a:t>
-            </a:r>
-            <a:endParaRPr lang="en-US" sz="2000" dirty="0">
-              <a:solidFill>
-                <a:srgbClr val="FF0000"/>
-              </a:solidFill>
-              <a:latin typeface="+mn-lt"/>
-            </a:endParaRPr>
-          </a:p>
-        </p:txBody>
-      </p:sp>
-      <p:cxnSp>
-        <p:nvCxnSpPr>
-          <p:cNvPr id="53" name="Straight Arrow Connector 52"/>
-          <p:cNvCxnSpPr>
-            <a:stCxn id="37" idx="0"/>
-          </p:cNvCxnSpPr>
-          <p:nvPr/>
-        </p:nvCxnSpPr>
-        <p:spPr>
-          <a:xfrm flipV="1">
-            <a:off x="1411230" y="4372373"/>
-            <a:ext cx="1493" cy="177204"/>
-          </a:xfrm>
-          <a:prstGeom prst="straightConnector1">
-            <a:avLst/>
-          </a:prstGeom>
-          <a:ln>
-            <a:tailEnd type="arrow"/>
-          </a:ln>
-        </p:spPr>
-        <p:style>
-          <a:lnRef idx="2">
-            <a:schemeClr val="accent1"/>
-          </a:lnRef>
-          <a:fillRef idx="0">
-            <a:schemeClr val="accent1"/>
-          </a:fillRef>
-          <a:effectRef idx="1">
-            <a:schemeClr val="accent1"/>
-          </a:effectRef>
-          <a:fontRef idx="minor">
-            <a:schemeClr val="tx1"/>
-          </a:fontRef>
-        </p:style>
-      </p:cxnSp>
-      <p:cxnSp>
-        <p:nvCxnSpPr>
-          <p:cNvPr id="60" name="Straight Arrow Connector 59"/>
-          <p:cNvCxnSpPr>
-            <a:stCxn id="38" idx="0"/>
-          </p:cNvCxnSpPr>
-          <p:nvPr/>
-        </p:nvCxnSpPr>
-        <p:spPr>
-          <a:xfrm flipV="1">
-            <a:off x="2144667" y="4372373"/>
-            <a:ext cx="0" cy="224102"/>
-          </a:xfrm>
-          <a:prstGeom prst="straightConnector1">
-            <a:avLst/>
-          </a:prstGeom>
-          <a:ln>
-            <a:tailEnd type="arrow"/>
-          </a:ln>
-        </p:spPr>
-        <p:style>
-          <a:lnRef idx="2">
-            <a:schemeClr val="accent1"/>
-          </a:lnRef>
-          <a:fillRef idx="0">
-            <a:schemeClr val="accent1"/>
-          </a:fillRef>
-          <a:effectRef idx="1">
-            <a:schemeClr val="accent1"/>
-          </a:effectRef>
-          <a:fontRef idx="minor">
-            <a:schemeClr val="tx1"/>
-          </a:fontRef>
-        </p:style>
-      </p:cxnSp>
-      <p:cxnSp>
-        <p:nvCxnSpPr>
-          <p:cNvPr id="62" name="Straight Arrow Connector 61"/>
-          <p:cNvCxnSpPr>
-            <a:stCxn id="41" idx="0"/>
-          </p:cNvCxnSpPr>
-          <p:nvPr/>
-        </p:nvCxnSpPr>
-        <p:spPr>
-          <a:xfrm flipV="1">
-            <a:off x="3334954" y="4372373"/>
-            <a:ext cx="0" cy="177204"/>
-          </a:xfrm>
-          <a:prstGeom prst="straightConnector1">
-            <a:avLst/>
-          </a:prstGeom>
-          <a:ln>
-            <a:tailEnd type="arrow"/>
-          </a:ln>
-        </p:spPr>
-        <p:style>
-          <a:lnRef idx="2">
-            <a:schemeClr val="accent1"/>
-          </a:lnRef>
-          <a:fillRef idx="0">
-            <a:schemeClr val="accent1"/>
-          </a:fillRef>
-          <a:effectRef idx="1">
-            <a:schemeClr val="accent1"/>
-          </a:effectRef>
-          <a:fontRef idx="minor">
-            <a:schemeClr val="tx1"/>
-          </a:fontRef>
-        </p:style>
-      </p:cxnSp>
-      <p:cxnSp>
-        <p:nvCxnSpPr>
-          <p:cNvPr id="64" name="Straight Arrow Connector 63"/>
-          <p:cNvCxnSpPr>
-            <a:stCxn id="42" idx="0"/>
-          </p:cNvCxnSpPr>
-          <p:nvPr/>
-        </p:nvCxnSpPr>
-        <p:spPr>
-          <a:xfrm flipH="1" flipV="1">
-            <a:off x="4034879" y="4372373"/>
-            <a:ext cx="33512" cy="224102"/>
-          </a:xfrm>
-          <a:prstGeom prst="straightConnector1">
-            <a:avLst/>
-          </a:prstGeom>
-          <a:ln>
-            <a:tailEnd type="arrow"/>
-          </a:ln>
-        </p:spPr>
-        <p:style>
-          <a:lnRef idx="2">
-            <a:schemeClr val="accent1"/>
-          </a:lnRef>
-          <a:fillRef idx="0">
-            <a:schemeClr val="accent1"/>
-          </a:fillRef>
-          <a:effectRef idx="1">
-            <a:schemeClr val="accent1"/>
-          </a:effectRef>
-          <a:fontRef idx="minor">
-            <a:schemeClr val="tx1"/>
-          </a:fontRef>
-        </p:style>
-      </p:cxnSp>
-      <p:cxnSp>
-        <p:nvCxnSpPr>
-          <p:cNvPr id="71" name="Straight Arrow Connector 70"/>
-          <p:cNvCxnSpPr>
-            <a:stCxn id="29" idx="2"/>
-          </p:cNvCxnSpPr>
-          <p:nvPr/>
-        </p:nvCxnSpPr>
-        <p:spPr>
-          <a:xfrm>
-            <a:off x="3609429" y="3251491"/>
-            <a:ext cx="290232" cy="414787"/>
-          </a:xfrm>
-          <a:prstGeom prst="straightConnector1">
-            <a:avLst/>
-          </a:prstGeom>
-          <a:ln>
-            <a:tailEnd type="arrow"/>
-          </a:ln>
-        </p:spPr>
-        <p:style>
-          <a:lnRef idx="2">
-            <a:schemeClr val="accent1"/>
-          </a:lnRef>
-          <a:fillRef idx="0">
-            <a:schemeClr val="accent1"/>
-          </a:fillRef>
-          <a:effectRef idx="1">
-            <a:schemeClr val="accent1"/>
-          </a:effectRef>
-          <a:fontRef idx="minor">
-            <a:schemeClr val="tx1"/>
-          </a:fontRef>
-        </p:style>
-      </p:cxnSp>
-      <p:cxnSp>
-        <p:nvCxnSpPr>
-          <p:cNvPr id="76" name="Straight Arrow Connector 75"/>
-          <p:cNvCxnSpPr>
-            <a:stCxn id="24" idx="2"/>
-            <a:endCxn id="2" idx="0"/>
-          </p:cNvCxnSpPr>
-          <p:nvPr/>
-        </p:nvCxnSpPr>
-        <p:spPr>
-          <a:xfrm flipH="1">
-            <a:off x="1466297" y="3260456"/>
-            <a:ext cx="372580" cy="480081"/>
-          </a:xfrm>
-          <a:prstGeom prst="straightConnector1">
-            <a:avLst/>
-          </a:prstGeom>
-          <a:ln>
-            <a:tailEnd type="arrow"/>
-          </a:ln>
-        </p:spPr>
-        <p:style>
-          <a:lnRef idx="2">
-            <a:schemeClr val="accent1"/>
-          </a:lnRef>
-          <a:fillRef idx="0">
-            <a:schemeClr val="accent1"/>
-          </a:fillRef>
-          <a:effectRef idx="1">
-            <a:schemeClr val="accent1"/>
-          </a:effectRef>
-          <a:fontRef idx="minor">
-            <a:schemeClr val="tx1"/>
-          </a:fontRef>
-        </p:style>
-      </p:cxnSp>
-      <p:cxnSp>
-        <p:nvCxnSpPr>
-          <p:cNvPr id="78" name="Straight Arrow Connector 77"/>
-          <p:cNvCxnSpPr>
-            <a:stCxn id="24" idx="2"/>
-            <a:endCxn id="52" idx="0"/>
-          </p:cNvCxnSpPr>
-          <p:nvPr/>
-        </p:nvCxnSpPr>
-        <p:spPr>
-          <a:xfrm>
-            <a:off x="1838877" y="3260456"/>
-            <a:ext cx="408535" cy="480081"/>
-          </a:xfrm>
-          <a:prstGeom prst="straightConnector1">
-            <a:avLst/>
-          </a:prstGeom>
-          <a:ln>
-            <a:tailEnd type="arrow"/>
-          </a:ln>
-        </p:spPr>
-        <p:style>
-          <a:lnRef idx="2">
-            <a:schemeClr val="accent1"/>
-          </a:lnRef>
-          <a:fillRef idx="0">
-            <a:schemeClr val="accent1"/>
-          </a:fillRef>
-          <a:effectRef idx="1">
-            <a:schemeClr val="accent1"/>
-          </a:effectRef>
-          <a:fontRef idx="minor">
-            <a:schemeClr val="tx1"/>
-          </a:fontRef>
-        </p:style>
-      </p:cxnSp>
-      <p:sp>
-        <p:nvSpPr>
-          <p:cNvPr id="86" name="TextBox 85"/>
-          <p:cNvSpPr txBox="1"/>
-          <p:nvPr/>
-        </p:nvSpPr>
-        <p:spPr>
-          <a:xfrm>
-            <a:off x="2913317" y="5920910"/>
-            <a:ext cx="2085944" cy="707886"/>
-          </a:xfrm>
-          <a:prstGeom prst="rect">
-            <a:avLst/>
-          </a:prstGeom>
-          <a:noFill/>
-        </p:spPr>
-        <p:txBody>
-          <a:bodyPr wrap="square" rtlCol="0">
-            <a:spAutoFit/>
-          </a:bodyPr>
-          <a:lstStyle/>
-          <a:p>
-            <a:r>
-              <a:rPr lang="en-US" sz="2000" dirty="0" smtClean="0">
-                <a:solidFill>
-                  <a:srgbClr val="3366FF"/>
-                </a:solidFill>
-                <a:latin typeface="+mn-lt"/>
-              </a:rPr>
-              <a:t>runtime</a:t>
-            </a:r>
-            <a:r>
-              <a:rPr lang="en-US" sz="2000" dirty="0" smtClean="0">
-                <a:latin typeface="+mn-lt"/>
-              </a:rPr>
-              <a:t> = </a:t>
-            </a:r>
-            <a:r>
-              <a:rPr lang="en-US" sz="2000" dirty="0" smtClean="0">
-                <a:solidFill>
-                  <a:srgbClr val="FF0000"/>
-                </a:solidFill>
-                <a:latin typeface="+mn-lt"/>
-              </a:rPr>
-              <a:t>111 min</a:t>
-            </a:r>
-          </a:p>
-          <a:p>
-            <a:r>
-              <a:rPr lang="en-US" sz="2000" dirty="0">
-                <a:solidFill>
-                  <a:srgbClr val="3366FF"/>
-                </a:solidFill>
-                <a:latin typeface="+mn-lt"/>
-              </a:rPr>
-              <a:t>drama</a:t>
-            </a:r>
-            <a:r>
-              <a:rPr lang="en-US" sz="2000" dirty="0">
-                <a:latin typeface="+mn-lt"/>
-              </a:rPr>
-              <a:t> = </a:t>
-            </a:r>
-            <a:r>
-              <a:rPr lang="en-US" sz="2000" dirty="0">
-                <a:solidFill>
-                  <a:srgbClr val="FF0000"/>
-                </a:solidFill>
-                <a:latin typeface="+mn-lt"/>
-              </a:rPr>
-              <a:t>false</a:t>
-            </a:r>
-          </a:p>
-        </p:txBody>
-      </p:sp>
-      <p:cxnSp>
-        <p:nvCxnSpPr>
-          <p:cNvPr id="88" name="Straight Connector 87"/>
-          <p:cNvCxnSpPr/>
-          <p:nvPr/>
-        </p:nvCxnSpPr>
-        <p:spPr>
-          <a:xfrm>
-            <a:off x="1411230" y="5673884"/>
-            <a:ext cx="0" cy="286716"/>
-          </a:xfrm>
-          <a:prstGeom prst="line">
-            <a:avLst/>
-          </a:prstGeom>
-        </p:spPr>
-        <p:style>
-          <a:lnRef idx="2">
-            <a:schemeClr val="accent1"/>
-          </a:lnRef>
-          <a:fillRef idx="0">
-            <a:schemeClr val="accent1"/>
-          </a:fillRef>
-          <a:effectRef idx="1">
-            <a:schemeClr val="accent1"/>
-          </a:effectRef>
-          <a:fontRef idx="minor">
-            <a:schemeClr val="tx1"/>
-          </a:fontRef>
-        </p:style>
-      </p:cxnSp>
-      <p:sp>
-        <p:nvSpPr>
-          <p:cNvPr id="3" name="TextBox 2"/>
-          <p:cNvSpPr txBox="1"/>
-          <p:nvPr/>
-        </p:nvSpPr>
-        <p:spPr>
-          <a:xfrm>
-            <a:off x="5275148" y="1283969"/>
-            <a:ext cx="3663298" cy="3539431"/>
-          </a:xfrm>
-          <a:prstGeom prst="rect">
-            <a:avLst/>
-          </a:prstGeom>
-          <a:noFill/>
-        </p:spPr>
-        <p:txBody>
-          <a:bodyPr wrap="square" rtlCol="0">
-            <a:spAutoFit/>
-          </a:bodyPr>
-          <a:lstStyle/>
-          <a:p>
-            <a:pPr marL="285750" lvl="0" indent="-285750">
-              <a:buFont typeface="Arial"/>
-              <a:buChar char="•"/>
-            </a:pPr>
-            <a:r>
-              <a:rPr lang="en-US" sz="2800" dirty="0" smtClean="0">
-                <a:solidFill>
-                  <a:prstClr val="black"/>
-                </a:solidFill>
-                <a:latin typeface="Perpetua"/>
-              </a:rPr>
-              <a:t>Observed individuals: Steve </a:t>
-            </a:r>
-            <a:r>
-              <a:rPr lang="en-US" sz="2800" dirty="0" err="1" smtClean="0">
-                <a:solidFill>
-                  <a:prstClr val="black"/>
-                </a:solidFill>
-                <a:latin typeface="Perpetua"/>
-              </a:rPr>
-              <a:t>Buscemi</a:t>
-            </a:r>
-            <a:r>
-              <a:rPr lang="en-US" sz="2800" dirty="0" smtClean="0">
-                <a:solidFill>
-                  <a:prstClr val="black"/>
-                </a:solidFill>
-                <a:latin typeface="Perpetua"/>
-              </a:rPr>
-              <a:t> and Uma Thurman</a:t>
-            </a:r>
-          </a:p>
-          <a:p>
-            <a:pPr marL="285750" lvl="0" indent="-285750">
-              <a:buFont typeface="Arial"/>
-              <a:buChar char="•"/>
-            </a:pPr>
-            <a:r>
-              <a:rPr lang="en-US" sz="2800" dirty="0" smtClean="0">
-                <a:solidFill>
-                  <a:prstClr val="black"/>
-                </a:solidFill>
-                <a:latin typeface="Perpetua"/>
-              </a:rPr>
-              <a:t>complete </a:t>
-            </a:r>
-            <a:r>
-              <a:rPr lang="en-US" sz="2800" dirty="0">
-                <a:solidFill>
-                  <a:prstClr val="black"/>
-                </a:solidFill>
-                <a:latin typeface="Perpetua"/>
-              </a:rPr>
-              <a:t>information for Uma Thurman and Steve </a:t>
-            </a:r>
-            <a:r>
-              <a:rPr lang="en-US" sz="2800" dirty="0" err="1">
-                <a:solidFill>
-                  <a:prstClr val="black"/>
-                </a:solidFill>
-                <a:latin typeface="Perpetua"/>
-              </a:rPr>
-              <a:t>Buscemi</a:t>
-            </a:r>
-            <a:r>
-              <a:rPr lang="en-US" sz="2800" dirty="0">
-                <a:solidFill>
-                  <a:prstClr val="black"/>
-                </a:solidFill>
-                <a:latin typeface="Perpetua"/>
-              </a:rPr>
-              <a:t> </a:t>
-            </a:r>
-          </a:p>
-          <a:p>
-            <a:pPr marL="285750" indent="-285750">
-              <a:buFont typeface="Arial"/>
-              <a:buChar char="•"/>
-            </a:pPr>
-            <a:r>
-              <a:rPr lang="en-US" sz="2800" dirty="0" smtClean="0">
-                <a:latin typeface="+mn-lt"/>
-              </a:rPr>
-              <a:t>have not observed Brad Pitt and Lucy Liu</a:t>
-            </a:r>
-          </a:p>
-        </p:txBody>
-      </p:sp>
-      <p:sp>
-        <p:nvSpPr>
-          <p:cNvPr id="30" name="TextBox 29"/>
-          <p:cNvSpPr txBox="1"/>
-          <p:nvPr/>
-        </p:nvSpPr>
-        <p:spPr>
-          <a:xfrm>
-            <a:off x="927660" y="1387756"/>
-            <a:ext cx="1649506" cy="646331"/>
-          </a:xfrm>
-          <a:prstGeom prst="rect">
-            <a:avLst/>
-          </a:prstGeom>
-          <a:noFill/>
-        </p:spPr>
-        <p:txBody>
-          <a:bodyPr wrap="square" rtlCol="0">
-            <a:spAutoFit/>
-          </a:bodyPr>
-          <a:lstStyle/>
-          <a:p>
-            <a:r>
-              <a:rPr lang="en-US" dirty="0" smtClean="0">
-                <a:solidFill>
-                  <a:srgbClr val="3366FF"/>
-                </a:solidFill>
-                <a:latin typeface="+mn-lt"/>
-              </a:rPr>
-              <a:t>gender</a:t>
-            </a:r>
-            <a:r>
-              <a:rPr lang="en-US" dirty="0" smtClean="0">
-                <a:latin typeface="+mn-lt"/>
-              </a:rPr>
-              <a:t> = </a:t>
-            </a:r>
-            <a:r>
-              <a:rPr lang="en-US" dirty="0" smtClean="0">
-                <a:solidFill>
-                  <a:srgbClr val="FF0000"/>
-                </a:solidFill>
-                <a:latin typeface="+mn-lt"/>
-              </a:rPr>
-              <a:t>Man</a:t>
-            </a:r>
-          </a:p>
-          <a:p>
-            <a:r>
-              <a:rPr lang="en-US" dirty="0" smtClean="0">
-                <a:solidFill>
-                  <a:srgbClr val="3366FF"/>
-                </a:solidFill>
-                <a:latin typeface="+mn-lt"/>
-              </a:rPr>
-              <a:t>country</a:t>
-            </a:r>
-            <a:r>
-              <a:rPr lang="en-US" dirty="0" smtClean="0">
-                <a:latin typeface="+mn-lt"/>
-              </a:rPr>
-              <a:t> = </a:t>
-            </a:r>
-            <a:r>
-              <a:rPr lang="en-US" dirty="0" smtClean="0">
-                <a:solidFill>
-                  <a:srgbClr val="FF0000"/>
-                </a:solidFill>
-                <a:latin typeface="+mn-lt"/>
-              </a:rPr>
-              <a:t>U.S.</a:t>
-            </a:r>
-            <a:endParaRPr lang="en-US" dirty="0">
-              <a:solidFill>
-                <a:srgbClr val="FF0000"/>
-              </a:solidFill>
-              <a:latin typeface="+mn-lt"/>
-            </a:endParaRPr>
-          </a:p>
-        </p:txBody>
-      </p:sp>
-      <p:sp>
-        <p:nvSpPr>
-          <p:cNvPr id="31" name="TextBox 30"/>
-          <p:cNvSpPr txBox="1"/>
-          <p:nvPr/>
-        </p:nvSpPr>
-        <p:spPr>
-          <a:xfrm>
-            <a:off x="2851131" y="1387756"/>
-            <a:ext cx="2033480" cy="646331"/>
-          </a:xfrm>
-          <a:prstGeom prst="rect">
-            <a:avLst/>
-          </a:prstGeom>
-          <a:noFill/>
-        </p:spPr>
-        <p:txBody>
-          <a:bodyPr wrap="square" rtlCol="0">
-            <a:spAutoFit/>
-          </a:bodyPr>
-          <a:lstStyle/>
-          <a:p>
-            <a:r>
-              <a:rPr lang="en-US" dirty="0" smtClean="0">
-                <a:solidFill>
-                  <a:srgbClr val="3366FF"/>
-                </a:solidFill>
-                <a:latin typeface="+mn-lt"/>
-              </a:rPr>
-              <a:t>gender</a:t>
-            </a:r>
-            <a:r>
-              <a:rPr lang="en-US" dirty="0" smtClean="0">
-                <a:latin typeface="+mn-lt"/>
-              </a:rPr>
-              <a:t> = </a:t>
-            </a:r>
-            <a:r>
-              <a:rPr lang="en-US" dirty="0" smtClean="0">
-                <a:solidFill>
-                  <a:srgbClr val="FF0000"/>
-                </a:solidFill>
-                <a:latin typeface="+mn-lt"/>
-              </a:rPr>
-              <a:t>Woman</a:t>
-            </a:r>
-          </a:p>
-          <a:p>
-            <a:r>
-              <a:rPr lang="en-US" dirty="0" smtClean="0">
-                <a:solidFill>
-                  <a:srgbClr val="3366FF"/>
-                </a:solidFill>
-                <a:latin typeface="+mn-lt"/>
-              </a:rPr>
-              <a:t>country</a:t>
-            </a:r>
-            <a:r>
-              <a:rPr lang="en-US" dirty="0" smtClean="0">
-                <a:latin typeface="+mn-lt"/>
-              </a:rPr>
-              <a:t> = </a:t>
-            </a:r>
-            <a:r>
-              <a:rPr lang="en-US" dirty="0" smtClean="0">
-                <a:solidFill>
-                  <a:srgbClr val="FF0000"/>
-                </a:solidFill>
-                <a:latin typeface="+mn-lt"/>
-              </a:rPr>
-              <a:t>U.S.</a:t>
-            </a:r>
-            <a:endParaRPr lang="en-US" dirty="0">
-              <a:solidFill>
-                <a:srgbClr val="FF0000"/>
-              </a:solidFill>
-              <a:latin typeface="+mn-lt"/>
-            </a:endParaRPr>
-          </a:p>
-        </p:txBody>
-      </p:sp>
-      <p:sp>
-        <p:nvSpPr>
-          <p:cNvPr id="32" name="TextBox 31"/>
-          <p:cNvSpPr txBox="1"/>
-          <p:nvPr/>
-        </p:nvSpPr>
-        <p:spPr>
-          <a:xfrm>
-            <a:off x="625879" y="5882905"/>
-            <a:ext cx="1951287" cy="707886"/>
-          </a:xfrm>
-          <a:prstGeom prst="rect">
-            <a:avLst/>
-          </a:prstGeom>
-          <a:noFill/>
-        </p:spPr>
-        <p:txBody>
-          <a:bodyPr wrap="square" rtlCol="0">
-            <a:spAutoFit/>
-          </a:bodyPr>
-          <a:lstStyle/>
-          <a:p>
-            <a:r>
-              <a:rPr lang="en-US" sz="2000" dirty="0" smtClean="0">
-                <a:solidFill>
-                  <a:srgbClr val="3366FF"/>
-                </a:solidFill>
-                <a:latin typeface="+mn-lt"/>
-              </a:rPr>
-              <a:t>runtime</a:t>
-            </a:r>
-            <a:r>
-              <a:rPr lang="en-US" sz="2000" dirty="0" smtClean="0">
-                <a:latin typeface="+mn-lt"/>
-              </a:rPr>
-              <a:t> = </a:t>
-            </a:r>
-            <a:r>
-              <a:rPr lang="en-US" sz="2000" dirty="0" smtClean="0">
-                <a:solidFill>
-                  <a:srgbClr val="FF0000"/>
-                </a:solidFill>
-                <a:latin typeface="+mn-lt"/>
-              </a:rPr>
-              <a:t>98 min</a:t>
-            </a:r>
-          </a:p>
-          <a:p>
-            <a:r>
-              <a:rPr lang="en-US" sz="2000" dirty="0" smtClean="0">
-                <a:solidFill>
-                  <a:srgbClr val="3366FF"/>
-                </a:solidFill>
-                <a:latin typeface="+mn-lt"/>
-              </a:rPr>
-              <a:t>drama</a:t>
-            </a:r>
-            <a:r>
-              <a:rPr lang="en-US" sz="2000" dirty="0" smtClean="0">
-                <a:latin typeface="+mn-lt"/>
-              </a:rPr>
-              <a:t> = </a:t>
-            </a:r>
-            <a:r>
-              <a:rPr lang="en-US" sz="2000" dirty="0" smtClean="0">
-                <a:solidFill>
-                  <a:srgbClr val="FF0000"/>
-                </a:solidFill>
-                <a:latin typeface="+mn-lt"/>
-              </a:rPr>
-              <a:t>true</a:t>
-            </a:r>
-            <a:endParaRPr lang="en-US" sz="2000" dirty="0">
-              <a:solidFill>
-                <a:srgbClr val="FF0000"/>
-              </a:solidFill>
-              <a:latin typeface="+mn-lt"/>
-            </a:endParaRPr>
-          </a:p>
-        </p:txBody>
-      </p:sp>
-      <p:cxnSp>
-        <p:nvCxnSpPr>
-          <p:cNvPr id="33" name="Straight Connector 32"/>
-          <p:cNvCxnSpPr/>
-          <p:nvPr/>
-        </p:nvCxnSpPr>
-        <p:spPr>
-          <a:xfrm>
-            <a:off x="4034879" y="5587295"/>
-            <a:ext cx="0" cy="451067"/>
-          </a:xfrm>
-          <a:prstGeom prst="line">
-            <a:avLst/>
-          </a:prstGeom>
-        </p:spPr>
-        <p:style>
-          <a:lnRef idx="2">
-            <a:schemeClr val="accent1"/>
-          </a:lnRef>
-          <a:fillRef idx="0">
-            <a:schemeClr val="accent1"/>
-          </a:fillRef>
-          <a:effectRef idx="1">
-            <a:schemeClr val="accent1"/>
-          </a:effectRef>
-          <a:fontRef idx="minor">
-            <a:schemeClr val="tx1"/>
-          </a:fontRef>
-        </p:style>
-      </p:cxnSp>
-    </p:spTree>
-    <p:extLst>
-      <p:ext uri="{BB962C8B-B14F-4D97-AF65-F5344CB8AC3E}">
-        <p14:creationId xmlns:p14="http://schemas.microsoft.com/office/powerpoint/2010/main" val="356910493"/>
-      </p:ext>
-    </p:extLst>
-  </p:cSld>
-  <p:clrMapOvr>
-    <a:masterClrMapping/>
-  </p:clrMapOvr>
-  <p:timing>
-    <p:tnLst>
-      <p:par>
-        <p:cTn xmlns:p14="http://schemas.microsoft.com/office/powerpoint/2010/main" id="1" dur="indefinite" restart="never" nodeType="tmRoot"/>
-      </p:par>
-    </p:tnLst>
-  </p:timing>
-</p:sld>
-</file>
-
-<file path=ppt/slides/slide35.xml><?xml version="1.0" encoding="utf-8"?>
-<p:sld xmlns:a="http://schemas.openxmlformats.org/drawingml/2006/main" xmlns:r="http://schemas.openxmlformats.org/officeDocument/2006/relationships" xmlns:p="http://schemas.openxmlformats.org/presentationml/2006/main">
-  <p:cSld>
-    <p:spTree>
-      <p:nvGrpSpPr>
-        <p:cNvPr id="1" name=""/>
-        <p:cNvGrpSpPr/>
-        <p:nvPr/>
-      </p:nvGrpSpPr>
-      <p:grpSpPr>
-        <a:xfrm>
-          <a:off x="0" y="0"/>
-          <a:ext cx="0" cy="0"/>
-          <a:chOff x="0" y="0"/>
-          <a:chExt cx="0" cy="0"/>
-        </a:xfrm>
-      </p:grpSpPr>
-      <p:sp>
-        <p:nvSpPr>
-          <p:cNvPr id="4" name="Title 3"/>
-          <p:cNvSpPr>
-            <a:spLocks noGrp="1"/>
-          </p:cNvSpPr>
-          <p:nvPr>
-            <p:ph type="title"/>
-          </p:nvPr>
-        </p:nvSpPr>
-        <p:spPr>
-          <a:xfrm>
-            <a:off x="651756" y="688008"/>
-            <a:ext cx="7772400" cy="1500450"/>
-          </a:xfrm>
-        </p:spPr>
-        <p:txBody>
-          <a:bodyPr>
-            <a:normAutofit/>
-          </a:bodyPr>
-          <a:lstStyle/>
-          <a:p>
-            <a:r>
-              <a:rPr lang="en-US" dirty="0" smtClean="0"/>
-              <a:t>Representations of Relational Data</a:t>
-            </a:r>
-            <a:endParaRPr lang="en-US" b="0" dirty="0"/>
-          </a:p>
-        </p:txBody>
-      </p:sp>
-    </p:spTree>
-    <p:extLst>
-      <p:ext uri="{BB962C8B-B14F-4D97-AF65-F5344CB8AC3E}">
-        <p14:creationId xmlns:p14="http://schemas.microsoft.com/office/powerpoint/2010/main" val="3646800642"/>
-      </p:ext>
-    </p:extLst>
-  </p:cSld>
-  <p:clrMapOvr>
-    <a:masterClrMapping/>
-  </p:clrMapOvr>
-  <p:timing>
-    <p:tnLst>
-      <p:par>
-        <p:cTn xmlns:p14="http://schemas.microsoft.com/office/powerpoint/2010/main" id="1" dur="indefinite" restart="never" nodeType="tmRoot"/>
-      </p:par>
-    </p:tnLst>
-  </p:timing>
-</p:sld>
-</file>
-
-<file path=ppt/slides/slide36.xml><?xml version="1.0" encoding="utf-8"?>
-<p:sld xmlns:a="http://schemas.openxmlformats.org/drawingml/2006/main" xmlns:r="http://schemas.openxmlformats.org/officeDocument/2006/relationships" xmlns:p="http://schemas.openxmlformats.org/presentationml/2006/main">
-  <p:cSld>
-    <p:spTree>
-      <p:nvGrpSpPr>
-        <p:cNvPr id="1" name=""/>
-        <p:cNvGrpSpPr/>
-        <p:nvPr/>
-      </p:nvGrpSpPr>
-      <p:grpSpPr>
-        <a:xfrm>
-          <a:off x="0" y="0"/>
-          <a:ext cx="0" cy="0"/>
-          <a:chOff x="0" y="0"/>
-          <a:chExt cx="0" cy="0"/>
-        </a:xfrm>
-      </p:grpSpPr>
-      <p:sp>
-        <p:nvSpPr>
-          <p:cNvPr id="2" name="Title 1"/>
-          <p:cNvSpPr>
-            <a:spLocks noGrp="1"/>
-          </p:cNvSpPr>
-          <p:nvPr>
-            <p:ph type="title"/>
-          </p:nvPr>
-        </p:nvSpPr>
-        <p:spPr/>
-        <p:txBody>
-          <a:bodyPr/>
-          <a:lstStyle/>
-          <a:p>
-            <a:r>
-              <a:rPr lang="en-US" dirty="0" smtClean="0"/>
-              <a:t>Relational Data Formats</a:t>
-            </a:r>
-            <a:endParaRPr lang="en-US" dirty="0"/>
-          </a:p>
-        </p:txBody>
-      </p:sp>
-      <p:sp>
-        <p:nvSpPr>
-          <p:cNvPr id="4" name="Footer Placeholder 3"/>
-          <p:cNvSpPr>
-            <a:spLocks noGrp="1"/>
-          </p:cNvSpPr>
-          <p:nvPr>
-            <p:ph type="ftr" sz="quarter" idx="11"/>
-          </p:nvPr>
-        </p:nvSpPr>
-        <p:spPr>
-          <a:xfrm>
-            <a:off x="914400" y="5855900"/>
-            <a:ext cx="6870886" cy="724015"/>
-          </a:xfrm>
-        </p:spPr>
-        <p:txBody>
-          <a:bodyPr/>
-          <a:lstStyle/>
-          <a:p>
-            <a:r>
-              <a:rPr lang="en-US" dirty="0" smtClean="0"/>
-              <a:t>Sun, Y. &amp; Han, J. (2012), Mining Heterogeneous Information Networks: Principles and Methodologies, Morgan &amp; Claypool Publishers.</a:t>
-            </a:r>
-            <a:br>
-              <a:rPr lang="en-US" dirty="0" smtClean="0"/>
-            </a:br>
-            <a:r>
-              <a:rPr lang="en-US" dirty="0" smtClean="0"/>
-              <a:t>Nickel, M.; Murphy, K.; </a:t>
-            </a:r>
-            <a:r>
-              <a:rPr lang="en-US" dirty="0" err="1" smtClean="0"/>
-              <a:t>Tresp</a:t>
-            </a:r>
-            <a:r>
-              <a:rPr lang="en-US" dirty="0" smtClean="0"/>
-              <a:t>, V. &amp; </a:t>
-            </a:r>
-            <a:r>
-              <a:rPr lang="en-US" dirty="0" err="1" smtClean="0"/>
-              <a:t>Gabrilovich</a:t>
-            </a:r>
-            <a:r>
-              <a:rPr lang="en-US" dirty="0" smtClean="0"/>
-              <a:t>, E. (2015), 'A Review of Relational Machine Learning for Knowledge Graphs', </a:t>
-            </a:r>
-            <a:r>
-              <a:rPr lang="en-US" i="1" dirty="0" err="1" smtClean="0"/>
-              <a:t>ArXiv</a:t>
-            </a:r>
-            <a:r>
-              <a:rPr lang="en-US" i="1" dirty="0" smtClean="0"/>
-              <a:t> e-prints .</a:t>
-            </a:r>
-            <a:endParaRPr lang="en-US" i="1" dirty="0"/>
-          </a:p>
-        </p:txBody>
-      </p:sp>
-      <p:sp>
-        <p:nvSpPr>
-          <p:cNvPr id="6" name="TextBox 5"/>
-          <p:cNvSpPr txBox="1"/>
-          <p:nvPr/>
-        </p:nvSpPr>
-        <p:spPr>
-          <a:xfrm>
-            <a:off x="1245105" y="2840161"/>
-            <a:ext cx="1369023" cy="400110"/>
-          </a:xfrm>
-          <a:prstGeom prst="rect">
-            <a:avLst/>
-          </a:prstGeom>
-          <a:noFill/>
-        </p:spPr>
-        <p:txBody>
-          <a:bodyPr wrap="square" rtlCol="0">
-            <a:spAutoFit/>
-          </a:bodyPr>
-          <a:lstStyle/>
-          <a:p>
-            <a:r>
-              <a:rPr lang="en-US" sz="2000" dirty="0" smtClean="0">
-                <a:latin typeface="+mn-lt"/>
-              </a:rPr>
-              <a:t>graphical</a:t>
-            </a:r>
-            <a:endParaRPr lang="en-US" sz="2000" dirty="0">
-              <a:latin typeface="+mn-lt"/>
-            </a:endParaRPr>
-          </a:p>
-        </p:txBody>
-      </p:sp>
-      <p:sp>
-        <p:nvSpPr>
-          <p:cNvPr id="10" name="TextBox 9"/>
-          <p:cNvSpPr txBox="1"/>
-          <p:nvPr/>
-        </p:nvSpPr>
-        <p:spPr>
-          <a:xfrm>
-            <a:off x="3309790" y="1748530"/>
-            <a:ext cx="2457643" cy="584776"/>
-          </a:xfrm>
-          <a:prstGeom prst="rect">
-            <a:avLst/>
-          </a:prstGeom>
-          <a:noFill/>
-          <a:ln>
-            <a:solidFill>
-              <a:schemeClr val="tx1"/>
-            </a:solidFill>
-          </a:ln>
-        </p:spPr>
-        <p:txBody>
-          <a:bodyPr wrap="square" rtlCol="0">
-            <a:spAutoFit/>
-          </a:bodyPr>
-          <a:lstStyle/>
-          <a:p>
-            <a:r>
-              <a:rPr lang="en-US" sz="3200" dirty="0" smtClean="0">
-                <a:latin typeface="+mn-lt"/>
-              </a:rPr>
-              <a:t>Data Format</a:t>
-            </a:r>
-            <a:endParaRPr lang="en-US" sz="3200" dirty="0">
-              <a:latin typeface="+mn-lt"/>
-            </a:endParaRPr>
-          </a:p>
-        </p:txBody>
-      </p:sp>
-      <p:sp>
-        <p:nvSpPr>
-          <p:cNvPr id="11" name="TextBox 10"/>
-          <p:cNvSpPr txBox="1"/>
-          <p:nvPr/>
-        </p:nvSpPr>
-        <p:spPr>
-          <a:xfrm>
-            <a:off x="432372" y="3822261"/>
-            <a:ext cx="2418583" cy="1569660"/>
-          </a:xfrm>
-          <a:prstGeom prst="rect">
-            <a:avLst/>
-          </a:prstGeom>
-          <a:noFill/>
-          <a:ln>
-            <a:solidFill>
-              <a:schemeClr val="tx1"/>
-            </a:solidFill>
-          </a:ln>
-        </p:spPr>
-        <p:txBody>
-          <a:bodyPr wrap="square" rtlCol="0">
-            <a:spAutoFit/>
-          </a:bodyPr>
-          <a:lstStyle/>
-          <a:p>
-            <a:r>
-              <a:rPr lang="en-US" sz="2400" b="1" dirty="0">
-                <a:latin typeface="+mn-lt"/>
-              </a:rPr>
-              <a:t>Nodes and edges in </a:t>
-            </a:r>
-            <a:r>
-              <a:rPr lang="en-US" sz="2400" b="1" dirty="0" err="1">
-                <a:latin typeface="+mn-lt"/>
-              </a:rPr>
-              <a:t>heterogenous</a:t>
-            </a:r>
-            <a:r>
-              <a:rPr lang="en-US" sz="2400" b="1" dirty="0">
-                <a:latin typeface="+mn-lt"/>
-              </a:rPr>
-              <a:t> network </a:t>
-            </a:r>
-            <a:r>
-              <a:rPr lang="en-US" sz="2400" b="1" dirty="0" smtClean="0">
-                <a:latin typeface="+mn-lt"/>
-              </a:rPr>
-              <a:t/>
-            </a:r>
-            <a:br>
-              <a:rPr lang="en-US" sz="2400" b="1" dirty="0" smtClean="0">
-                <a:latin typeface="+mn-lt"/>
-              </a:rPr>
-            </a:br>
-            <a:r>
-              <a:rPr lang="en-US" sz="2400" dirty="0" smtClean="0">
-                <a:latin typeface="+mn-lt"/>
-              </a:rPr>
-              <a:t>(</a:t>
-            </a:r>
-            <a:r>
-              <a:rPr lang="en-US" sz="2400" dirty="0">
-                <a:latin typeface="+mn-lt"/>
-              </a:rPr>
-              <a:t>Sun and </a:t>
-            </a:r>
-            <a:r>
-              <a:rPr lang="en-US" sz="2400" dirty="0" smtClean="0">
-                <a:latin typeface="+mn-lt"/>
-              </a:rPr>
-              <a:t>Han 2012)</a:t>
-            </a:r>
-            <a:endParaRPr lang="en-US" sz="2400" dirty="0">
-              <a:latin typeface="+mn-lt"/>
-            </a:endParaRPr>
-          </a:p>
-        </p:txBody>
-      </p:sp>
-      <p:sp>
-        <p:nvSpPr>
-          <p:cNvPr id="12" name="TextBox 11"/>
-          <p:cNvSpPr txBox="1"/>
-          <p:nvPr/>
-        </p:nvSpPr>
-        <p:spPr>
-          <a:xfrm>
-            <a:off x="3019871" y="4130038"/>
-            <a:ext cx="1411946" cy="1200328"/>
-          </a:xfrm>
-          <a:prstGeom prst="rect">
-            <a:avLst/>
-          </a:prstGeom>
-          <a:noFill/>
-          <a:ln>
-            <a:solidFill>
-              <a:schemeClr val="tx1"/>
-            </a:solidFill>
-          </a:ln>
-        </p:spPr>
-        <p:txBody>
-          <a:bodyPr wrap="square" rtlCol="0">
-            <a:spAutoFit/>
-          </a:bodyPr>
-          <a:lstStyle/>
-          <a:p>
-            <a:r>
-              <a:rPr lang="en-US" sz="2400" b="1" dirty="0" smtClean="0">
-                <a:latin typeface="+mn-lt"/>
-              </a:rPr>
-              <a:t>Database Tables</a:t>
-            </a:r>
-          </a:p>
-          <a:p>
-            <a:r>
-              <a:rPr lang="en-US" sz="2400" b="1" dirty="0" smtClean="0">
-                <a:latin typeface="+mn-lt"/>
-              </a:rPr>
-              <a:t>SQL</a:t>
-            </a:r>
-            <a:endParaRPr lang="en-US" sz="2400" b="1" dirty="0">
-              <a:latin typeface="+mn-lt"/>
-            </a:endParaRPr>
-          </a:p>
-        </p:txBody>
-      </p:sp>
-      <p:sp>
-        <p:nvSpPr>
-          <p:cNvPr id="13" name="TextBox 12"/>
-          <p:cNvSpPr txBox="1"/>
-          <p:nvPr/>
-        </p:nvSpPr>
-        <p:spPr>
-          <a:xfrm>
-            <a:off x="4563684" y="3837650"/>
-            <a:ext cx="2935274" cy="1938992"/>
-          </a:xfrm>
-          <a:prstGeom prst="rect">
-            <a:avLst/>
-          </a:prstGeom>
-          <a:noFill/>
-          <a:ln>
-            <a:solidFill>
-              <a:schemeClr val="tx1"/>
-            </a:solidFill>
-          </a:ln>
-        </p:spPr>
-        <p:txBody>
-          <a:bodyPr wrap="square" rtlCol="0">
-            <a:spAutoFit/>
-          </a:bodyPr>
-          <a:lstStyle/>
-          <a:p>
-            <a:r>
-              <a:rPr lang="en-US" sz="2400" dirty="0" smtClean="0">
-                <a:latin typeface="+mn-lt"/>
-              </a:rPr>
-              <a:t>Logical Facts</a:t>
-            </a:r>
-          </a:p>
-          <a:p>
-            <a:pPr marL="342900" indent="-342900">
-              <a:buFont typeface="Arial"/>
-              <a:buChar char="•"/>
-            </a:pPr>
-            <a:r>
-              <a:rPr lang="en-US" sz="2400" dirty="0" smtClean="0">
-                <a:latin typeface="+mn-lt"/>
-              </a:rPr>
-              <a:t>Knowledge Graph Triples </a:t>
-            </a:r>
-            <a:br>
-              <a:rPr lang="en-US" sz="2400" dirty="0" smtClean="0">
-                <a:latin typeface="+mn-lt"/>
-              </a:rPr>
-            </a:br>
-            <a:r>
-              <a:rPr lang="en-US" sz="2400" dirty="0" smtClean="0">
-                <a:latin typeface="+mn-lt"/>
-              </a:rPr>
-              <a:t>(</a:t>
-            </a:r>
-            <a:r>
-              <a:rPr lang="en-US" sz="2400" dirty="0">
-                <a:latin typeface="+mn-lt"/>
-              </a:rPr>
-              <a:t>Nickel et al. 2015)</a:t>
-            </a:r>
-            <a:endParaRPr lang="en-US" sz="2400" dirty="0" smtClean="0">
-              <a:latin typeface="+mn-lt"/>
-            </a:endParaRPr>
-          </a:p>
-          <a:p>
-            <a:pPr marL="342900" indent="-342900">
-              <a:buFont typeface="Arial"/>
-              <a:buChar char="•"/>
-            </a:pPr>
-            <a:r>
-              <a:rPr lang="en-US" sz="2400" dirty="0" smtClean="0">
-                <a:latin typeface="+mn-lt"/>
-              </a:rPr>
-              <a:t>Atoms/Literals</a:t>
-            </a:r>
-            <a:endParaRPr lang="en-US" sz="2400" dirty="0">
-              <a:latin typeface="+mn-lt"/>
-            </a:endParaRPr>
-          </a:p>
-        </p:txBody>
-      </p:sp>
-      <p:cxnSp>
-        <p:nvCxnSpPr>
-          <p:cNvPr id="15" name="Straight Arrow Connector 14"/>
-          <p:cNvCxnSpPr>
-            <a:stCxn id="10" idx="2"/>
-          </p:cNvCxnSpPr>
-          <p:nvPr/>
-        </p:nvCxnSpPr>
-        <p:spPr>
-          <a:xfrm flipH="1">
-            <a:off x="1907780" y="2333306"/>
-            <a:ext cx="2630832" cy="1488955"/>
-          </a:xfrm>
-          <a:prstGeom prst="straightConnector1">
-            <a:avLst/>
-          </a:prstGeom>
-          <a:ln>
-            <a:tailEnd type="arrow"/>
-          </a:ln>
-        </p:spPr>
-        <p:style>
-          <a:lnRef idx="2">
-            <a:schemeClr val="accent1"/>
-          </a:lnRef>
-          <a:fillRef idx="0">
-            <a:schemeClr val="accent1"/>
-          </a:fillRef>
-          <a:effectRef idx="1">
-            <a:schemeClr val="accent1"/>
-          </a:effectRef>
-          <a:fontRef idx="minor">
-            <a:schemeClr val="tx1"/>
-          </a:fontRef>
-        </p:style>
-      </p:cxnSp>
-      <p:cxnSp>
-        <p:nvCxnSpPr>
-          <p:cNvPr id="17" name="Straight Arrow Connector 16"/>
-          <p:cNvCxnSpPr>
-            <a:stCxn id="10" idx="2"/>
-            <a:endCxn id="12" idx="0"/>
-          </p:cNvCxnSpPr>
-          <p:nvPr/>
-        </p:nvCxnSpPr>
-        <p:spPr>
-          <a:xfrm flipH="1">
-            <a:off x="3725844" y="2333306"/>
-            <a:ext cx="812768" cy="1796732"/>
-          </a:xfrm>
-          <a:prstGeom prst="straightConnector1">
-            <a:avLst/>
-          </a:prstGeom>
-          <a:ln>
-            <a:tailEnd type="arrow"/>
-          </a:ln>
-        </p:spPr>
-        <p:style>
-          <a:lnRef idx="2">
-            <a:schemeClr val="accent1"/>
-          </a:lnRef>
-          <a:fillRef idx="0">
-            <a:schemeClr val="accent1"/>
-          </a:fillRef>
-          <a:effectRef idx="1">
-            <a:schemeClr val="accent1"/>
-          </a:effectRef>
-          <a:fontRef idx="minor">
-            <a:schemeClr val="tx1"/>
-          </a:fontRef>
-        </p:style>
-      </p:cxnSp>
-      <p:cxnSp>
-        <p:nvCxnSpPr>
-          <p:cNvPr id="19" name="Straight Arrow Connector 18"/>
-          <p:cNvCxnSpPr>
-            <a:stCxn id="10" idx="2"/>
-          </p:cNvCxnSpPr>
-          <p:nvPr/>
-        </p:nvCxnSpPr>
-        <p:spPr>
-          <a:xfrm>
-            <a:off x="4538612" y="2333306"/>
-            <a:ext cx="1863835" cy="1488955"/>
-          </a:xfrm>
-          <a:prstGeom prst="straightConnector1">
-            <a:avLst/>
-          </a:prstGeom>
-          <a:ln>
-            <a:tailEnd type="arrow"/>
-          </a:ln>
-        </p:spPr>
-        <p:style>
-          <a:lnRef idx="2">
-            <a:schemeClr val="accent1"/>
-          </a:lnRef>
-          <a:fillRef idx="0">
-            <a:schemeClr val="accent1"/>
-          </a:fillRef>
-          <a:effectRef idx="1">
-            <a:schemeClr val="accent1"/>
-          </a:effectRef>
-          <a:fontRef idx="minor">
-            <a:schemeClr val="tx1"/>
-          </a:fontRef>
-        </p:style>
-      </p:cxnSp>
-      <p:sp>
-        <p:nvSpPr>
-          <p:cNvPr id="20" name="TextBox 19"/>
-          <p:cNvSpPr txBox="1"/>
-          <p:nvPr/>
-        </p:nvSpPr>
-        <p:spPr>
-          <a:xfrm>
-            <a:off x="3019871" y="3391990"/>
-            <a:ext cx="1115613" cy="400110"/>
-          </a:xfrm>
-          <a:prstGeom prst="rect">
-            <a:avLst/>
-          </a:prstGeom>
-          <a:noFill/>
-        </p:spPr>
-        <p:txBody>
-          <a:bodyPr wrap="square" rtlCol="0">
-            <a:spAutoFit/>
-          </a:bodyPr>
-          <a:lstStyle/>
-          <a:p>
-            <a:r>
-              <a:rPr lang="en-US" sz="2000" dirty="0" smtClean="0">
-                <a:latin typeface="+mn-lt"/>
-              </a:rPr>
-              <a:t>tabular</a:t>
-            </a:r>
-            <a:endParaRPr lang="en-US" sz="2000" dirty="0">
-              <a:latin typeface="+mn-lt"/>
-            </a:endParaRPr>
-          </a:p>
-        </p:txBody>
-      </p:sp>
-      <p:sp>
-        <p:nvSpPr>
-          <p:cNvPr id="21" name="TextBox 20"/>
-          <p:cNvSpPr txBox="1"/>
-          <p:nvPr/>
-        </p:nvSpPr>
-        <p:spPr>
-          <a:xfrm>
-            <a:off x="4988374" y="3266506"/>
-            <a:ext cx="1004002" cy="400110"/>
-          </a:xfrm>
-          <a:prstGeom prst="rect">
-            <a:avLst/>
-          </a:prstGeom>
-          <a:noFill/>
-        </p:spPr>
-        <p:txBody>
-          <a:bodyPr wrap="square" rtlCol="0">
-            <a:spAutoFit/>
-          </a:bodyPr>
-          <a:lstStyle/>
-          <a:p>
-            <a:r>
-              <a:rPr lang="en-US" sz="2000" dirty="0" smtClean="0">
-                <a:latin typeface="+mn-lt"/>
-              </a:rPr>
-              <a:t>logical</a:t>
-            </a:r>
-            <a:endParaRPr lang="en-US" sz="2000" dirty="0">
-              <a:latin typeface="+mn-lt"/>
-            </a:endParaRPr>
-          </a:p>
-        </p:txBody>
-      </p:sp>
-      <p:sp>
-        <p:nvSpPr>
-          <p:cNvPr id="16" name="TextBox 15"/>
-          <p:cNvSpPr txBox="1"/>
-          <p:nvPr/>
-        </p:nvSpPr>
-        <p:spPr>
-          <a:xfrm>
-            <a:off x="7660211" y="3839846"/>
-            <a:ext cx="1229145" cy="830997"/>
-          </a:xfrm>
-          <a:prstGeom prst="rect">
-            <a:avLst/>
-          </a:prstGeom>
-          <a:noFill/>
-          <a:ln>
-            <a:solidFill>
-              <a:schemeClr val="tx1"/>
-            </a:solidFill>
-          </a:ln>
-        </p:spPr>
-        <p:txBody>
-          <a:bodyPr wrap="square" rtlCol="0">
-            <a:spAutoFit/>
-          </a:bodyPr>
-          <a:lstStyle/>
-          <a:p>
-            <a:r>
-              <a:rPr lang="en-US" sz="2400" dirty="0" smtClean="0">
-                <a:latin typeface="+mn-lt"/>
-              </a:rPr>
-              <a:t>Matrices</a:t>
-            </a:r>
-          </a:p>
-          <a:p>
-            <a:r>
-              <a:rPr lang="en-US" sz="2400" dirty="0" smtClean="0">
-                <a:latin typeface="+mn-lt"/>
-              </a:rPr>
-              <a:t>Tensors</a:t>
-            </a:r>
-            <a:endParaRPr lang="en-US" sz="2400" dirty="0">
-              <a:latin typeface="+mn-lt"/>
-            </a:endParaRPr>
-          </a:p>
-        </p:txBody>
-      </p:sp>
-      <p:cxnSp>
-        <p:nvCxnSpPr>
-          <p:cNvPr id="7" name="Straight Arrow Connector 6"/>
-          <p:cNvCxnSpPr>
-            <a:stCxn id="10" idx="2"/>
-            <a:endCxn id="16" idx="0"/>
-          </p:cNvCxnSpPr>
-          <p:nvPr/>
-        </p:nvCxnSpPr>
-        <p:spPr>
-          <a:xfrm>
-            <a:off x="4538612" y="2333306"/>
-            <a:ext cx="3736172" cy="1506540"/>
-          </a:xfrm>
-          <a:prstGeom prst="straightConnector1">
-            <a:avLst/>
-          </a:prstGeom>
-          <a:ln>
-            <a:tailEnd type="arrow"/>
-          </a:ln>
-        </p:spPr>
-        <p:style>
-          <a:lnRef idx="2">
-            <a:schemeClr val="accent1"/>
-          </a:lnRef>
-          <a:fillRef idx="0">
-            <a:schemeClr val="accent1"/>
-          </a:fillRef>
-          <a:effectRef idx="1">
-            <a:schemeClr val="accent1"/>
-          </a:effectRef>
-          <a:fontRef idx="minor">
-            <a:schemeClr val="tx1"/>
-          </a:fontRef>
-        </p:style>
-      </p:cxnSp>
-      <p:sp>
-        <p:nvSpPr>
-          <p:cNvPr id="18" name="TextBox 17"/>
-          <p:cNvSpPr txBox="1"/>
-          <p:nvPr/>
-        </p:nvSpPr>
-        <p:spPr>
-          <a:xfrm>
-            <a:off x="7660212" y="3207324"/>
-            <a:ext cx="1049713" cy="400110"/>
-          </a:xfrm>
-          <a:prstGeom prst="rect">
-            <a:avLst/>
-          </a:prstGeom>
-          <a:noFill/>
-        </p:spPr>
-        <p:txBody>
-          <a:bodyPr wrap="square" rtlCol="0">
-            <a:spAutoFit/>
-          </a:bodyPr>
-          <a:lstStyle/>
-          <a:p>
-            <a:r>
-              <a:rPr lang="en-US" sz="2000" dirty="0" smtClean="0">
-                <a:latin typeface="+mn-lt"/>
-              </a:rPr>
-              <a:t>arrays</a:t>
-            </a:r>
-            <a:endParaRPr lang="en-US" sz="2000" dirty="0">
-              <a:latin typeface="+mn-lt"/>
-            </a:endParaRPr>
-          </a:p>
-        </p:txBody>
-      </p:sp>
-    </p:spTree>
-    <p:extLst>
-      <p:ext uri="{BB962C8B-B14F-4D97-AF65-F5344CB8AC3E}">
-        <p14:creationId xmlns:p14="http://schemas.microsoft.com/office/powerpoint/2010/main" val="819989809"/>
+        <p14:creationId xmlns:p14="http://schemas.microsoft.com/office/powerpoint/2010/main" val="1319617307"/>
       </p:ext>
     </p:extLst>
   </p:cSld>

</xml_diff>

<commit_message>
just one more change about the test databases
</commit_message>
<xml_diff>
--- a/ch1-data.pptx
+++ b/ch1-data.pptx
@@ -1286,476 +1286,6 @@
       <dsp:cNvGrpSpPr/>
     </dsp:nvGrpSpPr>
     <dsp:grpSpPr/>
-    <dsp:sp modelId="{2C9819A9-2317-3840-9C47-C38B2C86B2A8}">
-      <dsp:nvSpPr>
-        <dsp:cNvPr id="0" name=""/>
-        <dsp:cNvSpPr/>
-      </dsp:nvSpPr>
-      <dsp:spPr>
-        <a:xfrm>
-          <a:off x="0" y="1551582"/>
-          <a:ext cx="1601390" cy="960834"/>
-        </a:xfrm>
-        <a:prstGeom prst="roundRect">
-          <a:avLst>
-            <a:gd name="adj" fmla="val 10000"/>
-          </a:avLst>
-        </a:prstGeom>
-        <a:blipFill rotWithShape="0">
-          <a:blip xmlns:r="http://schemas.openxmlformats.org/officeDocument/2006/relationships" r:embed="rId1">
-            <a:duotone>
-              <a:schemeClr val="accent1">
-                <a:hueOff val="0"/>
-                <a:satOff val="0"/>
-                <a:lumOff val="0"/>
-                <a:alphaOff val="0"/>
-                <a:shade val="22000"/>
-                <a:satMod val="160000"/>
-              </a:schemeClr>
-              <a:schemeClr val="accent1">
-                <a:hueOff val="0"/>
-                <a:satOff val="0"/>
-                <a:lumOff val="0"/>
-                <a:alphaOff val="0"/>
-                <a:shade val="45000"/>
-                <a:satMod val="100000"/>
-              </a:schemeClr>
-            </a:duotone>
-          </a:blip>
-          <a:tile tx="0" ty="0" sx="65000" sy="65000" flip="none" algn="ctr"/>
-        </a:blipFill>
-        <a:ln>
-          <a:noFill/>
-        </a:ln>
-        <a:effectLst>
-          <a:outerShdw blurRad="38100" dist="25400" dir="5400000" algn="t" rotWithShape="0">
-            <a:srgbClr val="000000">
-              <a:alpha val="50000"/>
-            </a:srgbClr>
-          </a:outerShdw>
-        </a:effectLst>
-      </dsp:spPr>
-      <dsp:style>
-        <a:lnRef idx="0">
-          <a:scrgbClr r="0" g="0" b="0"/>
-        </a:lnRef>
-        <a:fillRef idx="3">
-          <a:scrgbClr r="0" g="0" b="0"/>
-        </a:fillRef>
-        <a:effectRef idx="2">
-          <a:scrgbClr r="0" g="0" b="0"/>
-        </a:effectRef>
-        <a:fontRef idx="minor">
-          <a:schemeClr val="lt1"/>
-        </a:fontRef>
-      </dsp:style>
-      <dsp:txBody>
-        <a:bodyPr spcFirstLastPara="0" vert="horz" wrap="square" lIns="68580" tIns="68580" rIns="68580" bIns="68580" numCol="1" spcCol="1270" anchor="ctr" anchorCtr="0">
-          <a:noAutofit/>
-        </a:bodyPr>
-        <a:lstStyle/>
-        <a:p>
-          <a:pPr lvl="0" algn="ctr" defTabSz="800100">
-            <a:lnSpc>
-              <a:spcPct val="90000"/>
-            </a:lnSpc>
-            <a:spcBef>
-              <a:spcPct val="0"/>
-            </a:spcBef>
-            <a:spcAft>
-              <a:spcPct val="35000"/>
-            </a:spcAft>
-          </a:pPr>
-          <a:r>
-            <a:rPr lang="en-US" sz="1800" kern="1200" dirty="0" err="1" smtClean="0"/>
-            <a:t>arity</a:t>
-          </a:r>
-          <a:r>
-            <a:rPr lang="en-US" sz="1800" kern="1200" dirty="0" smtClean="0"/>
-            <a:t> &gt; 1</a:t>
-          </a:r>
-          <a:endParaRPr lang="en-US" sz="1800" kern="1200" dirty="0"/>
-        </a:p>
-      </dsp:txBody>
-      <dsp:txXfrm>
-        <a:off x="28142" y="1579724"/>
-        <a:ext cx="1545106" cy="904550"/>
-      </dsp:txXfrm>
-    </dsp:sp>
-    <dsp:sp modelId="{B7EC9E31-51E6-BD4A-92E0-42FDC6CB2AA2}">
-      <dsp:nvSpPr>
-        <dsp:cNvPr id="0" name=""/>
-        <dsp:cNvSpPr/>
-      </dsp:nvSpPr>
-      <dsp:spPr>
-        <a:xfrm>
-          <a:off x="1762869" y="1833427"/>
-          <a:ext cx="342334" cy="397144"/>
-        </a:xfrm>
-        <a:prstGeom prst="rightArrow">
-          <a:avLst>
-            <a:gd name="adj1" fmla="val 60000"/>
-            <a:gd name="adj2" fmla="val 50000"/>
-          </a:avLst>
-        </a:prstGeom>
-        <a:blipFill rotWithShape="0">
-          <a:blip xmlns:r="http://schemas.openxmlformats.org/officeDocument/2006/relationships" r:embed="rId1">
-            <a:duotone>
-              <a:schemeClr val="accent1">
-                <a:tint val="60000"/>
-                <a:hueOff val="0"/>
-                <a:satOff val="0"/>
-                <a:lumOff val="0"/>
-                <a:alphaOff val="0"/>
-                <a:shade val="22000"/>
-                <a:satMod val="160000"/>
-              </a:schemeClr>
-              <a:schemeClr val="accent1">
-                <a:tint val="60000"/>
-                <a:hueOff val="0"/>
-                <a:satOff val="0"/>
-                <a:lumOff val="0"/>
-                <a:alphaOff val="0"/>
-                <a:shade val="45000"/>
-                <a:satMod val="100000"/>
-              </a:schemeClr>
-            </a:duotone>
-          </a:blip>
-          <a:tile tx="0" ty="0" sx="65000" sy="65000" flip="none" algn="ctr"/>
-        </a:blipFill>
-        <a:ln>
-          <a:noFill/>
-        </a:ln>
-        <a:effectLst>
-          <a:outerShdw blurRad="38100" dist="25400" dir="5400000" algn="t" rotWithShape="0">
-            <a:srgbClr val="000000">
-              <a:alpha val="50000"/>
-            </a:srgbClr>
-          </a:outerShdw>
-        </a:effectLst>
-      </dsp:spPr>
-      <dsp:style>
-        <a:lnRef idx="0">
-          <a:scrgbClr r="0" g="0" b="0"/>
-        </a:lnRef>
-        <a:fillRef idx="3">
-          <a:scrgbClr r="0" g="0" b="0"/>
-        </a:fillRef>
-        <a:effectRef idx="2">
-          <a:scrgbClr r="0" g="0" b="0"/>
-        </a:effectRef>
-        <a:fontRef idx="minor">
-          <a:schemeClr val="lt1"/>
-        </a:fontRef>
-      </dsp:style>
-      <dsp:txBody>
-        <a:bodyPr spcFirstLastPara="0" vert="horz" wrap="square" lIns="0" tIns="0" rIns="0" bIns="0" numCol="1" spcCol="1270" anchor="ctr" anchorCtr="0">
-          <a:noAutofit/>
-        </a:bodyPr>
-        <a:lstStyle/>
-        <a:p>
-          <a:pPr lvl="0" algn="ctr" defTabSz="622300">
-            <a:lnSpc>
-              <a:spcPct val="90000"/>
-            </a:lnSpc>
-            <a:spcBef>
-              <a:spcPct val="0"/>
-            </a:spcBef>
-            <a:spcAft>
-              <a:spcPct val="35000"/>
-            </a:spcAft>
-          </a:pPr>
-          <a:endParaRPr lang="en-US" sz="1400" kern="1200"/>
-        </a:p>
-      </dsp:txBody>
-      <dsp:txXfrm>
-        <a:off x="1762869" y="1912856"/>
-        <a:ext cx="239634" cy="238286"/>
-      </dsp:txXfrm>
-    </dsp:sp>
-    <dsp:sp modelId="{FF9B0C14-F923-9749-BB19-2B00A80942EF}">
-      <dsp:nvSpPr>
-        <dsp:cNvPr id="0" name=""/>
-        <dsp:cNvSpPr/>
-      </dsp:nvSpPr>
-      <dsp:spPr>
-        <a:xfrm>
-          <a:off x="2247304" y="1551582"/>
-          <a:ext cx="1601390" cy="960834"/>
-        </a:xfrm>
-        <a:prstGeom prst="roundRect">
-          <a:avLst>
-            <a:gd name="adj" fmla="val 10000"/>
-          </a:avLst>
-        </a:prstGeom>
-        <a:blipFill rotWithShape="0">
-          <a:blip xmlns:r="http://schemas.openxmlformats.org/officeDocument/2006/relationships" r:embed="rId1">
-            <a:duotone>
-              <a:schemeClr val="accent1">
-                <a:hueOff val="0"/>
-                <a:satOff val="0"/>
-                <a:lumOff val="0"/>
-                <a:alphaOff val="0"/>
-                <a:shade val="22000"/>
-                <a:satMod val="160000"/>
-              </a:schemeClr>
-              <a:schemeClr val="accent1">
-                <a:hueOff val="0"/>
-                <a:satOff val="0"/>
-                <a:lumOff val="0"/>
-                <a:alphaOff val="0"/>
-                <a:shade val="45000"/>
-                <a:satMod val="100000"/>
-              </a:schemeClr>
-            </a:duotone>
-          </a:blip>
-          <a:tile tx="0" ty="0" sx="65000" sy="65000" flip="none" algn="ctr"/>
-        </a:blipFill>
-        <a:ln>
-          <a:noFill/>
-        </a:ln>
-        <a:effectLst>
-          <a:outerShdw blurRad="38100" dist="25400" dir="5400000" algn="t" rotWithShape="0">
-            <a:srgbClr val="000000">
-              <a:alpha val="50000"/>
-            </a:srgbClr>
-          </a:outerShdw>
-        </a:effectLst>
-      </dsp:spPr>
-      <dsp:style>
-        <a:lnRef idx="0">
-          <a:scrgbClr r="0" g="0" b="0"/>
-        </a:lnRef>
-        <a:fillRef idx="3">
-          <a:scrgbClr r="0" g="0" b="0"/>
-        </a:fillRef>
-        <a:effectRef idx="2">
-          <a:scrgbClr r="0" g="0" b="0"/>
-        </a:effectRef>
-        <a:fontRef idx="minor">
-          <a:schemeClr val="lt1"/>
-        </a:fontRef>
-      </dsp:style>
-      <dsp:txBody>
-        <a:bodyPr spcFirstLastPara="0" vert="horz" wrap="square" lIns="68580" tIns="68580" rIns="68580" bIns="68580" numCol="1" spcCol="1270" anchor="ctr" anchorCtr="0">
-          <a:noAutofit/>
-        </a:bodyPr>
-        <a:lstStyle/>
-        <a:p>
-          <a:pPr lvl="0" algn="ctr" defTabSz="800100">
-            <a:lnSpc>
-              <a:spcPct val="90000"/>
-            </a:lnSpc>
-            <a:spcBef>
-              <a:spcPct val="0"/>
-            </a:spcBef>
-            <a:spcAft>
-              <a:spcPct val="35000"/>
-            </a:spcAft>
-          </a:pPr>
-          <a:r>
-            <a:rPr lang="en-US" sz="1800" kern="1200" dirty="0" smtClean="0"/>
-            <a:t>shared arguments</a:t>
-          </a:r>
-          <a:endParaRPr lang="en-US" sz="1800" kern="1200" dirty="0"/>
-        </a:p>
-      </dsp:txBody>
-      <dsp:txXfrm>
-        <a:off x="2275446" y="1579724"/>
-        <a:ext cx="1545106" cy="904550"/>
-      </dsp:txXfrm>
-    </dsp:sp>
-    <dsp:sp modelId="{9666E447-A964-DC4A-9282-E7B7DBF6B721}">
-      <dsp:nvSpPr>
-        <dsp:cNvPr id="0" name=""/>
-        <dsp:cNvSpPr/>
-      </dsp:nvSpPr>
-      <dsp:spPr>
-        <a:xfrm>
-          <a:off x="4008834" y="1833427"/>
-          <a:ext cx="339494" cy="397144"/>
-        </a:xfrm>
-        <a:prstGeom prst="rightArrow">
-          <a:avLst>
-            <a:gd name="adj1" fmla="val 60000"/>
-            <a:gd name="adj2" fmla="val 50000"/>
-          </a:avLst>
-        </a:prstGeom>
-        <a:blipFill rotWithShape="0">
-          <a:blip xmlns:r="http://schemas.openxmlformats.org/officeDocument/2006/relationships" r:embed="rId1">
-            <a:duotone>
-              <a:schemeClr val="accent1">
-                <a:tint val="60000"/>
-                <a:hueOff val="0"/>
-                <a:satOff val="0"/>
-                <a:lumOff val="0"/>
-                <a:alphaOff val="0"/>
-                <a:shade val="22000"/>
-                <a:satMod val="160000"/>
-              </a:schemeClr>
-              <a:schemeClr val="accent1">
-                <a:tint val="60000"/>
-                <a:hueOff val="0"/>
-                <a:satOff val="0"/>
-                <a:lumOff val="0"/>
-                <a:alphaOff val="0"/>
-                <a:shade val="45000"/>
-                <a:satMod val="100000"/>
-              </a:schemeClr>
-            </a:duotone>
-          </a:blip>
-          <a:tile tx="0" ty="0" sx="65000" sy="65000" flip="none" algn="ctr"/>
-        </a:blipFill>
-        <a:ln>
-          <a:noFill/>
-        </a:ln>
-        <a:effectLst>
-          <a:outerShdw blurRad="38100" dist="25400" dir="5400000" algn="t" rotWithShape="0">
-            <a:srgbClr val="000000">
-              <a:alpha val="50000"/>
-            </a:srgbClr>
-          </a:outerShdw>
-        </a:effectLst>
-      </dsp:spPr>
-      <dsp:style>
-        <a:lnRef idx="0">
-          <a:scrgbClr r="0" g="0" b="0"/>
-        </a:lnRef>
-        <a:fillRef idx="3">
-          <a:scrgbClr r="0" g="0" b="0"/>
-        </a:fillRef>
-        <a:effectRef idx="2">
-          <a:scrgbClr r="0" g="0" b="0"/>
-        </a:effectRef>
-        <a:fontRef idx="minor">
-          <a:schemeClr val="lt1"/>
-        </a:fontRef>
-      </dsp:style>
-      <dsp:txBody>
-        <a:bodyPr spcFirstLastPara="0" vert="horz" wrap="square" lIns="0" tIns="0" rIns="0" bIns="0" numCol="1" spcCol="1270" anchor="ctr" anchorCtr="0">
-          <a:noAutofit/>
-        </a:bodyPr>
-        <a:lstStyle/>
-        <a:p>
-          <a:pPr lvl="0" algn="ctr" defTabSz="622300">
-            <a:lnSpc>
-              <a:spcPct val="90000"/>
-            </a:lnSpc>
-            <a:spcBef>
-              <a:spcPct val="0"/>
-            </a:spcBef>
-            <a:spcAft>
-              <a:spcPct val="35000"/>
-            </a:spcAft>
-          </a:pPr>
-          <a:endParaRPr lang="en-US" sz="1400" kern="1200"/>
-        </a:p>
-      </dsp:txBody>
-      <dsp:txXfrm>
-        <a:off x="4008834" y="1912856"/>
-        <a:ext cx="237646" cy="238286"/>
-      </dsp:txXfrm>
-    </dsp:sp>
-    <dsp:sp modelId="{678E3908-2ACE-E64F-BE40-EA2E05B6871D}">
-      <dsp:nvSpPr>
-        <dsp:cNvPr id="0" name=""/>
-        <dsp:cNvSpPr/>
-      </dsp:nvSpPr>
-      <dsp:spPr>
-        <a:xfrm>
-          <a:off x="4489251" y="1551582"/>
-          <a:ext cx="1601390" cy="960834"/>
-        </a:xfrm>
-        <a:prstGeom prst="roundRect">
-          <a:avLst>
-            <a:gd name="adj" fmla="val 10000"/>
-          </a:avLst>
-        </a:prstGeom>
-        <a:blipFill rotWithShape="0">
-          <a:blip xmlns:r="http://schemas.openxmlformats.org/officeDocument/2006/relationships" r:embed="rId1">
-            <a:duotone>
-              <a:schemeClr val="accent1">
-                <a:hueOff val="0"/>
-                <a:satOff val="0"/>
-                <a:lumOff val="0"/>
-                <a:alphaOff val="0"/>
-                <a:shade val="22000"/>
-                <a:satMod val="160000"/>
-              </a:schemeClr>
-              <a:schemeClr val="accent1">
-                <a:hueOff val="0"/>
-                <a:satOff val="0"/>
-                <a:lumOff val="0"/>
-                <a:alphaOff val="0"/>
-                <a:shade val="45000"/>
-                <a:satMod val="100000"/>
-              </a:schemeClr>
-            </a:duotone>
-          </a:blip>
-          <a:tile tx="0" ty="0" sx="65000" sy="65000" flip="none" algn="ctr"/>
-        </a:blipFill>
-        <a:ln>
-          <a:noFill/>
-        </a:ln>
-        <a:effectLst>
-          <a:outerShdw blurRad="38100" dist="25400" dir="5400000" algn="t" rotWithShape="0">
-            <a:srgbClr val="000000">
-              <a:alpha val="50000"/>
-            </a:srgbClr>
-          </a:outerShdw>
-        </a:effectLst>
-      </dsp:spPr>
-      <dsp:style>
-        <a:lnRef idx="0">
-          <a:scrgbClr r="0" g="0" b="0"/>
-        </a:lnRef>
-        <a:fillRef idx="3">
-          <a:scrgbClr r="0" g="0" b="0"/>
-        </a:fillRef>
-        <a:effectRef idx="2">
-          <a:scrgbClr r="0" g="0" b="0"/>
-        </a:effectRef>
-        <a:fontRef idx="minor">
-          <a:schemeClr val="lt1"/>
-        </a:fontRef>
-      </dsp:style>
-      <dsp:txBody>
-        <a:bodyPr spcFirstLastPara="0" vert="horz" wrap="square" lIns="68580" tIns="68580" rIns="68580" bIns="68580" numCol="1" spcCol="1270" anchor="ctr" anchorCtr="0">
-          <a:noAutofit/>
-        </a:bodyPr>
-        <a:lstStyle/>
-        <a:p>
-          <a:pPr lvl="0" algn="ctr" defTabSz="800100">
-            <a:lnSpc>
-              <a:spcPct val="90000"/>
-            </a:lnSpc>
-            <a:spcBef>
-              <a:spcPct val="0"/>
-            </a:spcBef>
-            <a:spcAft>
-              <a:spcPct val="35000"/>
-            </a:spcAft>
-          </a:pPr>
-          <a:r>
-            <a:rPr lang="en-US" sz="1800" kern="1200" dirty="0" smtClean="0"/>
-            <a:t>dependencies among </a:t>
-          </a:r>
-          <a:r>
-            <a:rPr lang="en-US" sz="1800" kern="1200" dirty="0" err="1" smtClean="0"/>
-            <a:t>functor</a:t>
-          </a:r>
-          <a:r>
-            <a:rPr lang="en-US" sz="1800" kern="1200" dirty="0" smtClean="0"/>
-            <a:t> values</a:t>
-          </a:r>
-          <a:endParaRPr lang="en-US" sz="1800" kern="1200" dirty="0"/>
-        </a:p>
-      </dsp:txBody>
-      <dsp:txXfrm>
-        <a:off x="4517393" y="1579724"/>
-        <a:ext cx="1545106" cy="904550"/>
-      </dsp:txXfrm>
-    </dsp:sp>
   </dsp:spTree>
 </dsp:drawing>
 </file>
@@ -3047,7 +2577,7 @@
               <a:pPr>
                 <a:defRPr/>
               </a:pPr>
-              <a:t>2017-01-31</a:t>
+              <a:t>2017-02-02</a:t>
             </a:fld>
             <a:endParaRPr lang="en-US"/>
           </a:p>
@@ -3263,7 +2793,7 @@
               <a:pPr>
                 <a:defRPr/>
               </a:pPr>
-              <a:t>2017-01-31</a:t>
+              <a:t>2017-02-02</a:t>
             </a:fld>
             <a:endParaRPr lang="en-US"/>
           </a:p>
@@ -7272,7 +6802,7 @@
               <a:pPr>
                 <a:defRPr/>
               </a:pPr>
-              <a:t>2017-01-31</a:t>
+              <a:t>2017-02-02</a:t>
             </a:fld>
             <a:endParaRPr lang="en-US"/>
           </a:p>
@@ -7473,7 +7003,7 @@
               <a:pPr>
                 <a:defRPr/>
               </a:pPr>
-              <a:t>2017-01-31</a:t>
+              <a:t>2017-02-02</a:t>
             </a:fld>
             <a:endParaRPr lang="en-US"/>
           </a:p>
@@ -7684,7 +7214,7 @@
               <a:pPr>
                 <a:defRPr/>
               </a:pPr>
-              <a:t>2017-01-31</a:t>
+              <a:t>2017-02-02</a:t>
             </a:fld>
             <a:endParaRPr lang="en-US"/>
           </a:p>
@@ -7890,7 +7420,7 @@
               <a:pPr>
                 <a:defRPr/>
               </a:pPr>
-              <a:t>2017-01-31</a:t>
+              <a:t>2017-02-02</a:t>
             </a:fld>
             <a:endParaRPr lang="en-US"/>
           </a:p>
@@ -8409,7 +7939,7 @@
               <a:pPr>
                 <a:defRPr/>
               </a:pPr>
-              <a:t>2017-01-31</a:t>
+              <a:t>2017-02-02</a:t>
             </a:fld>
             <a:endParaRPr lang="en-US"/>
           </a:p>
@@ -8682,7 +8212,7 @@
               <a:pPr>
                 <a:defRPr/>
               </a:pPr>
-              <a:t>2017-01-31</a:t>
+              <a:t>2017-02-02</a:t>
             </a:fld>
             <a:endParaRPr lang="en-US"/>
           </a:p>
@@ -9080,7 +8610,7 @@
               <a:pPr>
                 <a:defRPr/>
               </a:pPr>
-              <a:t>2017-01-31</a:t>
+              <a:t>2017-02-02</a:t>
             </a:fld>
             <a:endParaRPr lang="en-US"/>
           </a:p>
@@ -9229,7 +8759,7 @@
               <a:pPr>
                 <a:defRPr/>
               </a:pPr>
-              <a:t>2017-01-31</a:t>
+              <a:t>2017-02-02</a:t>
             </a:fld>
             <a:endParaRPr lang="en-US"/>
           </a:p>
@@ -9355,7 +8885,7 @@
               <a:pPr>
                 <a:defRPr/>
               </a:pPr>
-              <a:t>2017-01-31</a:t>
+              <a:t>2017-02-02</a:t>
             </a:fld>
             <a:endParaRPr lang="en-US"/>
           </a:p>
@@ -9731,7 +9261,7 @@
               <a:pPr>
                 <a:defRPr/>
               </a:pPr>
-              <a:t>2017-01-31</a:t>
+              <a:t>2017-02-02</a:t>
             </a:fld>
             <a:endParaRPr lang="en-US"/>
           </a:p>
@@ -10154,7 +9684,7 @@
               <a:pPr>
                 <a:defRPr/>
               </a:pPr>
-              <a:t>2017-01-31</a:t>
+              <a:t>2017-02-02</a:t>
             </a:fld>
             <a:endParaRPr lang="en-US"/>
           </a:p>
@@ -10574,7 +10104,7 @@
               <a:pPr>
                 <a:defRPr/>
               </a:pPr>
-              <a:t>2017-01-31</a:t>
+              <a:t>2017-02-02</a:t>
             </a:fld>
             <a:endParaRPr lang="en-US"/>
           </a:p>
@@ -19627,7 +19157,19 @@
               <a:rPr lang="en-US" dirty="0" smtClean="0"/>
               <a:t>Port = 3306</a:t>
             </a:r>
-            <a:endParaRPr lang="en-US" dirty="0"/>
+          </a:p>
+          <a:p>
+            <a:r>
+              <a:rPr lang="en-US" dirty="0"/>
+              <a:t>Tutorial Databases are available under</a:t>
+            </a:r>
+            <a:br>
+              <a:rPr lang="en-US" dirty="0"/>
+            </a:br>
+            <a:r>
+              <a:rPr lang="en-US" dirty="0"/>
+              <a:t>IMDB_1R, imdb_MovieLens, Mondial_Tutorial</a:t>
+            </a:r>
           </a:p>
         </p:txBody>
       </p:sp>
@@ -23322,7 +22864,6 @@
               <a:rPr lang="en-US" dirty="0"/>
               <a:t>, E. (2016), 'A review of relational machine learning for knowledge graphs', Proceedings of the IEEE 104(1), 11--33. </a:t>
             </a:r>
-            <a:endParaRPr lang="en-US" dirty="0"/>
           </a:p>
         </p:txBody>
       </p:sp>

</xml_diff>